<commit_message>
Abro la ppt de trazabilidad en dos para ver mejor el UAT tracking y el issue tracking
</commit_message>
<xml_diff>
--- a/Presentaciones/Self Management - Presentación Final V1.pptx
+++ b/Presentaciones/Self Management - Presentación Final V1.pptx
@@ -5,7 +5,7 @@
     <p:sldMasterId id="2147483708" r:id="rId1"/>
   </p:sldMasterIdLst>
   <p:notesMasterIdLst>
-    <p:notesMasterId r:id="rId15"/>
+    <p:notesMasterId r:id="rId16"/>
   </p:notesMasterIdLst>
   <p:sldIdLst>
     <p:sldId id="256" r:id="rId2"/>
@@ -13,14 +13,15 @@
     <p:sldId id="258" r:id="rId4"/>
     <p:sldId id="278" r:id="rId5"/>
     <p:sldId id="260" r:id="rId6"/>
-    <p:sldId id="268" r:id="rId7"/>
-    <p:sldId id="281" r:id="rId8"/>
-    <p:sldId id="265" r:id="rId9"/>
-    <p:sldId id="267" r:id="rId10"/>
-    <p:sldId id="269" r:id="rId11"/>
-    <p:sldId id="279" r:id="rId12"/>
-    <p:sldId id="270" r:id="rId13"/>
-    <p:sldId id="280" r:id="rId14"/>
+    <p:sldId id="283" r:id="rId7"/>
+    <p:sldId id="268" r:id="rId8"/>
+    <p:sldId id="281" r:id="rId9"/>
+    <p:sldId id="265" r:id="rId10"/>
+    <p:sldId id="267" r:id="rId11"/>
+    <p:sldId id="269" r:id="rId12"/>
+    <p:sldId id="279" r:id="rId13"/>
+    <p:sldId id="270" r:id="rId14"/>
+    <p:sldId id="280" r:id="rId15"/>
   </p:sldIdLst>
   <p:sldSz cx="9144000" cy="6858000" type="screen4x3"/>
   <p:notesSz cx="6858000" cy="9144000"/>
@@ -259,7 +260,7 @@
               <a:pPr>
                 <a:defRPr/>
               </a:pPr>
-              <a:t>21/11/2010</a:t>
+              <a:t>27/11/2010</a:t>
             </a:fld>
             <a:endParaRPr lang="es-ES"/>
           </a:p>
@@ -453,7 +454,7 @@
     </p:spTree>
     <p:extLst>
       <p:ext uri="{BB962C8B-B14F-4D97-AF65-F5344CB8AC3E}">
-        <p14:creationId xmlns:p14="http://schemas.microsoft.com/office/powerpoint/2010/main" xmlns="" val="4187226391"/>
+        <p14:creationId xmlns="" xmlns:p14="http://schemas.microsoft.com/office/powerpoint/2010/main" val="4187226391"/>
       </p:ext>
     </p:extLst>
   </p:cSld>
@@ -759,63 +760,9 @@
           <a:p>
             <a:pPr marL="171450" indent="-171450">
               <a:buFont typeface="Arial" pitchFamily="34" charset="0"/>
-              <a:buChar char="•"/>
+              <a:buNone/>
             </a:pPr>
-            <a:r>
-              <a:rPr lang="es-AR" dirty="0" smtClean="0"/>
-              <a:t>Para que el equipo pueda</a:t>
-            </a:r>
-            <a:r>
-              <a:rPr lang="es-AR" baseline="0" dirty="0" smtClean="0"/>
-              <a:t> aprender lo bueno y lo malo de cada sprint, al finalizar cada sprint, se realizará la retrospectiva del mismo.</a:t>
-            </a:r>
-          </a:p>
-          <a:p>
-            <a:pPr marL="171450" indent="-171450">
-              <a:buFont typeface="Arial" pitchFamily="34" charset="0"/>
-              <a:buChar char="•"/>
-            </a:pPr>
-            <a:r>
-              <a:rPr lang="es-AR" baseline="0" dirty="0" smtClean="0"/>
-              <a:t>La idea es debatir las cosas buenas y malas que ocurrieron y proponer cambios para los próximos </a:t>
-            </a:r>
-            <a:r>
-              <a:rPr lang="es-AR" baseline="0" dirty="0" err="1" smtClean="0"/>
-              <a:t>sprints</a:t>
-            </a:r>
-            <a:r>
-              <a:rPr lang="es-AR" baseline="0" dirty="0" smtClean="0"/>
-              <a:t>.</a:t>
-            </a:r>
-          </a:p>
-          <a:p>
-            <a:pPr marL="171450" indent="-171450">
-              <a:buFont typeface="Arial" pitchFamily="34" charset="0"/>
-              <a:buChar char="•"/>
-            </a:pPr>
-            <a:r>
-              <a:rPr lang="es-AR" baseline="0" dirty="0" smtClean="0"/>
-              <a:t>Por otra parte se analizarán las métricas de velocidad estimada vs real para sacar conclusiones acerca de las estimaciones realizadas.</a:t>
-            </a:r>
-          </a:p>
-          <a:p>
-            <a:pPr marL="171450" indent="-171450">
-              <a:buFont typeface="Arial" pitchFamily="34" charset="0"/>
-              <a:buChar char="•"/>
-            </a:pPr>
-            <a:r>
-              <a:rPr lang="es-AR" baseline="0" dirty="0" smtClean="0"/>
-              <a:t>Por último se documentarán las sugerencias de mejora acordadas en un </a:t>
-            </a:r>
-            <a:r>
-              <a:rPr lang="es-AR" baseline="0" dirty="0" err="1" smtClean="0"/>
-              <a:t>google</a:t>
-            </a:r>
-            <a:r>
-              <a:rPr lang="es-AR" baseline="0" dirty="0" smtClean="0"/>
-              <a:t> doc.</a:t>
-            </a:r>
-            <a:endParaRPr lang="es-AR" dirty="0"/>
+            <a:endParaRPr lang="es-ES_tradnl" baseline="0" dirty="0" smtClean="0"/>
           </a:p>
         </p:txBody>
       </p:sp>
@@ -842,7 +789,7 @@
               <a:pPr>
                 <a:defRPr/>
               </a:pPr>
-              <a:t>12</a:t>
+              <a:t>11</a:t>
             </a:fld>
             <a:endParaRPr lang="es-ES"/>
           </a:p>
@@ -904,6 +851,97 @@
           <a:p>
             <a:pPr marL="171450" indent="-171450">
               <a:buFont typeface="Arial" pitchFamily="34" charset="0"/>
+              <a:buNone/>
+            </a:pPr>
+            <a:endParaRPr lang="es-ES_tradnl" baseline="0" dirty="0" smtClean="0"/>
+          </a:p>
+        </p:txBody>
+      </p:sp>
+      <p:sp>
+        <p:nvSpPr>
+          <p:cNvPr id="4" name="3 Marcador de número de diapositiva"/>
+          <p:cNvSpPr>
+            <a:spLocks noGrp="1"/>
+          </p:cNvSpPr>
+          <p:nvPr>
+            <p:ph type="sldNum" sz="quarter" idx="10"/>
+          </p:nvPr>
+        </p:nvSpPr>
+        <p:spPr/>
+        <p:txBody>
+          <a:bodyPr/>
+          <a:lstStyle/>
+          <a:p>
+            <a:pPr>
+              <a:defRPr/>
+            </a:pPr>
+            <a:fld id="{1D1624B2-96DF-44BE-B4E9-693168E16E00}" type="slidenum">
+              <a:rPr lang="es-ES" smtClean="0"/>
+              <a:pPr>
+                <a:defRPr/>
+              </a:pPr>
+              <a:t>12</a:t>
+            </a:fld>
+            <a:endParaRPr lang="es-ES"/>
+          </a:p>
+        </p:txBody>
+      </p:sp>
+    </p:spTree>
+  </p:cSld>
+  <p:clrMapOvr>
+    <a:masterClrMapping/>
+  </p:clrMapOvr>
+</p:notes>
+</file>
+
+<file path=ppt/notesSlides/notesSlide12.xml><?xml version="1.0" encoding="utf-8"?>
+<p:notes xmlns:a="http://schemas.openxmlformats.org/drawingml/2006/main" xmlns:r="http://schemas.openxmlformats.org/officeDocument/2006/relationships" xmlns:p="http://schemas.openxmlformats.org/presentationml/2006/main">
+  <p:cSld>
+    <p:spTree>
+      <p:nvGrpSpPr>
+        <p:cNvPr id="1" name=""/>
+        <p:cNvGrpSpPr/>
+        <p:nvPr/>
+      </p:nvGrpSpPr>
+      <p:grpSpPr>
+        <a:xfrm>
+          <a:off x="0" y="0"/>
+          <a:ext cx="0" cy="0"/>
+          <a:chOff x="0" y="0"/>
+          <a:chExt cx="0" cy="0"/>
+        </a:xfrm>
+      </p:grpSpPr>
+      <p:sp>
+        <p:nvSpPr>
+          <p:cNvPr id="2" name="1 Marcador de imagen de diapositiva"/>
+          <p:cNvSpPr>
+            <a:spLocks noGrp="1" noRot="1" noChangeAspect="1"/>
+          </p:cNvSpPr>
+          <p:nvPr>
+            <p:ph type="sldImg"/>
+          </p:nvPr>
+        </p:nvSpPr>
+        <p:spPr/>
+      </p:sp>
+      <p:sp>
+        <p:nvSpPr>
+          <p:cNvPr id="3" name="2 Marcador de notas"/>
+          <p:cNvSpPr>
+            <a:spLocks noGrp="1"/>
+          </p:cNvSpPr>
+          <p:nvPr>
+            <p:ph type="body" idx="1"/>
+          </p:nvPr>
+        </p:nvSpPr>
+        <p:spPr/>
+        <p:txBody>
+          <a:bodyPr>
+            <a:normAutofit/>
+          </a:bodyPr>
+          <a:lstStyle/>
+          <a:p>
+            <a:pPr marL="171450" indent="-171450">
+              <a:buFont typeface="Arial" pitchFamily="34" charset="0"/>
               <a:buChar char="•"/>
             </a:pPr>
             <a:r>
@@ -988,6 +1026,151 @@
                 <a:defRPr/>
               </a:pPr>
               <a:t>13</a:t>
+            </a:fld>
+            <a:endParaRPr lang="es-ES"/>
+          </a:p>
+        </p:txBody>
+      </p:sp>
+    </p:spTree>
+  </p:cSld>
+  <p:clrMapOvr>
+    <a:masterClrMapping/>
+  </p:clrMapOvr>
+</p:notes>
+</file>
+
+<file path=ppt/notesSlides/notesSlide13.xml><?xml version="1.0" encoding="utf-8"?>
+<p:notes xmlns:a="http://schemas.openxmlformats.org/drawingml/2006/main" xmlns:r="http://schemas.openxmlformats.org/officeDocument/2006/relationships" xmlns:p="http://schemas.openxmlformats.org/presentationml/2006/main">
+  <p:cSld>
+    <p:spTree>
+      <p:nvGrpSpPr>
+        <p:cNvPr id="1" name=""/>
+        <p:cNvGrpSpPr/>
+        <p:nvPr/>
+      </p:nvGrpSpPr>
+      <p:grpSpPr>
+        <a:xfrm>
+          <a:off x="0" y="0"/>
+          <a:ext cx="0" cy="0"/>
+          <a:chOff x="0" y="0"/>
+          <a:chExt cx="0" cy="0"/>
+        </a:xfrm>
+      </p:grpSpPr>
+      <p:sp>
+        <p:nvSpPr>
+          <p:cNvPr id="2" name="1 Marcador de imagen de diapositiva"/>
+          <p:cNvSpPr>
+            <a:spLocks noGrp="1" noRot="1" noChangeAspect="1"/>
+          </p:cNvSpPr>
+          <p:nvPr>
+            <p:ph type="sldImg"/>
+          </p:nvPr>
+        </p:nvSpPr>
+        <p:spPr/>
+      </p:sp>
+      <p:sp>
+        <p:nvSpPr>
+          <p:cNvPr id="3" name="2 Marcador de notas"/>
+          <p:cNvSpPr>
+            <a:spLocks noGrp="1"/>
+          </p:cNvSpPr>
+          <p:nvPr>
+            <p:ph type="body" idx="1"/>
+          </p:nvPr>
+        </p:nvSpPr>
+        <p:spPr/>
+        <p:txBody>
+          <a:bodyPr>
+            <a:normAutofit/>
+          </a:bodyPr>
+          <a:lstStyle/>
+          <a:p>
+            <a:pPr marL="171450" indent="-171450">
+              <a:buFont typeface="Arial" pitchFamily="34" charset="0"/>
+              <a:buChar char="•"/>
+            </a:pPr>
+            <a:r>
+              <a:rPr lang="es-AR" dirty="0" smtClean="0"/>
+              <a:t>Para que el equipo pueda</a:t>
+            </a:r>
+            <a:r>
+              <a:rPr lang="es-AR" baseline="0" dirty="0" smtClean="0"/>
+              <a:t> aprender lo bueno y lo malo de cada sprint, al finalizar cada sprint, se realizará la retrospectiva del mismo.</a:t>
+            </a:r>
+          </a:p>
+          <a:p>
+            <a:pPr marL="171450" indent="-171450">
+              <a:buFont typeface="Arial" pitchFamily="34" charset="0"/>
+              <a:buChar char="•"/>
+            </a:pPr>
+            <a:r>
+              <a:rPr lang="es-AR" baseline="0" dirty="0" smtClean="0"/>
+              <a:t>La idea es debatir las cosas buenas y malas que ocurrieron y proponer cambios para los próximos </a:t>
+            </a:r>
+            <a:r>
+              <a:rPr lang="es-AR" baseline="0" dirty="0" err="1" smtClean="0"/>
+              <a:t>sprints</a:t>
+            </a:r>
+            <a:r>
+              <a:rPr lang="es-AR" baseline="0" dirty="0" smtClean="0"/>
+              <a:t>.</a:t>
+            </a:r>
+          </a:p>
+          <a:p>
+            <a:pPr marL="171450" indent="-171450">
+              <a:buFont typeface="Arial" pitchFamily="34" charset="0"/>
+              <a:buChar char="•"/>
+            </a:pPr>
+            <a:r>
+              <a:rPr lang="es-AR" baseline="0" dirty="0" smtClean="0"/>
+              <a:t>Por otra parte se analizarán las métricas de velocidad estimada vs real para sacar conclusiones acerca de las estimaciones realizadas.</a:t>
+            </a:r>
+          </a:p>
+          <a:p>
+            <a:pPr marL="171450" indent="-171450">
+              <a:buFont typeface="Arial" pitchFamily="34" charset="0"/>
+              <a:buChar char="•"/>
+            </a:pPr>
+            <a:r>
+              <a:rPr lang="es-AR" baseline="0" dirty="0" smtClean="0"/>
+              <a:t>Por último se documentarán las sugerencias de mejora acordadas en un </a:t>
+            </a:r>
+            <a:r>
+              <a:rPr lang="es-AR" baseline="0" dirty="0" err="1" smtClean="0"/>
+              <a:t>google</a:t>
+            </a:r>
+            <a:r>
+              <a:rPr lang="es-AR" baseline="0" dirty="0" smtClean="0"/>
+              <a:t> doc.</a:t>
+            </a:r>
+            <a:endParaRPr lang="es-AR" dirty="0"/>
+          </a:p>
+        </p:txBody>
+      </p:sp>
+      <p:sp>
+        <p:nvSpPr>
+          <p:cNvPr id="4" name="3 Marcador de número de diapositiva"/>
+          <p:cNvSpPr>
+            <a:spLocks noGrp="1"/>
+          </p:cNvSpPr>
+          <p:nvPr>
+            <p:ph type="sldNum" sz="quarter" idx="10"/>
+          </p:nvPr>
+        </p:nvSpPr>
+        <p:spPr/>
+        <p:txBody>
+          <a:bodyPr/>
+          <a:lstStyle/>
+          <a:p>
+            <a:pPr>
+              <a:defRPr/>
+            </a:pPr>
+            <a:fld id="{1D1624B2-96DF-44BE-B4E9-693168E16E00}" type="slidenum">
+              <a:rPr lang="es-ES" smtClean="0"/>
+              <a:pPr>
+                <a:defRPr/>
+              </a:pPr>
+              <a:t>14</a:t>
             </a:fld>
             <a:endParaRPr lang="es-ES"/>
           </a:p>
@@ -1066,7 +1249,123 @@
                 <a:spcPct val="0"/>
               </a:spcBef>
             </a:pPr>
-            <a:endParaRPr lang="en-US" smtClean="0"/>
+            <a:r>
+              <a:rPr lang="en-US" dirty="0" smtClean="0"/>
+              <a:t>Se </a:t>
+            </a:r>
+            <a:r>
+              <a:rPr lang="en-US" dirty="0" err="1" smtClean="0"/>
+              <a:t>menciona</a:t>
+            </a:r>
+            <a:r>
+              <a:rPr lang="en-US" dirty="0" smtClean="0"/>
+              <a:t> la </a:t>
+            </a:r>
+            <a:r>
+              <a:rPr lang="en-US" dirty="0" err="1" smtClean="0"/>
+              <a:t>metodología</a:t>
+            </a:r>
+            <a:r>
+              <a:rPr lang="en-US" baseline="0" dirty="0" smtClean="0"/>
+              <a:t> </a:t>
+            </a:r>
+            <a:r>
+              <a:rPr lang="en-US" baseline="0" dirty="0" err="1" smtClean="0"/>
+              <a:t>utilizada</a:t>
+            </a:r>
+            <a:r>
+              <a:rPr lang="en-US" baseline="0" dirty="0" smtClean="0"/>
+              <a:t>, la </a:t>
+            </a:r>
+            <a:r>
+              <a:rPr lang="en-US" baseline="0" dirty="0" err="1" smtClean="0"/>
+              <a:t>herramienta</a:t>
+            </a:r>
+            <a:r>
+              <a:rPr lang="en-US" baseline="0" dirty="0" smtClean="0"/>
+              <a:t> </a:t>
+            </a:r>
+            <a:r>
+              <a:rPr lang="en-US" baseline="0" dirty="0" err="1" smtClean="0"/>
+              <a:t>elegida</a:t>
+            </a:r>
+            <a:r>
+              <a:rPr lang="en-US" baseline="0" dirty="0" smtClean="0"/>
+              <a:t>, </a:t>
+            </a:r>
+            <a:r>
+              <a:rPr lang="en-US" baseline="0" dirty="0" err="1" smtClean="0"/>
+              <a:t>mencionamos</a:t>
+            </a:r>
+            <a:r>
+              <a:rPr lang="en-US" baseline="0" dirty="0" smtClean="0"/>
+              <a:t> q </a:t>
+            </a:r>
+            <a:r>
+              <a:rPr lang="en-US" baseline="0" dirty="0" err="1" smtClean="0"/>
+              <a:t>usamos</a:t>
+            </a:r>
+            <a:r>
+              <a:rPr lang="en-US" baseline="0" dirty="0" smtClean="0"/>
+              <a:t> </a:t>
+            </a:r>
+            <a:r>
+              <a:rPr lang="en-US" baseline="0" dirty="0" err="1" smtClean="0"/>
+              <a:t>gdocs</a:t>
+            </a:r>
+            <a:r>
+              <a:rPr lang="en-US" baseline="0" dirty="0" smtClean="0"/>
+              <a:t> y </a:t>
+            </a:r>
+            <a:r>
+              <a:rPr lang="en-US" baseline="0" dirty="0" err="1" smtClean="0"/>
+              <a:t>gspreadsheets</a:t>
+            </a:r>
+            <a:r>
+              <a:rPr lang="en-US" baseline="0" dirty="0" smtClean="0"/>
+              <a:t> </a:t>
+            </a:r>
+            <a:r>
+              <a:rPr lang="en-US" baseline="0" dirty="0" err="1" smtClean="0"/>
+              <a:t>para</a:t>
+            </a:r>
+            <a:r>
+              <a:rPr lang="en-US" baseline="0" dirty="0" smtClean="0"/>
+              <a:t> </a:t>
+            </a:r>
+            <a:r>
+              <a:rPr lang="en-US" baseline="0" dirty="0" err="1" smtClean="0"/>
+              <a:t>documentación</a:t>
+            </a:r>
+            <a:r>
+              <a:rPr lang="en-US" baseline="0" dirty="0" smtClean="0"/>
+              <a:t> </a:t>
+            </a:r>
+            <a:r>
+              <a:rPr lang="en-US" baseline="0" dirty="0" err="1" smtClean="0"/>
+              <a:t>interna</a:t>
+            </a:r>
+            <a:r>
+              <a:rPr lang="en-US" baseline="0" dirty="0" smtClean="0"/>
+              <a:t> del ET (</a:t>
+            </a:r>
+            <a:r>
+              <a:rPr lang="en-US" baseline="0" dirty="0" err="1" smtClean="0"/>
+              <a:t>tareas</a:t>
+            </a:r>
+            <a:r>
+              <a:rPr lang="en-US" baseline="0" dirty="0" smtClean="0"/>
+              <a:t> </a:t>
+            </a:r>
+            <a:r>
+              <a:rPr lang="en-US" baseline="0" dirty="0" err="1" smtClean="0"/>
+              <a:t>pendientes</a:t>
+            </a:r>
+            <a:r>
+              <a:rPr lang="en-US" baseline="0" dirty="0" smtClean="0"/>
+              <a:t>, etc)</a:t>
+            </a:r>
+            <a:endParaRPr lang="en-US" dirty="0" smtClean="0"/>
           </a:p>
         </p:txBody>
       </p:sp>
@@ -1194,7 +1493,63 @@
                 <a:spcPct val="0"/>
               </a:spcBef>
             </a:pPr>
-            <a:endParaRPr lang="en-US" smtClean="0"/>
+            <a:r>
+              <a:rPr lang="en-US" dirty="0" err="1" smtClean="0"/>
+              <a:t>Mencionamos</a:t>
+            </a:r>
+            <a:r>
+              <a:rPr lang="en-US" dirty="0" smtClean="0"/>
+              <a:t> </a:t>
+            </a:r>
+            <a:r>
+              <a:rPr lang="en-US" dirty="0" err="1" smtClean="0"/>
+              <a:t>las</a:t>
+            </a:r>
+            <a:r>
+              <a:rPr lang="en-US" baseline="0" dirty="0" smtClean="0"/>
+              <a:t> </a:t>
+            </a:r>
+            <a:r>
+              <a:rPr lang="en-US" baseline="0" dirty="0" err="1" smtClean="0"/>
+              <a:t>herramientas</a:t>
+            </a:r>
+            <a:r>
+              <a:rPr lang="en-US" baseline="0" dirty="0" smtClean="0"/>
+              <a:t> y </a:t>
+            </a:r>
+            <a:r>
+              <a:rPr lang="en-US" baseline="0" dirty="0" err="1" smtClean="0"/>
+              <a:t>tecnología</a:t>
+            </a:r>
+            <a:r>
+              <a:rPr lang="en-US" baseline="0" dirty="0" smtClean="0"/>
+              <a:t> </a:t>
+            </a:r>
+            <a:r>
+              <a:rPr lang="en-US" baseline="0" dirty="0" err="1" smtClean="0"/>
+              <a:t>utilizada</a:t>
+            </a:r>
+            <a:r>
+              <a:rPr lang="en-US" baseline="0" dirty="0" smtClean="0"/>
+              <a:t> </a:t>
+            </a:r>
+            <a:r>
+              <a:rPr lang="en-US" baseline="0" dirty="0" err="1" smtClean="0"/>
+              <a:t>para</a:t>
+            </a:r>
+            <a:r>
+              <a:rPr lang="en-US" baseline="0" dirty="0" smtClean="0"/>
+              <a:t> </a:t>
+            </a:r>
+            <a:r>
+              <a:rPr lang="en-US" baseline="0" dirty="0" err="1" smtClean="0"/>
+              <a:t>desarrollar</a:t>
+            </a:r>
+            <a:r>
+              <a:rPr lang="en-US" baseline="0" dirty="0" smtClean="0"/>
+              <a:t> la app</a:t>
+            </a:r>
+            <a:endParaRPr lang="en-US" dirty="0" smtClean="0"/>
           </a:p>
         </p:txBody>
       </p:sp>
@@ -1304,20 +1659,44 @@
           <a:lstStyle/>
           <a:p>
             <a:r>
-              <a:rPr lang="es-ES_tradnl" dirty="0" err="1" smtClean="0"/>
-              <a:t>Product</a:t>
-            </a:r>
-            <a:r>
-              <a:rPr lang="es-ES_tradnl" baseline="0" dirty="0" smtClean="0"/>
-              <a:t> </a:t>
-            </a:r>
-            <a:r>
-              <a:rPr lang="es-ES_tradnl" baseline="0" dirty="0" err="1" smtClean="0"/>
-              <a:t>BackLog</a:t>
-            </a:r>
-            <a:r>
-              <a:rPr lang="es-ES_tradnl" baseline="0" dirty="0" smtClean="0"/>
-              <a:t> es una lista de toda la funcionalidad deseada en el producto.</a:t>
+              <a:rPr lang="es-AR" dirty="0" smtClean="0"/>
+              <a:t>Explicamos el caso particular de trazabilidad </a:t>
+            </a:r>
+            <a:r>
+              <a:rPr lang="es-AR" baseline="0" dirty="0" smtClean="0"/>
+              <a:t>(partiendo de un US, vemos el </a:t>
+            </a:r>
+            <a:r>
+              <a:rPr lang="es-AR" baseline="0" dirty="0" err="1" smtClean="0"/>
+              <a:t>tag</a:t>
+            </a:r>
+            <a:r>
+              <a:rPr lang="es-AR" baseline="0" dirty="0" smtClean="0"/>
+              <a:t> en el </a:t>
+            </a:r>
+            <a:r>
+              <a:rPr lang="es-AR" baseline="0" dirty="0" err="1" smtClean="0"/>
+              <a:t>svn</a:t>
+            </a:r>
+            <a:r>
+              <a:rPr lang="es-AR" baseline="0" dirty="0" smtClean="0"/>
+              <a:t> q corresponde al </a:t>
+            </a:r>
+            <a:r>
+              <a:rPr lang="es-AR" baseline="0" dirty="0" err="1" smtClean="0"/>
+              <a:t>nro</a:t>
+            </a:r>
+            <a:r>
+              <a:rPr lang="es-AR" baseline="0" dirty="0" smtClean="0"/>
+              <a:t> de US, los </a:t>
+            </a:r>
+            <a:r>
+              <a:rPr lang="es-AR" baseline="0" dirty="0" err="1" smtClean="0"/>
+              <a:t>sources</a:t>
+            </a:r>
+            <a:r>
+              <a:rPr lang="es-AR" baseline="0" dirty="0" smtClean="0"/>
+              <a:t> modificados y nuevos)</a:t>
             </a:r>
             <a:endParaRPr lang="es-AR" dirty="0"/>
           </a:p>
@@ -1346,7 +1725,7 @@
               <a:pPr>
                 <a:defRPr/>
               </a:pPr>
-              <a:t>6</a:t>
+              <a:t>5</a:t>
             </a:fld>
             <a:endParaRPr lang="es-ES"/>
           </a:p>
@@ -1407,20 +1786,28 @@
           <a:lstStyle/>
           <a:p>
             <a:r>
-              <a:rPr lang="es-ES_tradnl" dirty="0" err="1" smtClean="0"/>
-              <a:t>Product</a:t>
-            </a:r>
-            <a:r>
-              <a:rPr lang="es-ES_tradnl" baseline="0" dirty="0" smtClean="0"/>
-              <a:t> </a:t>
-            </a:r>
-            <a:r>
-              <a:rPr lang="es-ES_tradnl" baseline="0" dirty="0" err="1" smtClean="0"/>
-              <a:t>BackLog</a:t>
-            </a:r>
-            <a:r>
-              <a:rPr lang="es-ES_tradnl" baseline="0" dirty="0" smtClean="0"/>
-              <a:t> es una lista de toda la funcionalidad deseada en el producto.</a:t>
+              <a:rPr lang="es-AR" dirty="0" smtClean="0"/>
+              <a:t>Explicamos el caso particular de trazabilidad </a:t>
+            </a:r>
+            <a:r>
+              <a:rPr lang="es-AR" baseline="0" dirty="0" smtClean="0"/>
+              <a:t>(partiendo de un US, vemos los </a:t>
+            </a:r>
+            <a:r>
+              <a:rPr lang="es-AR" baseline="0" dirty="0" err="1" smtClean="0"/>
+              <a:t>UATs</a:t>
+            </a:r>
+            <a:r>
+              <a:rPr lang="es-AR" baseline="0" dirty="0" smtClean="0"/>
+              <a:t> correspondientes, y los </a:t>
+            </a:r>
+            <a:r>
+              <a:rPr lang="es-AR" baseline="0" dirty="0" err="1" smtClean="0"/>
+              <a:t>bugs</a:t>
+            </a:r>
+            <a:r>
+              <a:rPr lang="es-AR" baseline="0" dirty="0" smtClean="0"/>
+              <a:t> existentes).</a:t>
             </a:r>
             <a:endParaRPr lang="es-AR" dirty="0"/>
           </a:p>
@@ -1449,7 +1836,7 @@
               <a:pPr>
                 <a:defRPr/>
               </a:pPr>
-              <a:t>7</a:t>
+              <a:t>6</a:t>
             </a:fld>
             <a:endParaRPr lang="es-ES"/>
           </a:p>
@@ -1511,15 +1898,7 @@
           <a:p>
             <a:r>
               <a:rPr lang="es-ES_tradnl" dirty="0" smtClean="0"/>
-              <a:t>Los </a:t>
-            </a:r>
-            <a:r>
-              <a:rPr lang="es-ES_tradnl" dirty="0" err="1" smtClean="0"/>
-              <a:t>requirimentos</a:t>
-            </a:r>
-            <a:r>
-              <a:rPr lang="es-ES_tradnl" baseline="0" dirty="0" smtClean="0"/>
-              <a:t> del sistema quedarán representados por los casos de uso.</a:t>
+              <a:t>Si dejamos este BD chart, hay q explicarlo muy bien!!!</a:t>
             </a:r>
             <a:endParaRPr lang="es-AR" dirty="0"/>
           </a:p>
@@ -1548,7 +1927,7 @@
               <a:pPr>
                 <a:defRPr/>
               </a:pPr>
-              <a:t>8</a:t>
+              <a:t>7</a:t>
             </a:fld>
             <a:endParaRPr lang="es-ES"/>
           </a:p>
@@ -1608,139 +1987,6 @@
           </a:bodyPr>
           <a:lstStyle/>
           <a:p>
-            <a:pPr marL="171450" indent="-171450">
-              <a:buFont typeface="Arial" pitchFamily="34" charset="0"/>
-              <a:buChar char="•"/>
-            </a:pPr>
-            <a:r>
-              <a:rPr lang="es-ES_tradnl" dirty="0" smtClean="0"/>
-              <a:t>Para controlar el avance del proyecto decidimos utilizar</a:t>
-            </a:r>
-            <a:r>
-              <a:rPr lang="es-ES_tradnl" baseline="0" dirty="0" smtClean="0"/>
-              <a:t> el indicador funcionalidad completa y complementarlo con el </a:t>
-            </a:r>
-            <a:r>
-              <a:rPr lang="es-ES_tradnl" baseline="0" dirty="0" err="1" smtClean="0"/>
-              <a:t>burndown</a:t>
-            </a:r>
-            <a:r>
-              <a:rPr lang="es-ES_tradnl" baseline="0" dirty="0" smtClean="0"/>
-              <a:t> chart ya que nos permiten tener evidencia física del avance real del proyecto. </a:t>
-            </a:r>
-            <a:r>
-              <a:rPr lang="es-ES_tradnl" dirty="0" smtClean="0"/>
-              <a:t>Definimos</a:t>
-            </a:r>
-            <a:r>
-              <a:rPr lang="es-ES_tradnl" baseline="0" dirty="0" smtClean="0"/>
-              <a:t> como </a:t>
-            </a:r>
-            <a:r>
-              <a:rPr lang="es-ES_tradnl" dirty="0" smtClean="0"/>
-              <a:t>funcionalidad </a:t>
-            </a:r>
-            <a:r>
-              <a:rPr lang="es-ES_tradnl" baseline="0" dirty="0" smtClean="0"/>
-              <a:t>completa al producto desarrollado, probado y estabilizado (sin defectos críticos).</a:t>
-            </a:r>
-          </a:p>
-          <a:p>
-            <a:pPr marL="171450" indent="-171450">
-              <a:buFont typeface="Arial" pitchFamily="34" charset="0"/>
-              <a:buChar char="•"/>
-            </a:pPr>
-            <a:r>
-              <a:rPr lang="es-ES_tradnl" baseline="0" dirty="0" smtClean="0"/>
-              <a:t>Cómo métrica de calidad decidimos utilizar evolución </a:t>
-            </a:r>
-            <a:r>
-              <a:rPr lang="es-ES_tradnl" baseline="0" smtClean="0"/>
-              <a:t>de la </a:t>
-            </a:r>
-            <a:r>
-              <a:rPr lang="es-ES_tradnl" baseline="0" dirty="0" smtClean="0"/>
-              <a:t>pruebas para medir los defectos, cuantos aparecen y cuantos </a:t>
-            </a:r>
-            <a:r>
-              <a:rPr lang="es-ES_tradnl" baseline="0" smtClean="0"/>
-              <a:t>se cierran por día.</a:t>
-            </a:r>
-            <a:endParaRPr lang="es-ES_tradnl" baseline="0" dirty="0" smtClean="0"/>
-          </a:p>
-          <a:p>
-            <a:pPr marL="171450" indent="-171450">
-              <a:buFont typeface="Arial" pitchFamily="34" charset="0"/>
-              <a:buChar char="•"/>
-            </a:pPr>
-            <a:r>
-              <a:rPr lang="es-ES_tradnl" baseline="0" dirty="0" smtClean="0"/>
-              <a:t>Para la gestión de riesgos utilizaremos una planilla de </a:t>
-            </a:r>
-            <a:r>
-              <a:rPr lang="es-ES_tradnl" baseline="0" dirty="0" err="1" smtClean="0"/>
-              <a:t>google</a:t>
-            </a:r>
-            <a:r>
-              <a:rPr lang="es-ES_tradnl" baseline="0" dirty="0" smtClean="0"/>
-              <a:t> con los riesgos de mayor exposición especificando: la condición que se debe cumplir para que el riesgo se transforme en problema, la consecuencia de que ocurra, la probabilidad de ocurrencia, el impacto, la exposición, el plan de mitigación y el plan de contingencia (si se considera necesario).</a:t>
-            </a:r>
-          </a:p>
-          <a:p>
-            <a:pPr marL="171450" indent="-171450">
-              <a:buFont typeface="Arial" pitchFamily="34" charset="0"/>
-              <a:buChar char="•"/>
-            </a:pPr>
-            <a:r>
-              <a:rPr lang="es-AR" dirty="0" smtClean="0"/>
-              <a:t>Para el seguimiento de bugs utilizaremos la herramienta que trae incorporada el repositorio de </a:t>
-            </a:r>
-            <a:r>
-              <a:rPr lang="es-AR" dirty="0" err="1" smtClean="0"/>
-              <a:t>google</a:t>
-            </a:r>
-            <a:r>
-              <a:rPr lang="es-AR" dirty="0" smtClean="0"/>
-              <a:t> (</a:t>
-            </a:r>
-            <a:r>
-              <a:rPr lang="es-AR" dirty="0" err="1" smtClean="0"/>
-              <a:t>issue</a:t>
-            </a:r>
-            <a:r>
-              <a:rPr lang="es-AR" dirty="0" smtClean="0"/>
-              <a:t> </a:t>
-            </a:r>
-            <a:r>
-              <a:rPr lang="es-AR" dirty="0" err="1" smtClean="0"/>
-              <a:t>tracker</a:t>
-            </a:r>
-            <a:r>
-              <a:rPr lang="es-AR" dirty="0" smtClean="0"/>
-              <a:t>).</a:t>
-            </a:r>
-          </a:p>
-          <a:p>
-            <a:pPr marL="171450" indent="-171450">
-              <a:buFont typeface="Arial" pitchFamily="34" charset="0"/>
-              <a:buChar char="•"/>
-            </a:pPr>
-            <a:r>
-              <a:rPr lang="es-AR" dirty="0" smtClean="0"/>
-              <a:t>Para la gestión de costos utilizaremos</a:t>
-            </a:r>
-            <a:r>
-              <a:rPr lang="es-AR" baseline="0" dirty="0" smtClean="0"/>
-              <a:t> una planilla de </a:t>
-            </a:r>
-            <a:r>
-              <a:rPr lang="es-AR" baseline="0" dirty="0" err="1" smtClean="0"/>
-              <a:t>google</a:t>
-            </a:r>
-            <a:r>
-              <a:rPr lang="es-AR" baseline="0" dirty="0" smtClean="0"/>
-              <a:t> especificando la cantidad de horas hombre por el valor de la misma.</a:t>
-            </a:r>
             <a:endParaRPr lang="es-AR" dirty="0"/>
           </a:p>
         </p:txBody>
@@ -1768,7 +2014,7 @@
               <a:pPr>
                 <a:defRPr/>
               </a:pPr>
-              <a:t>9</a:t>
+              <a:t>8</a:t>
             </a:fld>
             <a:endParaRPr lang="es-ES"/>
           </a:p>
@@ -1828,51 +2074,7 @@
           </a:bodyPr>
           <a:lstStyle/>
           <a:p>
-            <a:pPr marL="171450" indent="-171450">
-              <a:buFont typeface="Arial" pitchFamily="34" charset="0"/>
-              <a:buChar char="•"/>
-            </a:pPr>
-            <a:r>
-              <a:rPr lang="es-ES_tradnl" dirty="0" smtClean="0"/>
-              <a:t>Como</a:t>
-            </a:r>
-            <a:r>
-              <a:rPr lang="es-ES_tradnl" baseline="0" dirty="0" smtClean="0"/>
-              <a:t> plan y estrategia de despliegue realizaremos un diagrama de despliegue utilizando la herramienta EA que modele el hardware necesario junto con los componentes del sistema y las relaciones entre los mismos. También se realizará un</a:t>
-            </a:r>
-            <a:r>
-              <a:rPr lang="es-ES_tradnl" dirty="0" smtClean="0"/>
-              <a:t> documento de despliegue</a:t>
-            </a:r>
-            <a:r>
-              <a:rPr lang="es-ES_tradnl" baseline="0" dirty="0" smtClean="0"/>
-              <a:t> que especificará el hardware y el software necesario, así como los pasos a seguir, para la puesta en marcha del sistema.</a:t>
-            </a:r>
-          </a:p>
-          <a:p>
-            <a:pPr marL="171450" indent="-171450">
-              <a:buFont typeface="Arial" pitchFamily="34" charset="0"/>
-              <a:buChar char="•"/>
-            </a:pPr>
-            <a:r>
-              <a:rPr lang="es-ES_tradnl" baseline="0" dirty="0" smtClean="0"/>
-              <a:t>Para la aceptación de las entregas se realizarán pruebas de aceptación </a:t>
-            </a:r>
-            <a:r>
-              <a:rPr lang="es-ES_tradnl" baseline="0" dirty="0" err="1" smtClean="0"/>
-              <a:t>UATs</a:t>
-            </a:r>
-            <a:r>
-              <a:rPr lang="es-ES_tradnl" baseline="0" dirty="0" smtClean="0"/>
-              <a:t> previamente acordadas con el cliente.</a:t>
-            </a:r>
-          </a:p>
-          <a:p>
-            <a:pPr marL="171450" indent="-171450">
-              <a:buFont typeface="Arial" pitchFamily="34" charset="0"/>
-              <a:buChar char="•"/>
-            </a:pPr>
-            <a:endParaRPr lang="es-ES_tradnl" baseline="0" dirty="0" smtClean="0"/>
+            <a:endParaRPr lang="es-AR" dirty="0"/>
           </a:p>
         </p:txBody>
       </p:sp>
@@ -1899,7 +2101,7 @@
               <a:pPr>
                 <a:defRPr/>
               </a:pPr>
-              <a:t>10</a:t>
+              <a:t>9</a:t>
             </a:fld>
             <a:endParaRPr lang="es-ES"/>
           </a:p>
@@ -1961,49 +2163,9 @@
           <a:p>
             <a:pPr marL="171450" indent="-171450">
               <a:buFont typeface="Arial" pitchFamily="34" charset="0"/>
-              <a:buChar char="•"/>
+              <a:buNone/>
             </a:pPr>
-            <a:r>
-              <a:rPr lang="es-ES_tradnl" dirty="0" smtClean="0"/>
-              <a:t>Como</a:t>
-            </a:r>
-            <a:r>
-              <a:rPr lang="es-ES_tradnl" baseline="0" dirty="0" smtClean="0"/>
-              <a:t> plan y estrategia de despliegue realizaremos un diagrama de despliegue utilizando la herramienta EA que modele el hardware necesario junto con los componentes del sistema y las relaciones entre los mismos. También se realizará un</a:t>
-            </a:r>
-            <a:r>
-              <a:rPr lang="es-ES_tradnl" dirty="0" smtClean="0"/>
-              <a:t> documento de despliegue</a:t>
-            </a:r>
-            <a:r>
-              <a:rPr lang="es-ES_tradnl" baseline="0" dirty="0" smtClean="0"/>
-              <a:t> que especificará el hardware y el software necesario, así como los pasos a seguir, para la puesta en marcha del sistema.</a:t>
-            </a:r>
-          </a:p>
-          <a:p>
-            <a:pPr marL="171450" indent="-171450">
-              <a:buFont typeface="Arial" pitchFamily="34" charset="0"/>
-              <a:buChar char="•"/>
-            </a:pPr>
-            <a:r>
-              <a:rPr lang="es-ES_tradnl" baseline="0" dirty="0" smtClean="0"/>
-              <a:t>Para la aceptación de las entregas se realizarán pruebas de aceptación </a:t>
-            </a:r>
-            <a:r>
-              <a:rPr lang="es-ES_tradnl" baseline="0" dirty="0" err="1" smtClean="0"/>
-              <a:t>UATs</a:t>
-            </a:r>
-            <a:r>
-              <a:rPr lang="es-ES_tradnl" baseline="0" dirty="0" smtClean="0"/>
-              <a:t> previamente acordadas con el cliente.</a:t>
-            </a:r>
-          </a:p>
-          <a:p>
-            <a:pPr marL="171450" indent="-171450">
-              <a:buFont typeface="Arial" pitchFamily="34" charset="0"/>
-              <a:buChar char="•"/>
-            </a:pPr>
-            <a:endParaRPr lang="es-ES_tradnl" baseline="0" dirty="0" smtClean="0"/>
+            <a:endParaRPr lang="es-AR" dirty="0"/>
           </a:p>
         </p:txBody>
       </p:sp>
@@ -2030,7 +2192,7 @@
               <a:pPr>
                 <a:defRPr/>
               </a:pPr>
-              <a:t>11</a:t>
+              <a:t>10</a:t>
             </a:fld>
             <a:endParaRPr lang="es-ES"/>
           </a:p>
@@ -2460,7 +2622,7 @@
               <a:pPr>
                 <a:defRPr/>
               </a:pPr>
-              <a:t>21/11/2010</a:t>
+              <a:t>27/11/2010</a:t>
             </a:fld>
             <a:endParaRPr lang="es-ES"/>
           </a:p>
@@ -2652,7 +2814,7 @@
               <a:pPr>
                 <a:defRPr/>
               </a:pPr>
-              <a:t>21/11/2010</a:t>
+              <a:t>27/11/2010</a:t>
             </a:fld>
             <a:endParaRPr lang="es-ES"/>
           </a:p>
@@ -2854,7 +3016,7 @@
               <a:pPr>
                 <a:defRPr/>
               </a:pPr>
-              <a:t>21/11/2010</a:t>
+              <a:t>27/11/2010</a:t>
             </a:fld>
             <a:endParaRPr lang="es-ES"/>
           </a:p>
@@ -3050,7 +3212,7 @@
               <a:pPr>
                 <a:defRPr/>
               </a:pPr>
-              <a:t>21/11/2010</a:t>
+              <a:t>27/11/2010</a:t>
             </a:fld>
             <a:endParaRPr lang="es-ES"/>
           </a:p>
@@ -3554,7 +3716,7 @@
               <a:pPr>
                 <a:defRPr/>
               </a:pPr>
-              <a:t>21/11/2010</a:t>
+              <a:t>27/11/2010</a:t>
             </a:fld>
             <a:endParaRPr lang="es-ES"/>
           </a:p>
@@ -3845,7 +4007,7 @@
               <a:pPr>
                 <a:defRPr/>
               </a:pPr>
-              <a:t>21/11/2010</a:t>
+              <a:t>27/11/2010</a:t>
             </a:fld>
             <a:endParaRPr lang="es-ES"/>
           </a:p>
@@ -4246,7 +4408,7 @@
               <a:pPr>
                 <a:defRPr/>
               </a:pPr>
-              <a:t>21/11/2010</a:t>
+              <a:t>27/11/2010</a:t>
             </a:fld>
             <a:endParaRPr lang="es-ES"/>
           </a:p>
@@ -4395,7 +4557,7 @@
               <a:pPr>
                 <a:defRPr/>
               </a:pPr>
-              <a:t>21/11/2010</a:t>
+              <a:t>27/11/2010</a:t>
             </a:fld>
             <a:endParaRPr lang="es-ES"/>
           </a:p>
@@ -4512,7 +4674,7 @@
               <a:pPr>
                 <a:defRPr/>
               </a:pPr>
-              <a:t>21/11/2010</a:t>
+              <a:t>27/11/2010</a:t>
             </a:fld>
             <a:endParaRPr lang="es-ES"/>
           </a:p>
@@ -4788,7 +4950,7 @@
               <a:pPr>
                 <a:defRPr/>
               </a:pPr>
-              <a:t>21/11/2010</a:t>
+              <a:t>27/11/2010</a:t>
             </a:fld>
             <a:endParaRPr lang="es-ES"/>
           </a:p>
@@ -5072,7 +5234,7 @@
               <a:pPr>
                 <a:defRPr/>
               </a:pPr>
-              <a:t>21/11/2010</a:t>
+              <a:t>27/11/2010</a:t>
             </a:fld>
             <a:endParaRPr lang="es-ES"/>
           </a:p>
@@ -5547,7 +5709,7 @@
               <a:pPr>
                 <a:defRPr/>
               </a:pPr>
-              <a:t>21/11/2010</a:t>
+              <a:t>27/11/2010</a:t>
             </a:fld>
             <a:endParaRPr lang="es-ES"/>
           </a:p>
@@ -6298,186 +6460,9 @@
                   </a:glow>
                 </a:effectLst>
               </a:rPr>
-              <a:t>Lecciones Aprendidas</a:t>
+              <a:t>Cambios en el Alcance</a:t>
             </a:r>
             <a:endParaRPr lang="es-ES" sz="4000" dirty="0"/>
-          </a:p>
-        </p:txBody>
-      </p:sp>
-      <p:sp>
-        <p:nvSpPr>
-          <p:cNvPr id="29698" name="2 Marcador de contenido"/>
-          <p:cNvSpPr>
-            <a:spLocks noGrp="1"/>
-          </p:cNvSpPr>
-          <p:nvPr>
-            <p:ph idx="1"/>
-          </p:nvPr>
-        </p:nvSpPr>
-        <p:spPr>
-          <a:xfrm>
-            <a:off x="344760" y="1700808"/>
-            <a:ext cx="8475712" cy="4824536"/>
-          </a:xfrm>
-        </p:spPr>
-        <p:txBody>
-          <a:bodyPr/>
-          <a:lstStyle/>
-          <a:p>
-            <a:pPr>
-              <a:buNone/>
-            </a:pPr>
-            <a:r>
-              <a:rPr lang="es-AR" sz="1800" b="1" u="sng" dirty="0" smtClean="0"/>
-              <a:t>Sprint 1</a:t>
-            </a:r>
-            <a:endParaRPr lang="es-AR" sz="1800" u="sng" dirty="0" smtClean="0"/>
-          </a:p>
-          <a:p>
-            <a:r>
-              <a:rPr lang="es-AR" sz="1800" u="sng" dirty="0" smtClean="0"/>
-              <a:t>Aceptación </a:t>
-            </a:r>
-            <a:r>
-              <a:rPr lang="es-AR" sz="1800" u="sng" dirty="0" smtClean="0"/>
-              <a:t>de </a:t>
-            </a:r>
-            <a:r>
-              <a:rPr lang="es-AR" sz="1800" u="sng" dirty="0" err="1" smtClean="0"/>
-              <a:t>UATs</a:t>
-            </a:r>
-            <a:r>
-              <a:rPr lang="es-AR" sz="1800" u="sng" dirty="0" smtClean="0"/>
-              <a:t>:</a:t>
-            </a:r>
-            <a:r>
-              <a:rPr lang="es-AR" sz="1800" dirty="0" smtClean="0"/>
-              <a:t> Buscar con anticipación la aceptación de los </a:t>
-            </a:r>
-            <a:r>
-              <a:rPr lang="es-AR" sz="1800" dirty="0" err="1" smtClean="0"/>
-              <a:t>UATs</a:t>
-            </a:r>
-            <a:r>
-              <a:rPr lang="es-AR" sz="1800" dirty="0" smtClean="0"/>
-              <a:t> antes de cada Sprint </a:t>
-            </a:r>
-            <a:r>
-              <a:rPr lang="es-AR" sz="1800" dirty="0" err="1" smtClean="0"/>
-              <a:t>Review</a:t>
-            </a:r>
-            <a:r>
-              <a:rPr lang="es-AR" sz="1800" dirty="0" smtClean="0"/>
-              <a:t> Meeting</a:t>
-            </a:r>
-          </a:p>
-          <a:p>
-            <a:pPr>
-              <a:buNone/>
-            </a:pPr>
-            <a:endParaRPr lang="es-AR" sz="1800" b="1" dirty="0" smtClean="0"/>
-          </a:p>
-          <a:p>
-            <a:pPr>
-              <a:buNone/>
-            </a:pPr>
-            <a:endParaRPr lang="es-AR" sz="1800" b="1" dirty="0" smtClean="0"/>
-          </a:p>
-          <a:p>
-            <a:pPr>
-              <a:buNone/>
-            </a:pPr>
-            <a:r>
-              <a:rPr lang="es-AR" sz="1800" b="1" u="sng" dirty="0" smtClean="0"/>
-              <a:t>Sprint 2</a:t>
-            </a:r>
-          </a:p>
-          <a:p>
-            <a:r>
-              <a:rPr lang="es-AR" sz="1800" u="sng" dirty="0" err="1" smtClean="0"/>
-              <a:t>Contradiccion</a:t>
-            </a:r>
-            <a:r>
-              <a:rPr lang="es-AR" sz="1800" u="sng" dirty="0" smtClean="0"/>
-              <a:t> entre </a:t>
-            </a:r>
-            <a:r>
-              <a:rPr lang="es-AR" sz="1800" u="sng" dirty="0" err="1" smtClean="0"/>
-              <a:t>Earned</a:t>
-            </a:r>
-            <a:r>
-              <a:rPr lang="es-AR" sz="1800" u="sng" dirty="0" smtClean="0"/>
-              <a:t> </a:t>
-            </a:r>
-            <a:r>
-              <a:rPr lang="es-AR" sz="1800" u="sng" dirty="0" err="1" smtClean="0"/>
-              <a:t>Value</a:t>
-            </a:r>
-            <a:r>
-              <a:rPr lang="es-AR" sz="1800" u="sng" dirty="0" smtClean="0"/>
-              <a:t> y </a:t>
-            </a:r>
-            <a:r>
-              <a:rPr lang="es-AR" sz="1800" u="sng" dirty="0" err="1" smtClean="0"/>
-              <a:t>Burndown</a:t>
-            </a:r>
-            <a:r>
-              <a:rPr lang="es-AR" sz="1800" u="sng" dirty="0" smtClean="0"/>
-              <a:t> Chart:</a:t>
-            </a:r>
-            <a:r>
-              <a:rPr lang="es-AR" sz="1800" dirty="0" smtClean="0"/>
-              <a:t> Mostramos en el BC que estamos adelantados con el calendario y el </a:t>
-            </a:r>
-            <a:r>
-              <a:rPr lang="es-AR" sz="1800" dirty="0" err="1" smtClean="0"/>
-              <a:t>Earned</a:t>
-            </a:r>
-            <a:r>
-              <a:rPr lang="es-AR" sz="1800" dirty="0" smtClean="0"/>
-              <a:t> </a:t>
-            </a:r>
-            <a:r>
-              <a:rPr lang="es-AR" sz="1800" dirty="0" err="1" smtClean="0"/>
-              <a:t>Value</a:t>
-            </a:r>
-            <a:r>
-              <a:rPr lang="es-AR" sz="1800" dirty="0" smtClean="0"/>
-              <a:t> muestra que estamos atrasados (que la construcción nos llevó mas tiempo de lo estimado</a:t>
-            </a:r>
-            <a:r>
-              <a:rPr lang="es-AR" sz="1800" dirty="0" smtClean="0"/>
-              <a:t>)</a:t>
-            </a:r>
-          </a:p>
-          <a:p>
-            <a:pPr>
-              <a:buNone/>
-            </a:pPr>
-            <a:endParaRPr lang="es-AR" sz="1800" dirty="0" smtClean="0"/>
-          </a:p>
-          <a:p>
-            <a:r>
-              <a:rPr lang="es-AR" sz="1800" u="sng" dirty="0" smtClean="0"/>
-              <a:t>Tareas en planificación de cada Sprint:</a:t>
-            </a:r>
-            <a:r>
-              <a:rPr lang="es-AR" sz="1800" dirty="0" smtClean="0"/>
-              <a:t> Explotar todas y cada una de las tareas inmediatamente luego de la Sprint </a:t>
-            </a:r>
-            <a:r>
-              <a:rPr lang="es-AR" sz="1800" dirty="0" err="1" smtClean="0"/>
-              <a:t>Planning</a:t>
-            </a:r>
-            <a:r>
-              <a:rPr lang="es-AR" sz="1800" dirty="0" smtClean="0"/>
-              <a:t> </a:t>
-            </a:r>
-            <a:r>
-              <a:rPr lang="es-AR" sz="1800" dirty="0" smtClean="0"/>
-              <a:t>Meeting</a:t>
-            </a:r>
-            <a:endParaRPr lang="es-AR" sz="1800" dirty="0" smtClean="0"/>
           </a:p>
         </p:txBody>
       </p:sp>
@@ -6665,14 +6650,13 @@
           <p:cNvPr id="25" name="24 Conector recto"/>
           <p:cNvCxnSpPr>
             <a:stCxn id="29" idx="3"/>
-            <a:endCxn id="30" idx="1"/>
           </p:cNvCxnSpPr>
           <p:nvPr/>
         </p:nvCxnSpPr>
         <p:spPr>
           <a:xfrm>
             <a:off x="2555776" y="548680"/>
-            <a:ext cx="576064" cy="0"/>
+            <a:ext cx="1440160" cy="0"/>
           </a:xfrm>
           <a:prstGeom prst="line">
             <a:avLst/>
@@ -6697,14 +6681,14 @@
         <p:nvCxnSpPr>
           <p:cNvPr id="26" name="25 Conector recto"/>
           <p:cNvCxnSpPr>
-            <a:stCxn id="30" idx="3"/>
+            <a:endCxn id="31" idx="1"/>
           </p:cNvCxnSpPr>
           <p:nvPr/>
         </p:nvCxnSpPr>
         <p:spPr>
           <a:xfrm>
-            <a:off x="3419872" y="548680"/>
-            <a:ext cx="1440160" cy="0"/>
+            <a:off x="4283968" y="548680"/>
+            <a:ext cx="576064" cy="0"/>
           </a:xfrm>
           <a:prstGeom prst="line">
             <a:avLst/>
@@ -6729,6 +6713,7 @@
         <p:nvCxnSpPr>
           <p:cNvPr id="27" name="26 Conector recto"/>
           <p:cNvCxnSpPr>
+            <a:stCxn id="31" idx="3"/>
             <a:endCxn id="32" idx="1"/>
           </p:cNvCxnSpPr>
           <p:nvPr/>
@@ -6837,13 +6822,13 @@
       </p:sp>
       <p:sp>
         <p:nvSpPr>
-          <p:cNvPr id="30" name="29 Rectángulo redondeado"/>
+          <p:cNvPr id="31" name="30 Rectángulo redondeado"/>
           <p:cNvSpPr/>
           <p:nvPr/>
         </p:nvSpPr>
         <p:spPr>
           <a:xfrm>
-            <a:off x="3131840" y="404664"/>
+            <a:off x="4860032" y="404664"/>
             <a:ext cx="288032" cy="288032"/>
           </a:xfrm>
           <a:prstGeom prst="roundRect">
@@ -6921,7 +6906,7 @@
         </p:nvSpPr>
         <p:spPr>
           <a:xfrm>
-            <a:off x="4860032" y="404664"/>
+            <a:off x="3995936" y="404664"/>
             <a:ext cx="288032" cy="288032"/>
           </a:xfrm>
           <a:prstGeom prst="roundRect">
@@ -6967,7 +6952,7 @@
         </p:nvSpPr>
         <p:spPr>
           <a:xfrm>
-            <a:off x="3995936" y="404664"/>
+            <a:off x="3131840" y="404664"/>
             <a:ext cx="288032" cy="288032"/>
           </a:xfrm>
           <a:prstGeom prst="roundRect">
@@ -6995,6 +6980,95 @@
           <a:p>
             <a:pPr algn="ctr"/>
             <a:endParaRPr lang="es-AR" sz="1000" b="1" dirty="0" smtClean="0"/>
+          </a:p>
+        </p:txBody>
+      </p:sp>
+      <p:pic>
+        <p:nvPicPr>
+          <p:cNvPr id="18" name="Picture 4" descr="https://www1.v1host.com/Team152/cached.img/3a61bad23ca14ec2b5ed8a2a9a0e47ef.png"/>
+          <p:cNvPicPr>
+            <a:picLocks noChangeAspect="1" noChangeArrowheads="1"/>
+          </p:cNvPicPr>
+          <p:nvPr/>
+        </p:nvPicPr>
+        <p:blipFill>
+          <a:blip r:embed="rId4" cstate="print"/>
+          <a:srcRect/>
+          <a:stretch>
+            <a:fillRect/>
+          </a:stretch>
+        </p:blipFill>
+        <p:spPr bwMode="auto">
+          <a:xfrm>
+            <a:off x="2601416" y="2595331"/>
+            <a:ext cx="3842792" cy="2561861"/>
+          </a:xfrm>
+          <a:prstGeom prst="rect">
+            <a:avLst/>
+          </a:prstGeom>
+          <a:noFill/>
+          <a:ln w="76200">
+            <a:solidFill>
+              <a:srgbClr val="FF0000"/>
+            </a:solidFill>
+          </a:ln>
+        </p:spPr>
+      </p:pic>
+      <p:sp>
+        <p:nvSpPr>
+          <p:cNvPr id="19" name="18 CuadroTexto"/>
+          <p:cNvSpPr txBox="1"/>
+          <p:nvPr/>
+        </p:nvSpPr>
+        <p:spPr>
+          <a:xfrm>
+            <a:off x="1475656" y="2924944"/>
+            <a:ext cx="648072" cy="1631216"/>
+          </a:xfrm>
+          <a:prstGeom prst="rect">
+            <a:avLst/>
+          </a:prstGeom>
+          <a:noFill/>
+        </p:spPr>
+        <p:txBody>
+          <a:bodyPr wrap="square" rtlCol="0">
+            <a:spAutoFit/>
+          </a:bodyPr>
+          <a:lstStyle/>
+          <a:p>
+            <a:r>
+              <a:rPr lang="es-AR" sz="10000" b="1" dirty="0" smtClean="0"/>
+              <a:t>¿</a:t>
+            </a:r>
+          </a:p>
+        </p:txBody>
+      </p:sp>
+      <p:sp>
+        <p:nvSpPr>
+          <p:cNvPr id="30" name="29 CuadroTexto"/>
+          <p:cNvSpPr txBox="1"/>
+          <p:nvPr/>
+        </p:nvSpPr>
+        <p:spPr>
+          <a:xfrm>
+            <a:off x="6588224" y="2924944"/>
+            <a:ext cx="648072" cy="1631216"/>
+          </a:xfrm>
+          <a:prstGeom prst="rect">
+            <a:avLst/>
+          </a:prstGeom>
+          <a:noFill/>
+        </p:spPr>
+        <p:txBody>
+          <a:bodyPr wrap="square" rtlCol="0">
+            <a:spAutoFit/>
+          </a:bodyPr>
+          <a:lstStyle/>
+          <a:p>
+            <a:r>
+              <a:rPr lang="es-AR" sz="10000" b="1" dirty="0" smtClean="0"/>
+              <a:t>?</a:t>
+            </a:r>
           </a:p>
         </p:txBody>
       </p:sp>
@@ -7088,7 +7162,7 @@
         <p:spPr>
           <a:xfrm>
             <a:off x="344760" y="1700808"/>
-            <a:ext cx="8475712" cy="4525963"/>
+            <a:ext cx="8475712" cy="4824536"/>
           </a:xfrm>
         </p:spPr>
         <p:txBody>
@@ -7100,64 +7174,18 @@
             </a:pPr>
             <a:r>
               <a:rPr lang="es-AR" sz="1800" b="1" u="sng" dirty="0" smtClean="0"/>
-              <a:t>Sprint 3</a:t>
+              <a:t>Sprint 1</a:t>
             </a:r>
             <a:endParaRPr lang="es-AR" sz="1800" u="sng" dirty="0" smtClean="0"/>
           </a:p>
           <a:p>
             <a:r>
               <a:rPr lang="es-AR" sz="1800" u="sng" dirty="0" smtClean="0"/>
-              <a:t>Inconsistencias:</a:t>
-            </a:r>
-            <a:r>
-              <a:rPr lang="es-AR" sz="1800" dirty="0" smtClean="0"/>
-              <a:t> Inconsistencias en la información entre la minuta de </a:t>
-            </a:r>
-            <a:r>
-              <a:rPr lang="es-AR" sz="1800" dirty="0" smtClean="0"/>
-              <a:t>reunión </a:t>
-            </a:r>
-            <a:r>
-              <a:rPr lang="es-AR" sz="1800" dirty="0" smtClean="0"/>
-              <a:t>y el reporte de avance</a:t>
-            </a:r>
-          </a:p>
-          <a:p>
-            <a:endParaRPr lang="es-AR" sz="1800" u="sng" dirty="0" smtClean="0"/>
-          </a:p>
-          <a:p>
+              <a:t>Aceptación de </a:t>
+            </a:r>
             <a:r>
               <a:rPr lang="es-AR" sz="1800" u="sng" dirty="0" err="1" smtClean="0"/>
-              <a:t>Burndown</a:t>
-            </a:r>
-            <a:r>
-              <a:rPr lang="es-AR" sz="1800" u="sng" dirty="0" smtClean="0"/>
-              <a:t> </a:t>
-            </a:r>
-            <a:r>
-              <a:rPr lang="es-AR" sz="1800" u="sng" dirty="0" smtClean="0"/>
-              <a:t>Chart:</a:t>
-            </a:r>
-            <a:r>
-              <a:rPr lang="es-AR" sz="1800" dirty="0" smtClean="0"/>
-              <a:t> No </a:t>
-            </a:r>
-            <a:r>
-              <a:rPr lang="es-AR" sz="1800" dirty="0" smtClean="0"/>
-              <a:t>cerrarlo si </a:t>
-            </a:r>
-            <a:r>
-              <a:rPr lang="es-AR" sz="1800" dirty="0" smtClean="0"/>
-              <a:t>no terminamos con todas las tareas comprometidas para el Sprint</a:t>
-            </a:r>
-          </a:p>
-          <a:p>
-            <a:endParaRPr lang="es-AR" sz="1800" u="sng" dirty="0" smtClean="0"/>
-          </a:p>
-          <a:p>
-            <a:r>
-              <a:rPr lang="es-AR" sz="1800" u="sng" dirty="0" smtClean="0"/>
-              <a:t>Comunicación</a:t>
+              <a:t>UATs</a:t>
             </a:r>
             <a:r>
               <a:rPr lang="es-AR" sz="1800" u="sng" dirty="0" smtClean="0"/>
@@ -7165,7 +7193,23 @@
             </a:r>
             <a:r>
               <a:rPr lang="es-AR" sz="1800" dirty="0" smtClean="0"/>
-              <a:t> Avisar con anticipación si no vamos a llegar con alguna tarea</a:t>
+              <a:t> Buscar con anticipación la aceptación de los </a:t>
+            </a:r>
+            <a:r>
+              <a:rPr lang="es-AR" sz="1800" dirty="0" err="1" smtClean="0"/>
+              <a:t>UATs</a:t>
+            </a:r>
+            <a:r>
+              <a:rPr lang="es-AR" sz="1800" dirty="0" smtClean="0"/>
+              <a:t> antes de cada Sprint </a:t>
+            </a:r>
+            <a:r>
+              <a:rPr lang="es-AR" sz="1800" dirty="0" err="1" smtClean="0"/>
+              <a:t>Review</a:t>
+            </a:r>
+            <a:r>
+              <a:rPr lang="es-AR" sz="1800" dirty="0" smtClean="0"/>
+              <a:t> Meeting</a:t>
             </a:r>
           </a:p>
           <a:p>
@@ -7178,57 +7222,94 @@
             <a:pPr>
               <a:buNone/>
             </a:pPr>
+            <a:endParaRPr lang="es-AR" sz="1800" b="1" dirty="0" smtClean="0"/>
+          </a:p>
+          <a:p>
+            <a:pPr>
+              <a:buNone/>
+            </a:pPr>
             <a:r>
               <a:rPr lang="es-AR" sz="1800" b="1" u="sng" dirty="0" smtClean="0"/>
-              <a:t>Sprint 4</a:t>
-            </a:r>
-          </a:p>
-          <a:p>
+              <a:t>Sprint 2</a:t>
+            </a:r>
+          </a:p>
+          <a:p>
+            <a:r>
+              <a:rPr lang="es-AR" sz="1800" u="sng" dirty="0" err="1" smtClean="0"/>
+              <a:t>Contradiccion</a:t>
+            </a:r>
+            <a:r>
+              <a:rPr lang="es-AR" sz="1800" u="sng" dirty="0" smtClean="0"/>
+              <a:t> entre </a:t>
+            </a:r>
+            <a:r>
+              <a:rPr lang="es-AR" sz="1800" u="sng" dirty="0" err="1" smtClean="0"/>
+              <a:t>Earned</a:t>
+            </a:r>
+            <a:r>
+              <a:rPr lang="es-AR" sz="1800" u="sng" dirty="0" smtClean="0"/>
+              <a:t> </a:t>
+            </a:r>
+            <a:r>
+              <a:rPr lang="es-AR" sz="1800" u="sng" dirty="0" err="1" smtClean="0"/>
+              <a:t>Value</a:t>
+            </a:r>
+            <a:r>
+              <a:rPr lang="es-AR" sz="1800" u="sng" dirty="0" smtClean="0"/>
+              <a:t> y </a:t>
+            </a:r>
+            <a:r>
+              <a:rPr lang="es-AR" sz="1800" u="sng" dirty="0" err="1" smtClean="0"/>
+              <a:t>Burndown</a:t>
+            </a:r>
+            <a:r>
+              <a:rPr lang="es-AR" sz="1800" u="sng" dirty="0" smtClean="0"/>
+              <a:t> Chart:</a:t>
+            </a:r>
             <a:r>
               <a:rPr lang="es-AR" sz="1800" dirty="0" smtClean="0"/>
-              <a:t>En caso de haber baches en el negocio y </a:t>
+              <a:t> Mostramos en el BC que estamos adelantados con el calendario y el </a:t>
+            </a:r>
+            <a:r>
+              <a:rPr lang="es-AR" sz="1800" dirty="0" err="1" smtClean="0"/>
+              <a:t>Earned</a:t>
             </a:r>
             <a:r>
               <a:rPr lang="es-AR" sz="1800" dirty="0" smtClean="0"/>
-              <a:t>que </a:t>
+              <a:t> </a:t>
+            </a:r>
+            <a:r>
+              <a:rPr lang="es-AR" sz="1800" dirty="0" err="1" smtClean="0"/>
+              <a:t>Value</a:t>
             </a:r>
             <a:r>
               <a:rPr lang="es-AR" sz="1800" dirty="0" smtClean="0"/>
-              <a:t>el equipo los detecte, se debe comunicar </a:t>
+              <a:t> muestra que estamos atrasados (que la construcción nos llevó mas tiempo de lo estimado)</a:t>
+            </a:r>
+          </a:p>
+          <a:p>
+            <a:pPr>
+              <a:buNone/>
+            </a:pPr>
+            <a:endParaRPr lang="es-AR" sz="1800" dirty="0" smtClean="0"/>
+          </a:p>
+          <a:p>
+            <a:r>
+              <a:rPr lang="es-AR" sz="1800" u="sng" dirty="0" smtClean="0"/>
+              <a:t>Tareas en planificación de cada Sprint:</a:t>
             </a:r>
             <a:r>
               <a:rPr lang="es-AR" sz="1800" dirty="0" smtClean="0"/>
-              <a:t>al </a:t>
+              <a:t> Explotar todas y cada una de las tareas inmediatamente luego de la Sprint </a:t>
+            </a:r>
+            <a:r>
+              <a:rPr lang="es-AR" sz="1800" dirty="0" err="1" smtClean="0"/>
+              <a:t>Planning</a:t>
             </a:r>
             <a:r>
               <a:rPr lang="es-AR" sz="1800" dirty="0" smtClean="0"/>
-              <a:t>cliente, con el objetivo de entregar un sistema que le sea lo mas </a:t>
-            </a:r>
-            <a:r>
-              <a:rPr lang="es-AR" sz="1800" dirty="0" smtClean="0"/>
-              <a:t>útil posible. </a:t>
-            </a:r>
-            <a:r>
-              <a:rPr lang="es-AR" sz="1800" dirty="0" smtClean="0"/>
-              <a:t>El alcance puede estar sujeto a </a:t>
-            </a:r>
-            <a:r>
-              <a:rPr lang="es-AR" sz="1800" dirty="0" smtClean="0"/>
-              <a:t>modificaciones, </a:t>
-            </a:r>
-            <a:r>
-              <a:rPr lang="es-AR" sz="1800" dirty="0" smtClean="0"/>
-              <a:t>si se propone un </a:t>
-            </a:r>
-            <a:r>
-              <a:rPr lang="es-AR" sz="1800" dirty="0" smtClean="0"/>
-              <a:t>agregado avalado por </a:t>
-            </a:r>
-            <a:r>
-              <a:rPr lang="es-AR" sz="1800" smtClean="0"/>
-              <a:t>el cliente.</a:t>
-            </a:r>
-            <a:endParaRPr lang="es-AR" sz="1800" dirty="0"/>
+              <a:t> Meeting</a:t>
+            </a:r>
           </a:p>
         </p:txBody>
       </p:sp>
@@ -7793,6 +7874,697 @@
         </p:nvSpPr>
         <p:spPr>
           <a:xfrm>
+            <a:off x="457200" y="601811"/>
+            <a:ext cx="7467600" cy="1143000"/>
+          </a:xfrm>
+        </p:spPr>
+        <p:txBody>
+          <a:bodyPr>
+            <a:normAutofit/>
+          </a:bodyPr>
+          <a:lstStyle/>
+          <a:p>
+            <a:pPr eaLnBrk="1" fontAlgn="auto" hangingPunct="1">
+              <a:spcAft>
+                <a:spcPts val="0"/>
+              </a:spcAft>
+              <a:defRPr/>
+            </a:pPr>
+            <a:r>
+              <a:rPr lang="es-ES" sz="4000" dirty="0" smtClean="0">
+                <a:effectLst>
+                  <a:glow rad="139700">
+                    <a:schemeClr val="accent1">
+                      <a:satMod val="175000"/>
+                      <a:alpha val="40000"/>
+                    </a:schemeClr>
+                  </a:glow>
+                </a:effectLst>
+              </a:rPr>
+              <a:t>Lecciones Aprendidas</a:t>
+            </a:r>
+            <a:endParaRPr lang="es-ES" sz="4000" dirty="0"/>
+          </a:p>
+        </p:txBody>
+      </p:sp>
+      <p:sp>
+        <p:nvSpPr>
+          <p:cNvPr id="29698" name="2 Marcador de contenido"/>
+          <p:cNvSpPr>
+            <a:spLocks noGrp="1"/>
+          </p:cNvSpPr>
+          <p:nvPr>
+            <p:ph idx="1"/>
+          </p:nvPr>
+        </p:nvSpPr>
+        <p:spPr>
+          <a:xfrm>
+            <a:off x="344760" y="1700808"/>
+            <a:ext cx="8475712" cy="4525963"/>
+          </a:xfrm>
+        </p:spPr>
+        <p:txBody>
+          <a:bodyPr/>
+          <a:lstStyle/>
+          <a:p>
+            <a:pPr>
+              <a:buNone/>
+            </a:pPr>
+            <a:r>
+              <a:rPr lang="es-AR" sz="1800" b="1" u="sng" dirty="0" smtClean="0"/>
+              <a:t>Sprint 3</a:t>
+            </a:r>
+            <a:endParaRPr lang="es-AR" sz="1800" u="sng" dirty="0" smtClean="0"/>
+          </a:p>
+          <a:p>
+            <a:r>
+              <a:rPr lang="es-AR" sz="1800" u="sng" dirty="0" smtClean="0"/>
+              <a:t>Inconsistencias:</a:t>
+            </a:r>
+            <a:r>
+              <a:rPr lang="es-AR" sz="1800" dirty="0" smtClean="0"/>
+              <a:t> Inconsistencias en la información entre la minuta de reunión y el reporte de avance</a:t>
+            </a:r>
+          </a:p>
+          <a:p>
+            <a:endParaRPr lang="es-AR" sz="1800" u="sng" dirty="0" smtClean="0"/>
+          </a:p>
+          <a:p>
+            <a:r>
+              <a:rPr lang="es-AR" sz="1800" u="sng" dirty="0" err="1" smtClean="0"/>
+              <a:t>Burndown</a:t>
+            </a:r>
+            <a:r>
+              <a:rPr lang="es-AR" sz="1800" u="sng" dirty="0" smtClean="0"/>
+              <a:t> Chart:</a:t>
+            </a:r>
+            <a:r>
+              <a:rPr lang="es-AR" sz="1800" dirty="0" smtClean="0"/>
+              <a:t> No cerrarlo si no terminamos con todas las tareas comprometidas para el Sprint</a:t>
+            </a:r>
+          </a:p>
+          <a:p>
+            <a:endParaRPr lang="es-AR" sz="1800" u="sng" dirty="0" smtClean="0"/>
+          </a:p>
+          <a:p>
+            <a:r>
+              <a:rPr lang="es-AR" sz="1800" u="sng" dirty="0" smtClean="0"/>
+              <a:t>Comunicación:</a:t>
+            </a:r>
+            <a:r>
+              <a:rPr lang="es-AR" sz="1800" dirty="0" smtClean="0"/>
+              <a:t> Avisar con anticipación si no vamos a llegar con alguna tarea</a:t>
+            </a:r>
+          </a:p>
+          <a:p>
+            <a:pPr>
+              <a:buNone/>
+            </a:pPr>
+            <a:endParaRPr lang="es-AR" sz="1800" b="1" dirty="0" smtClean="0"/>
+          </a:p>
+          <a:p>
+            <a:pPr>
+              <a:buNone/>
+            </a:pPr>
+            <a:r>
+              <a:rPr lang="es-AR" sz="1800" b="1" u="sng" dirty="0" smtClean="0"/>
+              <a:t>Sprint 4</a:t>
+            </a:r>
+          </a:p>
+          <a:p>
+            <a:r>
+              <a:rPr lang="es-AR" sz="1800" dirty="0" smtClean="0"/>
+              <a:t>En caso de haber baches en el negocio y que el equipo los detecte, se debe comunicar al cliente, con el objetivo de entregar un sistema que le sea lo mas útil posible. El alcance puede estar sujeto a modificaciones, si se propone un agregado avalado por </a:t>
+            </a:r>
+            <a:r>
+              <a:rPr lang="es-AR" sz="1800" smtClean="0"/>
+              <a:t>el cliente.</a:t>
+            </a:r>
+            <a:endParaRPr lang="es-AR" sz="1800" dirty="0"/>
+          </a:p>
+        </p:txBody>
+      </p:sp>
+      <p:pic>
+        <p:nvPicPr>
+          <p:cNvPr id="20" name="Picture 3"/>
+          <p:cNvPicPr>
+            <a:picLocks noChangeAspect="1" noChangeArrowheads="1"/>
+          </p:cNvPicPr>
+          <p:nvPr/>
+        </p:nvPicPr>
+        <p:blipFill>
+          <a:blip r:embed="rId3" cstate="print"/>
+          <a:srcRect/>
+          <a:stretch>
+            <a:fillRect/>
+          </a:stretch>
+        </p:blipFill>
+        <p:spPr bwMode="auto">
+          <a:xfrm>
+            <a:off x="7812088" y="410692"/>
+            <a:ext cx="1008062" cy="354012"/>
+          </a:xfrm>
+          <a:prstGeom prst="rect">
+            <a:avLst/>
+          </a:prstGeom>
+          <a:ln>
+            <a:headEnd/>
+            <a:tailEnd/>
+          </a:ln>
+        </p:spPr>
+        <p:style>
+          <a:lnRef idx="3">
+            <a:schemeClr val="lt1"/>
+          </a:lnRef>
+          <a:fillRef idx="1">
+            <a:schemeClr val="accent6"/>
+          </a:fillRef>
+          <a:effectRef idx="1">
+            <a:schemeClr val="accent6"/>
+          </a:effectRef>
+          <a:fontRef idx="minor">
+            <a:schemeClr val="lt1"/>
+          </a:fontRef>
+        </p:style>
+      </p:pic>
+      <p:sp>
+        <p:nvSpPr>
+          <p:cNvPr id="21" name="20 Rectángulo redondeado"/>
+          <p:cNvSpPr/>
+          <p:nvPr/>
+        </p:nvSpPr>
+        <p:spPr>
+          <a:xfrm>
+            <a:off x="539552" y="404664"/>
+            <a:ext cx="288032" cy="288032"/>
+          </a:xfrm>
+          <a:prstGeom prst="roundRect">
+            <a:avLst/>
+          </a:prstGeom>
+          <a:effectLst/>
+        </p:spPr>
+        <p:style>
+          <a:lnRef idx="1">
+            <a:schemeClr val="accent1"/>
+          </a:lnRef>
+          <a:fillRef idx="2">
+            <a:schemeClr val="accent1"/>
+          </a:fillRef>
+          <a:effectRef idx="1">
+            <a:schemeClr val="accent1"/>
+          </a:effectRef>
+          <a:fontRef idx="minor">
+            <a:schemeClr val="dk1"/>
+          </a:fontRef>
+        </p:style>
+        <p:txBody>
+          <a:bodyPr rtlCol="0" anchor="ctr"/>
+          <a:lstStyle/>
+          <a:p>
+            <a:pPr algn="ctr"/>
+            <a:endParaRPr lang="es-AR" sz="1000" b="1" dirty="0" smtClean="0"/>
+          </a:p>
+        </p:txBody>
+      </p:sp>
+      <p:cxnSp>
+        <p:nvCxnSpPr>
+          <p:cNvPr id="22" name="21 Conector recto"/>
+          <p:cNvCxnSpPr>
+            <a:stCxn id="21" idx="3"/>
+          </p:cNvCxnSpPr>
+          <p:nvPr/>
+        </p:nvCxnSpPr>
+        <p:spPr>
+          <a:xfrm>
+            <a:off x="827584" y="548680"/>
+            <a:ext cx="576064" cy="0"/>
+          </a:xfrm>
+          <a:prstGeom prst="line">
+            <a:avLst/>
+          </a:prstGeom>
+        </p:spPr>
+        <p:style>
+          <a:lnRef idx="1">
+            <a:schemeClr val="accent1"/>
+          </a:lnRef>
+          <a:fillRef idx="0">
+            <a:schemeClr val="accent1"/>
+          </a:fillRef>
+          <a:effectRef idx="0">
+            <a:schemeClr val="accent1"/>
+          </a:effectRef>
+          <a:fontRef idx="minor">
+            <a:schemeClr val="tx1"/>
+          </a:fontRef>
+        </p:style>
+      </p:cxnSp>
+      <p:cxnSp>
+        <p:nvCxnSpPr>
+          <p:cNvPr id="23" name="22 Conector recto"/>
+          <p:cNvCxnSpPr>
+            <a:endCxn id="28" idx="1"/>
+          </p:cNvCxnSpPr>
+          <p:nvPr/>
+        </p:nvCxnSpPr>
+        <p:spPr>
+          <a:xfrm>
+            <a:off x="827584" y="548680"/>
+            <a:ext cx="576064" cy="0"/>
+          </a:xfrm>
+          <a:prstGeom prst="line">
+            <a:avLst/>
+          </a:prstGeom>
+        </p:spPr>
+        <p:style>
+          <a:lnRef idx="1">
+            <a:schemeClr val="accent1"/>
+          </a:lnRef>
+          <a:fillRef idx="0">
+            <a:schemeClr val="accent1"/>
+          </a:fillRef>
+          <a:effectRef idx="0">
+            <a:schemeClr val="accent1"/>
+          </a:effectRef>
+          <a:fontRef idx="minor">
+            <a:schemeClr val="tx1"/>
+          </a:fontRef>
+        </p:style>
+      </p:cxnSp>
+      <p:cxnSp>
+        <p:nvCxnSpPr>
+          <p:cNvPr id="24" name="23 Conector recto"/>
+          <p:cNvCxnSpPr>
+            <a:stCxn id="28" idx="3"/>
+            <a:endCxn id="29" idx="1"/>
+          </p:cNvCxnSpPr>
+          <p:nvPr/>
+        </p:nvCxnSpPr>
+        <p:spPr>
+          <a:xfrm>
+            <a:off x="1691680" y="548680"/>
+            <a:ext cx="576064" cy="0"/>
+          </a:xfrm>
+          <a:prstGeom prst="line">
+            <a:avLst/>
+          </a:prstGeom>
+        </p:spPr>
+        <p:style>
+          <a:lnRef idx="1">
+            <a:schemeClr val="accent1"/>
+          </a:lnRef>
+          <a:fillRef idx="0">
+            <a:schemeClr val="accent1"/>
+          </a:fillRef>
+          <a:effectRef idx="0">
+            <a:schemeClr val="accent1"/>
+          </a:effectRef>
+          <a:fontRef idx="minor">
+            <a:schemeClr val="tx1"/>
+          </a:fontRef>
+        </p:style>
+      </p:cxnSp>
+      <p:cxnSp>
+        <p:nvCxnSpPr>
+          <p:cNvPr id="25" name="24 Conector recto"/>
+          <p:cNvCxnSpPr>
+            <a:stCxn id="29" idx="3"/>
+            <a:endCxn id="30" idx="1"/>
+          </p:cNvCxnSpPr>
+          <p:nvPr/>
+        </p:nvCxnSpPr>
+        <p:spPr>
+          <a:xfrm>
+            <a:off x="2555776" y="548680"/>
+            <a:ext cx="576064" cy="0"/>
+          </a:xfrm>
+          <a:prstGeom prst="line">
+            <a:avLst/>
+          </a:prstGeom>
+        </p:spPr>
+        <p:style>
+          <a:lnRef idx="1">
+            <a:schemeClr val="accent1"/>
+          </a:lnRef>
+          <a:fillRef idx="0">
+            <a:schemeClr val="accent1"/>
+          </a:fillRef>
+          <a:effectRef idx="0">
+            <a:schemeClr val="accent1"/>
+          </a:effectRef>
+          <a:fontRef idx="minor">
+            <a:schemeClr val="tx1"/>
+          </a:fontRef>
+        </p:style>
+      </p:cxnSp>
+      <p:cxnSp>
+        <p:nvCxnSpPr>
+          <p:cNvPr id="26" name="25 Conector recto"/>
+          <p:cNvCxnSpPr>
+            <a:stCxn id="30" idx="3"/>
+          </p:cNvCxnSpPr>
+          <p:nvPr/>
+        </p:nvCxnSpPr>
+        <p:spPr>
+          <a:xfrm>
+            <a:off x="3419872" y="548680"/>
+            <a:ext cx="1440160" cy="0"/>
+          </a:xfrm>
+          <a:prstGeom prst="line">
+            <a:avLst/>
+          </a:prstGeom>
+        </p:spPr>
+        <p:style>
+          <a:lnRef idx="1">
+            <a:schemeClr val="accent1"/>
+          </a:lnRef>
+          <a:fillRef idx="0">
+            <a:schemeClr val="accent1"/>
+          </a:fillRef>
+          <a:effectRef idx="0">
+            <a:schemeClr val="accent1"/>
+          </a:effectRef>
+          <a:fontRef idx="minor">
+            <a:schemeClr val="tx1"/>
+          </a:fontRef>
+        </p:style>
+      </p:cxnSp>
+      <p:cxnSp>
+        <p:nvCxnSpPr>
+          <p:cNvPr id="27" name="26 Conector recto"/>
+          <p:cNvCxnSpPr>
+            <a:endCxn id="32" idx="1"/>
+          </p:cNvCxnSpPr>
+          <p:nvPr/>
+        </p:nvCxnSpPr>
+        <p:spPr>
+          <a:xfrm>
+            <a:off x="5148064" y="548680"/>
+            <a:ext cx="576064" cy="0"/>
+          </a:xfrm>
+          <a:prstGeom prst="line">
+            <a:avLst/>
+          </a:prstGeom>
+        </p:spPr>
+        <p:style>
+          <a:lnRef idx="1">
+            <a:schemeClr val="accent1"/>
+          </a:lnRef>
+          <a:fillRef idx="0">
+            <a:schemeClr val="accent1"/>
+          </a:fillRef>
+          <a:effectRef idx="0">
+            <a:schemeClr val="accent1"/>
+          </a:effectRef>
+          <a:fontRef idx="minor">
+            <a:schemeClr val="tx1"/>
+          </a:fontRef>
+        </p:style>
+      </p:cxnSp>
+      <p:sp>
+        <p:nvSpPr>
+          <p:cNvPr id="28" name="27 Rectángulo redondeado"/>
+          <p:cNvSpPr/>
+          <p:nvPr/>
+        </p:nvSpPr>
+        <p:spPr>
+          <a:xfrm>
+            <a:off x="1403648" y="404664"/>
+            <a:ext cx="288032" cy="288032"/>
+          </a:xfrm>
+          <a:prstGeom prst="roundRect">
+            <a:avLst/>
+          </a:prstGeom>
+          <a:effectLst/>
+        </p:spPr>
+        <p:style>
+          <a:lnRef idx="1">
+            <a:schemeClr val="accent1"/>
+          </a:lnRef>
+          <a:fillRef idx="2">
+            <a:schemeClr val="accent1"/>
+          </a:fillRef>
+          <a:effectRef idx="1">
+            <a:schemeClr val="accent1"/>
+          </a:effectRef>
+          <a:fontRef idx="minor">
+            <a:schemeClr val="dk1"/>
+          </a:fontRef>
+        </p:style>
+        <p:txBody>
+          <a:bodyPr rtlCol="0" anchor="ctr"/>
+          <a:lstStyle/>
+          <a:p>
+            <a:pPr algn="ctr"/>
+            <a:endParaRPr lang="es-AR" sz="1000" b="1" dirty="0" smtClean="0"/>
+          </a:p>
+        </p:txBody>
+      </p:sp>
+      <p:sp>
+        <p:nvSpPr>
+          <p:cNvPr id="29" name="28 Rectángulo redondeado"/>
+          <p:cNvSpPr/>
+          <p:nvPr/>
+        </p:nvSpPr>
+        <p:spPr>
+          <a:xfrm>
+            <a:off x="2267744" y="404664"/>
+            <a:ext cx="288032" cy="288032"/>
+          </a:xfrm>
+          <a:prstGeom prst="roundRect">
+            <a:avLst/>
+          </a:prstGeom>
+          <a:effectLst/>
+        </p:spPr>
+        <p:style>
+          <a:lnRef idx="1">
+            <a:schemeClr val="accent1"/>
+          </a:lnRef>
+          <a:fillRef idx="2">
+            <a:schemeClr val="accent1"/>
+          </a:fillRef>
+          <a:effectRef idx="1">
+            <a:schemeClr val="accent1"/>
+          </a:effectRef>
+          <a:fontRef idx="minor">
+            <a:schemeClr val="dk1"/>
+          </a:fontRef>
+        </p:style>
+        <p:txBody>
+          <a:bodyPr rtlCol="0" anchor="ctr"/>
+          <a:lstStyle/>
+          <a:p>
+            <a:pPr algn="ctr"/>
+            <a:endParaRPr lang="es-AR" sz="1000" b="1" dirty="0" smtClean="0"/>
+          </a:p>
+        </p:txBody>
+      </p:sp>
+      <p:sp>
+        <p:nvSpPr>
+          <p:cNvPr id="30" name="29 Rectángulo redondeado"/>
+          <p:cNvSpPr/>
+          <p:nvPr/>
+        </p:nvSpPr>
+        <p:spPr>
+          <a:xfrm>
+            <a:off x="3131840" y="404664"/>
+            <a:ext cx="288032" cy="288032"/>
+          </a:xfrm>
+          <a:prstGeom prst="roundRect">
+            <a:avLst/>
+          </a:prstGeom>
+          <a:effectLst/>
+        </p:spPr>
+        <p:style>
+          <a:lnRef idx="1">
+            <a:schemeClr val="accent1"/>
+          </a:lnRef>
+          <a:fillRef idx="2">
+            <a:schemeClr val="accent1"/>
+          </a:fillRef>
+          <a:effectRef idx="1">
+            <a:schemeClr val="accent1"/>
+          </a:effectRef>
+          <a:fontRef idx="minor">
+            <a:schemeClr val="dk1"/>
+          </a:fontRef>
+        </p:style>
+        <p:txBody>
+          <a:bodyPr rtlCol="0" anchor="ctr"/>
+          <a:lstStyle/>
+          <a:p>
+            <a:pPr algn="ctr"/>
+            <a:endParaRPr lang="es-AR" sz="1000" b="1" dirty="0" smtClean="0"/>
+          </a:p>
+        </p:txBody>
+      </p:sp>
+      <p:sp>
+        <p:nvSpPr>
+          <p:cNvPr id="32" name="31 Rectángulo redondeado"/>
+          <p:cNvSpPr/>
+          <p:nvPr/>
+        </p:nvSpPr>
+        <p:spPr>
+          <a:xfrm>
+            <a:off x="5724128" y="404664"/>
+            <a:ext cx="288032" cy="288032"/>
+          </a:xfrm>
+          <a:prstGeom prst="roundRect">
+            <a:avLst/>
+          </a:prstGeom>
+          <a:effectLst/>
+        </p:spPr>
+        <p:style>
+          <a:lnRef idx="1">
+            <a:schemeClr val="accent1"/>
+          </a:lnRef>
+          <a:fillRef idx="2">
+            <a:schemeClr val="accent1"/>
+          </a:fillRef>
+          <a:effectRef idx="1">
+            <a:schemeClr val="accent1"/>
+          </a:effectRef>
+          <a:fontRef idx="minor">
+            <a:schemeClr val="dk1"/>
+          </a:fontRef>
+        </p:style>
+        <p:txBody>
+          <a:bodyPr rtlCol="0" anchor="ctr"/>
+          <a:lstStyle/>
+          <a:p>
+            <a:pPr algn="ctr"/>
+            <a:endParaRPr lang="es-AR" sz="1000" b="1" dirty="0" smtClean="0"/>
+          </a:p>
+        </p:txBody>
+      </p:sp>
+      <p:sp>
+        <p:nvSpPr>
+          <p:cNvPr id="34" name="33 Rectángulo redondeado"/>
+          <p:cNvSpPr/>
+          <p:nvPr/>
+        </p:nvSpPr>
+        <p:spPr>
+          <a:xfrm>
+            <a:off x="4860032" y="404664"/>
+            <a:ext cx="288032" cy="288032"/>
+          </a:xfrm>
+          <a:prstGeom prst="roundRect">
+            <a:avLst/>
+          </a:prstGeom>
+          <a:effectLst>
+            <a:glow rad="228600">
+              <a:schemeClr val="accent1">
+                <a:satMod val="175000"/>
+                <a:alpha val="40000"/>
+              </a:schemeClr>
+            </a:glow>
+          </a:effectLst>
+        </p:spPr>
+        <p:style>
+          <a:lnRef idx="1">
+            <a:schemeClr val="accent1"/>
+          </a:lnRef>
+          <a:fillRef idx="2">
+            <a:schemeClr val="accent1"/>
+          </a:fillRef>
+          <a:effectRef idx="1">
+            <a:schemeClr val="accent1"/>
+          </a:effectRef>
+          <a:fontRef idx="minor">
+            <a:schemeClr val="dk1"/>
+          </a:fontRef>
+        </p:style>
+        <p:txBody>
+          <a:bodyPr rtlCol="0" anchor="ctr"/>
+          <a:lstStyle/>
+          <a:p>
+            <a:pPr algn="ctr"/>
+            <a:endParaRPr lang="es-AR" sz="1000" b="1" dirty="0" smtClean="0"/>
+          </a:p>
+        </p:txBody>
+      </p:sp>
+      <p:sp>
+        <p:nvSpPr>
+          <p:cNvPr id="35" name="34 Rectángulo redondeado"/>
+          <p:cNvSpPr/>
+          <p:nvPr/>
+        </p:nvSpPr>
+        <p:spPr>
+          <a:xfrm>
+            <a:off x="3995936" y="404664"/>
+            <a:ext cx="288032" cy="288032"/>
+          </a:xfrm>
+          <a:prstGeom prst="roundRect">
+            <a:avLst/>
+          </a:prstGeom>
+          <a:effectLst/>
+        </p:spPr>
+        <p:style>
+          <a:lnRef idx="1">
+            <a:schemeClr val="accent1"/>
+          </a:lnRef>
+          <a:fillRef idx="2">
+            <a:schemeClr val="accent1"/>
+          </a:fillRef>
+          <a:effectRef idx="1">
+            <a:schemeClr val="accent1"/>
+          </a:effectRef>
+          <a:fontRef idx="minor">
+            <a:schemeClr val="dk1"/>
+          </a:fontRef>
+        </p:style>
+        <p:txBody>
+          <a:bodyPr rtlCol="0" anchor="ctr"/>
+          <a:lstStyle/>
+          <a:p>
+            <a:pPr algn="ctr"/>
+            <a:endParaRPr lang="es-AR" sz="1000" b="1" dirty="0" smtClean="0"/>
+          </a:p>
+        </p:txBody>
+      </p:sp>
+    </p:spTree>
+  </p:cSld>
+  <p:clrMapOvr>
+    <a:masterClrMapping/>
+  </p:clrMapOvr>
+  <p:timing>
+    <p:tnLst>
+      <p:par>
+        <p:cTn id="1" dur="indefinite" restart="never" nodeType="tmRoot"/>
+      </p:par>
+    </p:tnLst>
+  </p:timing>
+</p:sld>
+</file>
+
+<file path=ppt/slides/slide13.xml><?xml version="1.0" encoding="utf-8"?>
+<p:sld xmlns:a="http://schemas.openxmlformats.org/drawingml/2006/main" xmlns:r="http://schemas.openxmlformats.org/officeDocument/2006/relationships" xmlns:p="http://schemas.openxmlformats.org/presentationml/2006/main">
+  <p:cSld>
+    <p:spTree>
+      <p:nvGrpSpPr>
+        <p:cNvPr id="1" name=""/>
+        <p:cNvGrpSpPr/>
+        <p:nvPr/>
+      </p:nvGrpSpPr>
+      <p:grpSpPr>
+        <a:xfrm>
+          <a:off x="0" y="0"/>
+          <a:ext cx="0" cy="0"/>
+          <a:chOff x="0" y="0"/>
+          <a:chExt cx="0" cy="0"/>
+        </a:xfrm>
+      </p:grpSpPr>
+      <p:sp>
+        <p:nvSpPr>
+          <p:cNvPr id="2" name="1 Título"/>
+          <p:cNvSpPr>
+            <a:spLocks noGrp="1"/>
+          </p:cNvSpPr>
+          <p:nvPr>
+            <p:ph type="title"/>
+          </p:nvPr>
+        </p:nvSpPr>
+        <p:spPr>
+          <a:xfrm>
             <a:off x="2771800" y="3068960"/>
             <a:ext cx="3456384" cy="1143000"/>
           </a:xfrm>
@@ -8393,7 +9165,7 @@
 </p:sld>
 </file>
 
-<file path=ppt/slides/slide13.xml><?xml version="1.0" encoding="utf-8"?>
+<file path=ppt/slides/slide14.xml><?xml version="1.0" encoding="utf-8"?>
 <p:sld xmlns:a="http://schemas.openxmlformats.org/drawingml/2006/main" xmlns:r="http://schemas.openxmlformats.org/officeDocument/2006/relationships" xmlns:p="http://schemas.openxmlformats.org/presentationml/2006/main">
   <p:cSld>
     <p:spTree>
@@ -12500,49 +13272,6 @@
           <p:nvPr/>
         </p:nvPicPr>
         <p:blipFill>
-          <a:blip r:embed="rId2" cstate="print"/>
-          <a:srcRect/>
-          <a:stretch>
-            <a:fillRect/>
-          </a:stretch>
-        </p:blipFill>
-        <p:spPr bwMode="auto">
-          <a:xfrm>
-            <a:off x="7812088" y="410692"/>
-            <a:ext cx="1008062" cy="354012"/>
-          </a:xfrm>
-          <a:prstGeom prst="rect">
-            <a:avLst/>
-          </a:prstGeom>
-          <a:ln>
-            <a:headEnd/>
-            <a:tailEnd/>
-          </a:ln>
-        </p:spPr>
-        <p:style>
-          <a:lnRef idx="3">
-            <a:schemeClr val="lt1"/>
-          </a:lnRef>
-          <a:fillRef idx="1">
-            <a:schemeClr val="accent6"/>
-          </a:fillRef>
-          <a:effectRef idx="1">
-            <a:schemeClr val="accent6"/>
-          </a:effectRef>
-          <a:fontRef idx="minor">
-            <a:schemeClr val="lt1"/>
-          </a:fontRef>
-        </p:style>
-      </p:pic>
-      <p:pic>
-        <p:nvPicPr>
-          <p:cNvPr id="18434" name="Picture 2"/>
-          <p:cNvPicPr>
-            <a:picLocks noChangeAspect="1" noChangeArrowheads="1"/>
-          </p:cNvPicPr>
-          <p:nvPr/>
-        </p:nvPicPr>
-        <p:blipFill>
           <a:blip r:embed="rId3" cstate="print"/>
           <a:srcRect/>
           <a:stretch>
@@ -12551,74 +13280,35 @@
         </p:blipFill>
         <p:spPr bwMode="auto">
           <a:xfrm>
-            <a:off x="251520" y="1916832"/>
-            <a:ext cx="5832648" cy="1650820"/>
+            <a:off x="7812088" y="410692"/>
+            <a:ext cx="1008062" cy="354012"/>
           </a:xfrm>
           <a:prstGeom prst="rect">
             <a:avLst/>
           </a:prstGeom>
-          <a:noFill/>
-          <a:ln w="9525">
-            <a:noFill/>
-            <a:miter lim="800000"/>
+          <a:ln>
             <a:headEnd/>
             <a:tailEnd/>
           </a:ln>
         </p:spPr>
+        <p:style>
+          <a:lnRef idx="3">
+            <a:schemeClr val="lt1"/>
+          </a:lnRef>
+          <a:fillRef idx="1">
+            <a:schemeClr val="accent6"/>
+          </a:fillRef>
+          <a:effectRef idx="1">
+            <a:schemeClr val="accent6"/>
+          </a:effectRef>
+          <a:fontRef idx="minor">
+            <a:schemeClr val="lt1"/>
+          </a:fontRef>
+        </p:style>
       </p:pic>
-      <p:sp>
-        <p:nvSpPr>
-          <p:cNvPr id="32" name="31 Elipse"/>
-          <p:cNvSpPr/>
-          <p:nvPr/>
-        </p:nvSpPr>
-        <p:spPr>
-          <a:xfrm>
-            <a:off x="2843808" y="3212976"/>
-            <a:ext cx="648072" cy="432048"/>
-          </a:xfrm>
-          <a:prstGeom prst="ellipse">
-            <a:avLst/>
-          </a:prstGeom>
-          <a:noFill/>
-          <a:ln w="57150">
-            <a:solidFill>
-              <a:srgbClr val="FF0000"/>
-            </a:solidFill>
-          </a:ln>
-        </p:spPr>
-        <p:style>
-          <a:lnRef idx="2">
-            <a:schemeClr val="accent6"/>
-          </a:lnRef>
-          <a:fillRef idx="1">
-            <a:schemeClr val="lt1"/>
-          </a:fillRef>
-          <a:effectRef idx="0">
-            <a:schemeClr val="accent6"/>
-          </a:effectRef>
-          <a:fontRef idx="minor">
-            <a:schemeClr val="dk1"/>
-          </a:fontRef>
-        </p:style>
-        <p:txBody>
-          <a:bodyPr rtlCol="0" anchor="ctr"/>
-          <a:lstStyle/>
-          <a:p>
-            <a:pPr algn="ctr"/>
-            <a:endParaRPr lang="es-AR">
-              <a:ln>
-                <a:solidFill>
-                  <a:srgbClr val="FF0000"/>
-                </a:solidFill>
-              </a:ln>
-            </a:endParaRPr>
-          </a:p>
-        </p:txBody>
-      </p:sp>
       <p:pic>
         <p:nvPicPr>
-          <p:cNvPr id="18435" name="Picture 3"/>
+          <p:cNvPr id="18434" name="Picture 2"/>
           <p:cNvPicPr>
             <a:picLocks noChangeAspect="1" noChangeArrowheads="1"/>
           </p:cNvPicPr>
@@ -12633,8 +13323,8 @@
         </p:blipFill>
         <p:spPr bwMode="auto">
           <a:xfrm>
-            <a:off x="251521" y="4149080"/>
-            <a:ext cx="8640960" cy="676275"/>
+            <a:off x="251520" y="1916832"/>
+            <a:ext cx="5832648" cy="1650820"/>
           </a:xfrm>
           <a:prstGeom prst="rect">
             <a:avLst/>
@@ -12650,13 +13340,13 @@
       </p:pic>
       <p:sp>
         <p:nvSpPr>
-          <p:cNvPr id="33" name="32 Elipse"/>
+          <p:cNvPr id="32" name="31 Elipse"/>
           <p:cNvSpPr/>
           <p:nvPr/>
         </p:nvSpPr>
         <p:spPr>
           <a:xfrm>
-            <a:off x="5436096" y="4365104"/>
+            <a:off x="2843808" y="3212976"/>
             <a:ext cx="648072" cy="432048"/>
           </a:xfrm>
           <a:prstGeom prst="ellipse">
@@ -12698,137 +13388,9 @@
           </a:p>
         </p:txBody>
       </p:sp>
-      <p:sp>
-        <p:nvSpPr>
-          <p:cNvPr id="34" name="33 CuadroTexto"/>
-          <p:cNvSpPr txBox="1"/>
-          <p:nvPr/>
-        </p:nvSpPr>
-        <p:spPr>
-          <a:xfrm>
-            <a:off x="179512" y="2566065"/>
-            <a:ext cx="1959191" cy="430887"/>
-          </a:xfrm>
-          <a:prstGeom prst="rect">
-            <a:avLst/>
-          </a:prstGeom>
-          <a:noFill/>
-        </p:spPr>
-        <p:txBody>
-          <a:bodyPr wrap="none" rtlCol="0">
-            <a:spAutoFit/>
-          </a:bodyPr>
-          <a:lstStyle/>
-          <a:p>
-            <a:r>
-              <a:rPr lang="es-AR" sz="2200" b="1" dirty="0" smtClean="0"/>
-              <a:t>Presentación</a:t>
-            </a:r>
-          </a:p>
-        </p:txBody>
-      </p:sp>
-      <p:sp>
-        <p:nvSpPr>
-          <p:cNvPr id="35" name="34 CuadroTexto"/>
-          <p:cNvSpPr txBox="1"/>
-          <p:nvPr/>
-        </p:nvSpPr>
-        <p:spPr>
-          <a:xfrm>
-            <a:off x="179512" y="1557953"/>
-            <a:ext cx="5667064" cy="369332"/>
-          </a:xfrm>
-          <a:prstGeom prst="rect">
-            <a:avLst/>
-          </a:prstGeom>
-          <a:noFill/>
-        </p:spPr>
-        <p:txBody>
-          <a:bodyPr wrap="none" rtlCol="0">
-            <a:spAutoFit/>
-          </a:bodyPr>
-          <a:lstStyle/>
-          <a:p>
-            <a:r>
-              <a:rPr lang="es-AR" dirty="0" err="1" smtClean="0"/>
-              <a:t>Scrum</a:t>
-            </a:r>
-            <a:r>
-              <a:rPr lang="es-AR" dirty="0" smtClean="0"/>
-              <a:t> Tracking: </a:t>
-            </a:r>
-            <a:r>
-              <a:rPr lang="es-AR" dirty="0" err="1" smtClean="0"/>
-              <a:t>Version</a:t>
-            </a:r>
-            <a:r>
-              <a:rPr lang="es-AR" dirty="0" smtClean="0"/>
-              <a:t> </a:t>
-            </a:r>
-            <a:r>
-              <a:rPr lang="es-AR" dirty="0" err="1" smtClean="0"/>
-              <a:t>One</a:t>
-            </a:r>
-            <a:r>
-              <a:rPr lang="es-AR" dirty="0" smtClean="0"/>
-              <a:t> (</a:t>
-            </a:r>
-            <a:r>
-              <a:rPr lang="es-AR" dirty="0" err="1" smtClean="0"/>
-              <a:t>Product</a:t>
-            </a:r>
-            <a:r>
-              <a:rPr lang="es-AR" dirty="0" smtClean="0"/>
-              <a:t> </a:t>
-            </a:r>
-            <a:r>
-              <a:rPr lang="es-AR" dirty="0" err="1" smtClean="0"/>
-              <a:t>Backlog</a:t>
-            </a:r>
-            <a:r>
-              <a:rPr lang="es-AR" dirty="0" smtClean="0"/>
-              <a:t> + US)</a:t>
-            </a:r>
-          </a:p>
-        </p:txBody>
-      </p:sp>
-      <p:sp>
-        <p:nvSpPr>
-          <p:cNvPr id="36" name="35 CuadroTexto"/>
-          <p:cNvSpPr txBox="1"/>
-          <p:nvPr/>
-        </p:nvSpPr>
-        <p:spPr>
-          <a:xfrm>
-            <a:off x="179512" y="3790201"/>
-            <a:ext cx="3082960" cy="369332"/>
-          </a:xfrm>
-          <a:prstGeom prst="rect">
-            <a:avLst/>
-          </a:prstGeom>
-          <a:noFill/>
-        </p:spPr>
-        <p:txBody>
-          <a:bodyPr wrap="none" rtlCol="0">
-            <a:spAutoFit/>
-          </a:bodyPr>
-          <a:lstStyle/>
-          <a:p>
-            <a:r>
-              <a:rPr lang="es-AR" dirty="0" smtClean="0"/>
-              <a:t>SVN Tracking: Google </a:t>
-            </a:r>
-            <a:r>
-              <a:rPr lang="es-AR" dirty="0" err="1" smtClean="0"/>
-              <a:t>Code</a:t>
-            </a:r>
-            <a:endParaRPr lang="es-AR" dirty="0" smtClean="0"/>
-          </a:p>
-        </p:txBody>
-      </p:sp>
       <p:pic>
         <p:nvPicPr>
-          <p:cNvPr id="18436" name="Picture 4"/>
+          <p:cNvPr id="18435" name="Picture 3"/>
           <p:cNvPicPr>
             <a:picLocks noChangeAspect="1" noChangeArrowheads="1"/>
           </p:cNvPicPr>
@@ -12843,8 +13405,8 @@
         </p:blipFill>
         <p:spPr bwMode="auto">
           <a:xfrm>
-            <a:off x="251520" y="5410919"/>
-            <a:ext cx="5819775" cy="1114425"/>
+            <a:off x="251521" y="4149080"/>
+            <a:ext cx="8640960" cy="676275"/>
           </a:xfrm>
           <a:prstGeom prst="rect">
             <a:avLst/>
@@ -12860,49 +13422,16 @@
       </p:pic>
       <p:sp>
         <p:nvSpPr>
-          <p:cNvPr id="37" name="36 CuadroTexto"/>
-          <p:cNvSpPr txBox="1"/>
-          <p:nvPr/>
-        </p:nvSpPr>
-        <p:spPr>
-          <a:xfrm>
-            <a:off x="179512" y="5014337"/>
-            <a:ext cx="2544351" cy="369332"/>
-          </a:xfrm>
-          <a:prstGeom prst="rect">
-            <a:avLst/>
-          </a:prstGeom>
-          <a:noFill/>
-        </p:spPr>
-        <p:txBody>
-          <a:bodyPr wrap="none" rtlCol="0">
-            <a:spAutoFit/>
-          </a:bodyPr>
-          <a:lstStyle/>
-          <a:p>
-            <a:r>
-              <a:rPr lang="es-AR" dirty="0" err="1" smtClean="0"/>
-              <a:t>Code</a:t>
-            </a:r>
-            <a:r>
-              <a:rPr lang="es-AR" dirty="0" smtClean="0"/>
-              <a:t> Tracking: Eclipse</a:t>
-            </a:r>
-          </a:p>
-        </p:txBody>
-      </p:sp>
-      <p:sp>
-        <p:nvSpPr>
-          <p:cNvPr id="40" name="39 Rectángulo redondeado"/>
+          <p:cNvPr id="33" name="32 Elipse"/>
           <p:cNvSpPr/>
           <p:nvPr/>
         </p:nvSpPr>
         <p:spPr>
           <a:xfrm>
-            <a:off x="179512" y="5877272"/>
-            <a:ext cx="5904656" cy="720080"/>
-          </a:xfrm>
-          <a:prstGeom prst="roundRect">
+            <a:off x="5436096" y="4365104"/>
+            <a:ext cx="648072" cy="432048"/>
+          </a:xfrm>
+          <a:prstGeom prst="ellipse">
             <a:avLst/>
           </a:prstGeom>
           <a:noFill/>
@@ -12943,14 +13472,14 @@
       </p:sp>
       <p:sp>
         <p:nvSpPr>
-          <p:cNvPr id="41" name="40 CuadroTexto"/>
+          <p:cNvPr id="34" name="33 CuadroTexto"/>
           <p:cNvSpPr txBox="1"/>
           <p:nvPr/>
         </p:nvSpPr>
         <p:spPr>
           <a:xfrm>
-            <a:off x="6300192" y="1918573"/>
-            <a:ext cx="2448272" cy="923330"/>
+            <a:off x="179512" y="2566065"/>
+            <a:ext cx="1959191" cy="430887"/>
           </a:xfrm>
           <a:prstGeom prst="rect">
             <a:avLst/>
@@ -12958,45 +13487,28 @@
           <a:noFill/>
         </p:spPr>
         <p:txBody>
-          <a:bodyPr wrap="square" rtlCol="0">
+          <a:bodyPr wrap="none" rtlCol="0">
             <a:spAutoFit/>
           </a:bodyPr>
           <a:lstStyle/>
           <a:p>
             <a:r>
-              <a:rPr lang="es-AR" dirty="0" smtClean="0"/>
-              <a:t>UAT Tracking:</a:t>
-            </a:r>
-          </a:p>
-          <a:p>
-            <a:r>
-              <a:rPr lang="es-AR" dirty="0" smtClean="0"/>
-              <a:t>Google </a:t>
-            </a:r>
-            <a:r>
-              <a:rPr lang="es-AR" dirty="0" err="1" smtClean="0"/>
-              <a:t>Spreadsheets</a:t>
-            </a:r>
-            <a:endParaRPr lang="es-AR" dirty="0" smtClean="0"/>
-          </a:p>
-          <a:p>
-            <a:r>
-              <a:rPr lang="es-AR" dirty="0" smtClean="0"/>
-              <a:t>“S-01031_UATn”</a:t>
-            </a:r>
-          </a:p>
-        </p:txBody>
-      </p:sp>
-      <p:sp>
-        <p:nvSpPr>
-          <p:cNvPr id="42" name="41 CuadroTexto"/>
+              <a:rPr lang="es-AR" sz="2200" b="1" dirty="0" smtClean="0"/>
+              <a:t>Presentación</a:t>
+            </a:r>
+          </a:p>
+        </p:txBody>
+      </p:sp>
+      <p:sp>
+        <p:nvSpPr>
+          <p:cNvPr id="35" name="34 CuadroTexto"/>
           <p:cNvSpPr txBox="1"/>
           <p:nvPr/>
         </p:nvSpPr>
         <p:spPr>
           <a:xfrm>
-            <a:off x="6300192" y="5373216"/>
-            <a:ext cx="2448272" cy="923330"/>
+            <a:off x="179512" y="1557953"/>
+            <a:ext cx="5667064" cy="369332"/>
           </a:xfrm>
           <a:prstGeom prst="rect">
             <a:avLst/>
@@ -13004,46 +13516,200 @@
           <a:noFill/>
         </p:spPr>
         <p:txBody>
-          <a:bodyPr wrap="square" rtlCol="0">
+          <a:bodyPr wrap="none" rtlCol="0">
             <a:spAutoFit/>
           </a:bodyPr>
           <a:lstStyle/>
           <a:p>
             <a:r>
               <a:rPr lang="es-AR" dirty="0" err="1" smtClean="0"/>
-              <a:t>Issue</a:t>
+              <a:t>Scrum</a:t>
             </a:r>
             <a:r>
               <a:rPr lang="es-AR" dirty="0" smtClean="0"/>
-              <a:t> Tracking:</a:t>
-            </a:r>
-          </a:p>
-          <a:p>
+              <a:t> Tracking: </a:t>
+            </a:r>
+            <a:r>
+              <a:rPr lang="es-AR" dirty="0" err="1" smtClean="0"/>
+              <a:t>Version</a:t>
+            </a:r>
             <a:r>
               <a:rPr lang="es-AR" dirty="0" smtClean="0"/>
-              <a:t>Google </a:t>
+              <a:t> </a:t>
+            </a:r>
+            <a:r>
+              <a:rPr lang="es-AR" dirty="0" err="1" smtClean="0"/>
+              <a:t>One</a:t>
+            </a:r>
+            <a:r>
+              <a:rPr lang="es-AR" dirty="0" smtClean="0"/>
+              <a:t> (</a:t>
+            </a:r>
+            <a:r>
+              <a:rPr lang="es-AR" dirty="0" err="1" smtClean="0"/>
+              <a:t>Product</a:t>
+            </a:r>
+            <a:r>
+              <a:rPr lang="es-AR" dirty="0" smtClean="0"/>
+              <a:t> </a:t>
+            </a:r>
+            <a:r>
+              <a:rPr lang="es-AR" dirty="0" err="1" smtClean="0"/>
+              <a:t>Backlog</a:t>
+            </a:r>
+            <a:r>
+              <a:rPr lang="es-AR" dirty="0" smtClean="0"/>
+              <a:t> + US)</a:t>
+            </a:r>
+          </a:p>
+        </p:txBody>
+      </p:sp>
+      <p:sp>
+        <p:nvSpPr>
+          <p:cNvPr id="36" name="35 CuadroTexto"/>
+          <p:cNvSpPr txBox="1"/>
+          <p:nvPr/>
+        </p:nvSpPr>
+        <p:spPr>
+          <a:xfrm>
+            <a:off x="179512" y="3790201"/>
+            <a:ext cx="3082960" cy="369332"/>
+          </a:xfrm>
+          <a:prstGeom prst="rect">
+            <a:avLst/>
+          </a:prstGeom>
+          <a:noFill/>
+        </p:spPr>
+        <p:txBody>
+          <a:bodyPr wrap="none" rtlCol="0">
+            <a:spAutoFit/>
+          </a:bodyPr>
+          <a:lstStyle/>
+          <a:p>
+            <a:r>
+              <a:rPr lang="es-AR" dirty="0" smtClean="0"/>
+              <a:t>SVN Tracking: Google </a:t>
             </a:r>
             <a:r>
               <a:rPr lang="es-AR" dirty="0" err="1" smtClean="0"/>
               <a:t>Code</a:t>
             </a:r>
+            <a:endParaRPr lang="es-AR" dirty="0" smtClean="0"/>
+          </a:p>
+        </p:txBody>
+      </p:sp>
+      <p:pic>
+        <p:nvPicPr>
+          <p:cNvPr id="18436" name="Picture 4"/>
+          <p:cNvPicPr>
+            <a:picLocks noChangeAspect="1" noChangeArrowheads="1"/>
+          </p:cNvPicPr>
+          <p:nvPr/>
+        </p:nvPicPr>
+        <p:blipFill>
+          <a:blip r:embed="rId6" cstate="print"/>
+          <a:srcRect/>
+          <a:stretch>
+            <a:fillRect/>
+          </a:stretch>
+        </p:blipFill>
+        <p:spPr bwMode="auto">
+          <a:xfrm>
+            <a:off x="251520" y="5410919"/>
+            <a:ext cx="5819775" cy="1114425"/>
+          </a:xfrm>
+          <a:prstGeom prst="rect">
+            <a:avLst/>
+          </a:prstGeom>
+          <a:noFill/>
+          <a:ln w="9525">
+            <a:noFill/>
+            <a:miter lim="800000"/>
+            <a:headEnd/>
+            <a:tailEnd/>
+          </a:ln>
+        </p:spPr>
+      </p:pic>
+      <p:sp>
+        <p:nvSpPr>
+          <p:cNvPr id="37" name="36 CuadroTexto"/>
+          <p:cNvSpPr txBox="1"/>
+          <p:nvPr/>
+        </p:nvSpPr>
+        <p:spPr>
+          <a:xfrm>
+            <a:off x="179512" y="5014337"/>
+            <a:ext cx="2544351" cy="369332"/>
+          </a:xfrm>
+          <a:prstGeom prst="rect">
+            <a:avLst/>
+          </a:prstGeom>
+          <a:noFill/>
+        </p:spPr>
+        <p:txBody>
+          <a:bodyPr wrap="none" rtlCol="0">
+            <a:spAutoFit/>
+          </a:bodyPr>
+          <a:lstStyle/>
+          <a:p>
+            <a:r>
+              <a:rPr lang="es-AR" dirty="0" err="1" smtClean="0"/>
+              <a:t>Code</a:t>
+            </a:r>
             <a:r>
               <a:rPr lang="es-AR" dirty="0" smtClean="0"/>
-              <a:t> </a:t>
-            </a:r>
-            <a:r>
-              <a:rPr lang="es-AR" dirty="0" err="1" smtClean="0"/>
-              <a:t>Issue</a:t>
-            </a:r>
-            <a:r>
-              <a:rPr lang="es-AR" dirty="0" smtClean="0"/>
-              <a:t> </a:t>
-            </a:r>
-            <a:r>
-              <a:rPr lang="es-AR" dirty="0" err="1" smtClean="0"/>
-              <a:t>Tracker</a:t>
-            </a:r>
-            <a:endParaRPr lang="es-AR" dirty="0" smtClean="0"/>
+              <a:t> Tracking: Eclipse</a:t>
+            </a:r>
+          </a:p>
+        </p:txBody>
+      </p:sp>
+      <p:sp>
+        <p:nvSpPr>
+          <p:cNvPr id="40" name="39 Rectángulo redondeado"/>
+          <p:cNvSpPr/>
+          <p:nvPr/>
+        </p:nvSpPr>
+        <p:spPr>
+          <a:xfrm>
+            <a:off x="179512" y="5877272"/>
+            <a:ext cx="5904656" cy="720080"/>
+          </a:xfrm>
+          <a:prstGeom prst="roundRect">
+            <a:avLst/>
+          </a:prstGeom>
+          <a:noFill/>
+          <a:ln w="57150">
+            <a:solidFill>
+              <a:srgbClr val="FF0000"/>
+            </a:solidFill>
+          </a:ln>
+        </p:spPr>
+        <p:style>
+          <a:lnRef idx="2">
+            <a:schemeClr val="accent6"/>
+          </a:lnRef>
+          <a:fillRef idx="1">
+            <a:schemeClr val="lt1"/>
+          </a:fillRef>
+          <a:effectRef idx="0">
+            <a:schemeClr val="accent6"/>
+          </a:effectRef>
+          <a:fontRef idx="minor">
+            <a:schemeClr val="dk1"/>
+          </a:fontRef>
+        </p:style>
+        <p:txBody>
+          <a:bodyPr rtlCol="0" anchor="ctr"/>
+          <a:lstStyle/>
+          <a:p>
+            <a:pPr algn="ctr"/>
+            <a:endParaRPr lang="es-AR">
+              <a:ln>
+                <a:solidFill>
+                  <a:srgbClr val="FF0000"/>
+                </a:solidFill>
+              </a:ln>
+            </a:endParaRPr>
           </a:p>
         </p:txBody>
       </p:sp>
@@ -13079,6 +13745,922 @@
           <a:chExt cx="0" cy="0"/>
         </a:xfrm>
       </p:grpSpPr>
+      <p:sp>
+        <p:nvSpPr>
+          <p:cNvPr id="2" name="1 Título"/>
+          <p:cNvSpPr>
+            <a:spLocks noGrp="1"/>
+          </p:cNvSpPr>
+          <p:nvPr>
+            <p:ph type="title"/>
+          </p:nvPr>
+        </p:nvSpPr>
+        <p:spPr>
+          <a:xfrm>
+            <a:off x="457200" y="629816"/>
+            <a:ext cx="7467600" cy="1143000"/>
+          </a:xfrm>
+        </p:spPr>
+        <p:txBody>
+          <a:bodyPr>
+            <a:normAutofit/>
+          </a:bodyPr>
+          <a:lstStyle/>
+          <a:p>
+            <a:pPr eaLnBrk="1" fontAlgn="auto" hangingPunct="1">
+              <a:spcAft>
+                <a:spcPts val="0"/>
+              </a:spcAft>
+              <a:defRPr/>
+            </a:pPr>
+            <a:r>
+              <a:rPr lang="es-ES" sz="4000" dirty="0" smtClean="0">
+                <a:effectLst>
+                  <a:glow rad="139700">
+                    <a:schemeClr val="accent1">
+                      <a:satMod val="175000"/>
+                      <a:alpha val="40000"/>
+                    </a:schemeClr>
+                  </a:glow>
+                </a:effectLst>
+              </a:rPr>
+              <a:t>Trazabilidad</a:t>
+            </a:r>
+            <a:endParaRPr lang="es-ES" sz="4000" dirty="0"/>
+          </a:p>
+        </p:txBody>
+      </p:sp>
+      <p:sp>
+        <p:nvSpPr>
+          <p:cNvPr id="12" name="11 Rectángulo redondeado"/>
+          <p:cNvSpPr/>
+          <p:nvPr/>
+        </p:nvSpPr>
+        <p:spPr>
+          <a:xfrm>
+            <a:off x="539552" y="404664"/>
+            <a:ext cx="288032" cy="288032"/>
+          </a:xfrm>
+          <a:prstGeom prst="roundRect">
+            <a:avLst/>
+          </a:prstGeom>
+          <a:effectLst/>
+        </p:spPr>
+        <p:style>
+          <a:lnRef idx="1">
+            <a:schemeClr val="accent1"/>
+          </a:lnRef>
+          <a:fillRef idx="2">
+            <a:schemeClr val="accent1"/>
+          </a:fillRef>
+          <a:effectRef idx="1">
+            <a:schemeClr val="accent1"/>
+          </a:effectRef>
+          <a:fontRef idx="minor">
+            <a:schemeClr val="dk1"/>
+          </a:fontRef>
+        </p:style>
+        <p:txBody>
+          <a:bodyPr rtlCol="0" anchor="ctr"/>
+          <a:lstStyle/>
+          <a:p>
+            <a:pPr algn="ctr"/>
+            <a:endParaRPr lang="es-AR" sz="1000" b="1" dirty="0" smtClean="0"/>
+          </a:p>
+        </p:txBody>
+      </p:sp>
+      <p:cxnSp>
+        <p:nvCxnSpPr>
+          <p:cNvPr id="13" name="12 Conector recto"/>
+          <p:cNvCxnSpPr>
+            <a:stCxn id="12" idx="3"/>
+            <a:endCxn id="23" idx="1"/>
+          </p:cNvCxnSpPr>
+          <p:nvPr/>
+        </p:nvCxnSpPr>
+        <p:spPr>
+          <a:xfrm>
+            <a:off x="827584" y="548680"/>
+            <a:ext cx="576064" cy="0"/>
+          </a:xfrm>
+          <a:prstGeom prst="line">
+            <a:avLst/>
+          </a:prstGeom>
+        </p:spPr>
+        <p:style>
+          <a:lnRef idx="1">
+            <a:schemeClr val="accent1"/>
+          </a:lnRef>
+          <a:fillRef idx="0">
+            <a:schemeClr val="accent1"/>
+          </a:fillRef>
+          <a:effectRef idx="0">
+            <a:schemeClr val="accent1"/>
+          </a:effectRef>
+          <a:fontRef idx="minor">
+            <a:schemeClr val="tx1"/>
+          </a:fontRef>
+        </p:style>
+      </p:cxnSp>
+      <p:cxnSp>
+        <p:nvCxnSpPr>
+          <p:cNvPr id="14" name="13 Conector recto"/>
+          <p:cNvCxnSpPr>
+            <a:stCxn id="23" idx="3"/>
+            <a:endCxn id="25" idx="1"/>
+          </p:cNvCxnSpPr>
+          <p:nvPr/>
+        </p:nvCxnSpPr>
+        <p:spPr>
+          <a:xfrm>
+            <a:off x="1691680" y="548680"/>
+            <a:ext cx="576064" cy="0"/>
+          </a:xfrm>
+          <a:prstGeom prst="line">
+            <a:avLst/>
+          </a:prstGeom>
+        </p:spPr>
+        <p:style>
+          <a:lnRef idx="1">
+            <a:schemeClr val="accent1"/>
+          </a:lnRef>
+          <a:fillRef idx="0">
+            <a:schemeClr val="accent1"/>
+          </a:fillRef>
+          <a:effectRef idx="0">
+            <a:schemeClr val="accent1"/>
+          </a:effectRef>
+          <a:fontRef idx="minor">
+            <a:schemeClr val="tx1"/>
+          </a:fontRef>
+        </p:style>
+      </p:cxnSp>
+      <p:cxnSp>
+        <p:nvCxnSpPr>
+          <p:cNvPr id="15" name="14 Conector recto"/>
+          <p:cNvCxnSpPr>
+            <a:stCxn id="25" idx="3"/>
+            <a:endCxn id="26" idx="1"/>
+          </p:cNvCxnSpPr>
+          <p:nvPr/>
+        </p:nvCxnSpPr>
+        <p:spPr>
+          <a:xfrm>
+            <a:off x="2555776" y="548680"/>
+            <a:ext cx="576064" cy="0"/>
+          </a:xfrm>
+          <a:prstGeom prst="line">
+            <a:avLst/>
+          </a:prstGeom>
+        </p:spPr>
+        <p:style>
+          <a:lnRef idx="1">
+            <a:schemeClr val="accent1"/>
+          </a:lnRef>
+          <a:fillRef idx="0">
+            <a:schemeClr val="accent1"/>
+          </a:fillRef>
+          <a:effectRef idx="0">
+            <a:schemeClr val="accent1"/>
+          </a:effectRef>
+          <a:fontRef idx="minor">
+            <a:schemeClr val="tx1"/>
+          </a:fontRef>
+        </p:style>
+      </p:cxnSp>
+      <p:cxnSp>
+        <p:nvCxnSpPr>
+          <p:cNvPr id="16" name="15 Conector recto"/>
+          <p:cNvCxnSpPr>
+            <a:stCxn id="26" idx="3"/>
+            <a:endCxn id="27" idx="1"/>
+          </p:cNvCxnSpPr>
+          <p:nvPr/>
+        </p:nvCxnSpPr>
+        <p:spPr>
+          <a:xfrm>
+            <a:off x="3419872" y="548680"/>
+            <a:ext cx="576064" cy="0"/>
+          </a:xfrm>
+          <a:prstGeom prst="line">
+            <a:avLst/>
+          </a:prstGeom>
+        </p:spPr>
+        <p:style>
+          <a:lnRef idx="1">
+            <a:schemeClr val="accent1"/>
+          </a:lnRef>
+          <a:fillRef idx="0">
+            <a:schemeClr val="accent1"/>
+          </a:fillRef>
+          <a:effectRef idx="0">
+            <a:schemeClr val="accent1"/>
+          </a:effectRef>
+          <a:fontRef idx="minor">
+            <a:schemeClr val="tx1"/>
+          </a:fontRef>
+        </p:style>
+      </p:cxnSp>
+      <p:cxnSp>
+        <p:nvCxnSpPr>
+          <p:cNvPr id="21" name="20 Conector recto"/>
+          <p:cNvCxnSpPr>
+            <a:stCxn id="27" idx="3"/>
+            <a:endCxn id="28" idx="1"/>
+          </p:cNvCxnSpPr>
+          <p:nvPr/>
+        </p:nvCxnSpPr>
+        <p:spPr>
+          <a:xfrm>
+            <a:off x="4283968" y="548680"/>
+            <a:ext cx="576064" cy="0"/>
+          </a:xfrm>
+          <a:prstGeom prst="line">
+            <a:avLst/>
+          </a:prstGeom>
+        </p:spPr>
+        <p:style>
+          <a:lnRef idx="1">
+            <a:schemeClr val="accent1"/>
+          </a:lnRef>
+          <a:fillRef idx="0">
+            <a:schemeClr val="accent1"/>
+          </a:fillRef>
+          <a:effectRef idx="0">
+            <a:schemeClr val="accent1"/>
+          </a:effectRef>
+          <a:fontRef idx="minor">
+            <a:schemeClr val="tx1"/>
+          </a:fontRef>
+        </p:style>
+      </p:cxnSp>
+      <p:cxnSp>
+        <p:nvCxnSpPr>
+          <p:cNvPr id="22" name="21 Conector recto"/>
+          <p:cNvCxnSpPr>
+            <a:stCxn id="28" idx="3"/>
+            <a:endCxn id="29" idx="1"/>
+          </p:cNvCxnSpPr>
+          <p:nvPr/>
+        </p:nvCxnSpPr>
+        <p:spPr>
+          <a:xfrm>
+            <a:off x="5148064" y="548680"/>
+            <a:ext cx="576064" cy="0"/>
+          </a:xfrm>
+          <a:prstGeom prst="line">
+            <a:avLst/>
+          </a:prstGeom>
+        </p:spPr>
+        <p:style>
+          <a:lnRef idx="1">
+            <a:schemeClr val="accent1"/>
+          </a:lnRef>
+          <a:fillRef idx="0">
+            <a:schemeClr val="accent1"/>
+          </a:fillRef>
+          <a:effectRef idx="0">
+            <a:schemeClr val="accent1"/>
+          </a:effectRef>
+          <a:fontRef idx="minor">
+            <a:schemeClr val="tx1"/>
+          </a:fontRef>
+        </p:style>
+      </p:cxnSp>
+      <p:sp>
+        <p:nvSpPr>
+          <p:cNvPr id="23" name="22 Rectángulo redondeado"/>
+          <p:cNvSpPr/>
+          <p:nvPr/>
+        </p:nvSpPr>
+        <p:spPr>
+          <a:xfrm>
+            <a:off x="1403648" y="404664"/>
+            <a:ext cx="288032" cy="288032"/>
+          </a:xfrm>
+          <a:prstGeom prst="roundRect">
+            <a:avLst/>
+          </a:prstGeom>
+          <a:effectLst>
+            <a:glow rad="228600">
+              <a:schemeClr val="accent1">
+                <a:satMod val="175000"/>
+                <a:alpha val="40000"/>
+              </a:schemeClr>
+            </a:glow>
+          </a:effectLst>
+        </p:spPr>
+        <p:style>
+          <a:lnRef idx="1">
+            <a:schemeClr val="accent1"/>
+          </a:lnRef>
+          <a:fillRef idx="2">
+            <a:schemeClr val="accent1"/>
+          </a:fillRef>
+          <a:effectRef idx="1">
+            <a:schemeClr val="accent1"/>
+          </a:effectRef>
+          <a:fontRef idx="minor">
+            <a:schemeClr val="dk1"/>
+          </a:fontRef>
+        </p:style>
+        <p:txBody>
+          <a:bodyPr rtlCol="0" anchor="ctr"/>
+          <a:lstStyle/>
+          <a:p>
+            <a:pPr algn="ctr"/>
+            <a:endParaRPr lang="es-AR" sz="1000" b="1" dirty="0" smtClean="0"/>
+          </a:p>
+        </p:txBody>
+      </p:sp>
+      <p:sp>
+        <p:nvSpPr>
+          <p:cNvPr id="25" name="24 Rectángulo redondeado"/>
+          <p:cNvSpPr/>
+          <p:nvPr/>
+        </p:nvSpPr>
+        <p:spPr>
+          <a:xfrm>
+            <a:off x="2267744" y="404664"/>
+            <a:ext cx="288032" cy="288032"/>
+          </a:xfrm>
+          <a:prstGeom prst="roundRect">
+            <a:avLst/>
+          </a:prstGeom>
+          <a:effectLst/>
+        </p:spPr>
+        <p:style>
+          <a:lnRef idx="1">
+            <a:schemeClr val="accent1"/>
+          </a:lnRef>
+          <a:fillRef idx="2">
+            <a:schemeClr val="accent1"/>
+          </a:fillRef>
+          <a:effectRef idx="1">
+            <a:schemeClr val="accent1"/>
+          </a:effectRef>
+          <a:fontRef idx="minor">
+            <a:schemeClr val="dk1"/>
+          </a:fontRef>
+        </p:style>
+        <p:txBody>
+          <a:bodyPr rtlCol="0" anchor="ctr"/>
+          <a:lstStyle/>
+          <a:p>
+            <a:pPr algn="ctr"/>
+            <a:endParaRPr lang="es-AR" sz="1000" b="1" dirty="0" smtClean="0"/>
+          </a:p>
+        </p:txBody>
+      </p:sp>
+      <p:sp>
+        <p:nvSpPr>
+          <p:cNvPr id="26" name="25 Rectángulo redondeado"/>
+          <p:cNvSpPr/>
+          <p:nvPr/>
+        </p:nvSpPr>
+        <p:spPr>
+          <a:xfrm>
+            <a:off x="3131840" y="404664"/>
+            <a:ext cx="288032" cy="288032"/>
+          </a:xfrm>
+          <a:prstGeom prst="roundRect">
+            <a:avLst/>
+          </a:prstGeom>
+          <a:effectLst/>
+        </p:spPr>
+        <p:style>
+          <a:lnRef idx="1">
+            <a:schemeClr val="accent1"/>
+          </a:lnRef>
+          <a:fillRef idx="2">
+            <a:schemeClr val="accent1"/>
+          </a:fillRef>
+          <a:effectRef idx="1">
+            <a:schemeClr val="accent1"/>
+          </a:effectRef>
+          <a:fontRef idx="minor">
+            <a:schemeClr val="dk1"/>
+          </a:fontRef>
+        </p:style>
+        <p:txBody>
+          <a:bodyPr rtlCol="0" anchor="ctr"/>
+          <a:lstStyle/>
+          <a:p>
+            <a:pPr algn="ctr"/>
+            <a:endParaRPr lang="es-AR" sz="1000" b="1" dirty="0" smtClean="0"/>
+          </a:p>
+        </p:txBody>
+      </p:sp>
+      <p:sp>
+        <p:nvSpPr>
+          <p:cNvPr id="27" name="26 Rectángulo redondeado"/>
+          <p:cNvSpPr/>
+          <p:nvPr/>
+        </p:nvSpPr>
+        <p:spPr>
+          <a:xfrm>
+            <a:off x="3995936" y="404664"/>
+            <a:ext cx="288032" cy="288032"/>
+          </a:xfrm>
+          <a:prstGeom prst="roundRect">
+            <a:avLst/>
+          </a:prstGeom>
+          <a:effectLst/>
+        </p:spPr>
+        <p:style>
+          <a:lnRef idx="1">
+            <a:schemeClr val="accent1"/>
+          </a:lnRef>
+          <a:fillRef idx="2">
+            <a:schemeClr val="accent1"/>
+          </a:fillRef>
+          <a:effectRef idx="1">
+            <a:schemeClr val="accent1"/>
+          </a:effectRef>
+          <a:fontRef idx="minor">
+            <a:schemeClr val="dk1"/>
+          </a:fontRef>
+        </p:style>
+        <p:txBody>
+          <a:bodyPr rtlCol="0" anchor="ctr"/>
+          <a:lstStyle/>
+          <a:p>
+            <a:pPr algn="ctr"/>
+            <a:endParaRPr lang="es-AR" sz="1000" b="1" dirty="0" smtClean="0"/>
+          </a:p>
+        </p:txBody>
+      </p:sp>
+      <p:sp>
+        <p:nvSpPr>
+          <p:cNvPr id="28" name="27 Rectángulo redondeado"/>
+          <p:cNvSpPr/>
+          <p:nvPr/>
+        </p:nvSpPr>
+        <p:spPr>
+          <a:xfrm>
+            <a:off x="4860032" y="404664"/>
+            <a:ext cx="288032" cy="288032"/>
+          </a:xfrm>
+          <a:prstGeom prst="roundRect">
+            <a:avLst/>
+          </a:prstGeom>
+          <a:effectLst/>
+        </p:spPr>
+        <p:style>
+          <a:lnRef idx="1">
+            <a:schemeClr val="accent1"/>
+          </a:lnRef>
+          <a:fillRef idx="2">
+            <a:schemeClr val="accent1"/>
+          </a:fillRef>
+          <a:effectRef idx="1">
+            <a:schemeClr val="accent1"/>
+          </a:effectRef>
+          <a:fontRef idx="minor">
+            <a:schemeClr val="dk1"/>
+          </a:fontRef>
+        </p:style>
+        <p:txBody>
+          <a:bodyPr rtlCol="0" anchor="ctr"/>
+          <a:lstStyle/>
+          <a:p>
+            <a:pPr algn="ctr"/>
+            <a:endParaRPr lang="es-AR" sz="1000" b="1" dirty="0" smtClean="0"/>
+          </a:p>
+        </p:txBody>
+      </p:sp>
+      <p:sp>
+        <p:nvSpPr>
+          <p:cNvPr id="29" name="28 Rectángulo redondeado"/>
+          <p:cNvSpPr/>
+          <p:nvPr/>
+        </p:nvSpPr>
+        <p:spPr>
+          <a:xfrm>
+            <a:off x="5724128" y="404664"/>
+            <a:ext cx="288032" cy="288032"/>
+          </a:xfrm>
+          <a:prstGeom prst="roundRect">
+            <a:avLst/>
+          </a:prstGeom>
+          <a:effectLst/>
+        </p:spPr>
+        <p:style>
+          <a:lnRef idx="1">
+            <a:schemeClr val="accent1"/>
+          </a:lnRef>
+          <a:fillRef idx="2">
+            <a:schemeClr val="accent1"/>
+          </a:fillRef>
+          <a:effectRef idx="1">
+            <a:schemeClr val="accent1"/>
+          </a:effectRef>
+          <a:fontRef idx="minor">
+            <a:schemeClr val="dk1"/>
+          </a:fontRef>
+        </p:style>
+        <p:txBody>
+          <a:bodyPr rtlCol="0" anchor="ctr"/>
+          <a:lstStyle/>
+          <a:p>
+            <a:pPr algn="ctr"/>
+            <a:endParaRPr lang="es-AR" sz="1000" b="1" dirty="0" smtClean="0"/>
+          </a:p>
+        </p:txBody>
+      </p:sp>
+      <p:pic>
+        <p:nvPicPr>
+          <p:cNvPr id="30" name="Picture 3"/>
+          <p:cNvPicPr>
+            <a:picLocks noChangeAspect="1" noChangeArrowheads="1"/>
+          </p:cNvPicPr>
+          <p:nvPr/>
+        </p:nvPicPr>
+        <p:blipFill>
+          <a:blip r:embed="rId3" cstate="print"/>
+          <a:srcRect/>
+          <a:stretch>
+            <a:fillRect/>
+          </a:stretch>
+        </p:blipFill>
+        <p:spPr bwMode="auto">
+          <a:xfrm>
+            <a:off x="7812088" y="410692"/>
+            <a:ext cx="1008062" cy="354012"/>
+          </a:xfrm>
+          <a:prstGeom prst="rect">
+            <a:avLst/>
+          </a:prstGeom>
+          <a:ln>
+            <a:headEnd/>
+            <a:tailEnd/>
+          </a:ln>
+        </p:spPr>
+        <p:style>
+          <a:lnRef idx="3">
+            <a:schemeClr val="lt1"/>
+          </a:lnRef>
+          <a:fillRef idx="1">
+            <a:schemeClr val="accent6"/>
+          </a:fillRef>
+          <a:effectRef idx="1">
+            <a:schemeClr val="accent6"/>
+          </a:effectRef>
+          <a:fontRef idx="minor">
+            <a:schemeClr val="lt1"/>
+          </a:fontRef>
+        </p:style>
+      </p:pic>
+      <p:sp>
+        <p:nvSpPr>
+          <p:cNvPr id="41" name="40 CuadroTexto"/>
+          <p:cNvSpPr txBox="1"/>
+          <p:nvPr/>
+        </p:nvSpPr>
+        <p:spPr>
+          <a:xfrm>
+            <a:off x="467544" y="1700808"/>
+            <a:ext cx="7920880" cy="369332"/>
+          </a:xfrm>
+          <a:prstGeom prst="rect">
+            <a:avLst/>
+          </a:prstGeom>
+          <a:noFill/>
+        </p:spPr>
+        <p:txBody>
+          <a:bodyPr wrap="square" rtlCol="0">
+            <a:spAutoFit/>
+          </a:bodyPr>
+          <a:lstStyle/>
+          <a:p>
+            <a:r>
+              <a:rPr lang="es-AR" dirty="0" smtClean="0"/>
+              <a:t>UAT </a:t>
+            </a:r>
+            <a:r>
+              <a:rPr lang="es-AR" dirty="0" smtClean="0"/>
+              <a:t>Tracking: Google </a:t>
+            </a:r>
+            <a:r>
+              <a:rPr lang="es-AR" dirty="0" err="1" smtClean="0"/>
+              <a:t>Spreadsheets</a:t>
+            </a:r>
+            <a:r>
+              <a:rPr lang="es-AR" dirty="0" smtClean="0"/>
+              <a:t> “</a:t>
+            </a:r>
+            <a:r>
+              <a:rPr lang="es-AR" dirty="0" smtClean="0"/>
+              <a:t>S-01007_UATn”</a:t>
+            </a:r>
+            <a:endParaRPr lang="es-AR" dirty="0" smtClean="0"/>
+          </a:p>
+        </p:txBody>
+      </p:sp>
+      <p:sp>
+        <p:nvSpPr>
+          <p:cNvPr id="42" name="41 CuadroTexto"/>
+          <p:cNvSpPr txBox="1"/>
+          <p:nvPr/>
+        </p:nvSpPr>
+        <p:spPr>
+          <a:xfrm>
+            <a:off x="467544" y="4365104"/>
+            <a:ext cx="7920880" cy="369332"/>
+          </a:xfrm>
+          <a:prstGeom prst="rect">
+            <a:avLst/>
+          </a:prstGeom>
+          <a:noFill/>
+        </p:spPr>
+        <p:txBody>
+          <a:bodyPr wrap="square" rtlCol="0">
+            <a:spAutoFit/>
+          </a:bodyPr>
+          <a:lstStyle/>
+          <a:p>
+            <a:r>
+              <a:rPr lang="es-AR" dirty="0" err="1" smtClean="0"/>
+              <a:t>Issue</a:t>
+            </a:r>
+            <a:r>
+              <a:rPr lang="es-AR" dirty="0" smtClean="0"/>
+              <a:t> </a:t>
+            </a:r>
+            <a:r>
+              <a:rPr lang="es-AR" dirty="0" smtClean="0"/>
+              <a:t>Tracking: Google </a:t>
+            </a:r>
+            <a:r>
+              <a:rPr lang="es-AR" dirty="0" err="1" smtClean="0"/>
+              <a:t>Code</a:t>
+            </a:r>
+            <a:r>
+              <a:rPr lang="es-AR" dirty="0" smtClean="0"/>
+              <a:t> </a:t>
+            </a:r>
+            <a:r>
+              <a:rPr lang="es-AR" dirty="0" err="1" smtClean="0"/>
+              <a:t>Issue</a:t>
+            </a:r>
+            <a:r>
+              <a:rPr lang="es-AR" dirty="0" smtClean="0"/>
+              <a:t> </a:t>
+            </a:r>
+            <a:r>
+              <a:rPr lang="es-AR" dirty="0" err="1" smtClean="0"/>
+              <a:t>Tracker</a:t>
+            </a:r>
+            <a:endParaRPr lang="es-AR" dirty="0" smtClean="0"/>
+          </a:p>
+        </p:txBody>
+      </p:sp>
+      <p:pic>
+        <p:nvPicPr>
+          <p:cNvPr id="1027" name="Picture 3"/>
+          <p:cNvPicPr>
+            <a:picLocks noChangeAspect="1" noChangeArrowheads="1"/>
+          </p:cNvPicPr>
+          <p:nvPr/>
+        </p:nvPicPr>
+        <p:blipFill>
+          <a:blip r:embed="rId4" cstate="print"/>
+          <a:srcRect/>
+          <a:stretch>
+            <a:fillRect/>
+          </a:stretch>
+        </p:blipFill>
+        <p:spPr bwMode="auto">
+          <a:xfrm>
+            <a:off x="742950" y="2204864"/>
+            <a:ext cx="7658100" cy="2009775"/>
+          </a:xfrm>
+          <a:prstGeom prst="rect">
+            <a:avLst/>
+          </a:prstGeom>
+          <a:noFill/>
+          <a:ln w="9525">
+            <a:noFill/>
+            <a:miter lim="800000"/>
+            <a:headEnd/>
+            <a:tailEnd/>
+          </a:ln>
+        </p:spPr>
+      </p:pic>
+      <p:sp>
+        <p:nvSpPr>
+          <p:cNvPr id="31" name="30 Elipse"/>
+          <p:cNvSpPr/>
+          <p:nvPr/>
+        </p:nvSpPr>
+        <p:spPr>
+          <a:xfrm>
+            <a:off x="827584" y="3068960"/>
+            <a:ext cx="1080120" cy="432048"/>
+          </a:xfrm>
+          <a:prstGeom prst="ellipse">
+            <a:avLst/>
+          </a:prstGeom>
+          <a:noFill/>
+          <a:ln w="57150">
+            <a:solidFill>
+              <a:srgbClr val="FF0000"/>
+            </a:solidFill>
+          </a:ln>
+        </p:spPr>
+        <p:style>
+          <a:lnRef idx="2">
+            <a:schemeClr val="accent6"/>
+          </a:lnRef>
+          <a:fillRef idx="1">
+            <a:schemeClr val="lt1"/>
+          </a:fillRef>
+          <a:effectRef idx="0">
+            <a:schemeClr val="accent6"/>
+          </a:effectRef>
+          <a:fontRef idx="minor">
+            <a:schemeClr val="dk1"/>
+          </a:fontRef>
+        </p:style>
+        <p:txBody>
+          <a:bodyPr rtlCol="0" anchor="ctr"/>
+          <a:lstStyle/>
+          <a:p>
+            <a:pPr algn="ctr"/>
+            <a:endParaRPr lang="es-AR">
+              <a:ln>
+                <a:solidFill>
+                  <a:srgbClr val="FF0000"/>
+                </a:solidFill>
+              </a:ln>
+            </a:endParaRPr>
+          </a:p>
+        </p:txBody>
+      </p:sp>
+      <p:pic>
+        <p:nvPicPr>
+          <p:cNvPr id="1029" name="Picture 5"/>
+          <p:cNvPicPr>
+            <a:picLocks noChangeAspect="1" noChangeArrowheads="1"/>
+          </p:cNvPicPr>
+          <p:nvPr/>
+        </p:nvPicPr>
+        <p:blipFill>
+          <a:blip r:embed="rId5" cstate="print"/>
+          <a:srcRect/>
+          <a:stretch>
+            <a:fillRect/>
+          </a:stretch>
+        </p:blipFill>
+        <p:spPr bwMode="auto">
+          <a:xfrm>
+            <a:off x="899592" y="5229200"/>
+            <a:ext cx="7086600" cy="866775"/>
+          </a:xfrm>
+          <a:prstGeom prst="rect">
+            <a:avLst/>
+          </a:prstGeom>
+          <a:noFill/>
+          <a:ln w="9525">
+            <a:noFill/>
+            <a:miter lim="800000"/>
+            <a:headEnd/>
+            <a:tailEnd/>
+          </a:ln>
+        </p:spPr>
+      </p:pic>
+      <p:sp>
+        <p:nvSpPr>
+          <p:cNvPr id="38" name="37 Elipse"/>
+          <p:cNvSpPr/>
+          <p:nvPr/>
+        </p:nvSpPr>
+        <p:spPr>
+          <a:xfrm>
+            <a:off x="6228184" y="5157192"/>
+            <a:ext cx="648072" cy="432048"/>
+          </a:xfrm>
+          <a:prstGeom prst="ellipse">
+            <a:avLst/>
+          </a:prstGeom>
+          <a:noFill/>
+          <a:ln w="57150">
+            <a:solidFill>
+              <a:srgbClr val="FF0000"/>
+            </a:solidFill>
+          </a:ln>
+        </p:spPr>
+        <p:style>
+          <a:lnRef idx="2">
+            <a:schemeClr val="accent6"/>
+          </a:lnRef>
+          <a:fillRef idx="1">
+            <a:schemeClr val="lt1"/>
+          </a:fillRef>
+          <a:effectRef idx="0">
+            <a:schemeClr val="accent6"/>
+          </a:effectRef>
+          <a:fontRef idx="minor">
+            <a:schemeClr val="dk1"/>
+          </a:fontRef>
+        </p:style>
+        <p:txBody>
+          <a:bodyPr rtlCol="0" anchor="ctr"/>
+          <a:lstStyle/>
+          <a:p>
+            <a:pPr algn="ctr"/>
+            <a:endParaRPr lang="es-AR">
+              <a:ln>
+                <a:solidFill>
+                  <a:srgbClr val="FF0000"/>
+                </a:solidFill>
+              </a:ln>
+            </a:endParaRPr>
+          </a:p>
+        </p:txBody>
+      </p:sp>
+      <p:sp>
+        <p:nvSpPr>
+          <p:cNvPr id="39" name="38 Elipse"/>
+          <p:cNvSpPr/>
+          <p:nvPr/>
+        </p:nvSpPr>
+        <p:spPr>
+          <a:xfrm>
+            <a:off x="6228184" y="5589240"/>
+            <a:ext cx="648072" cy="432048"/>
+          </a:xfrm>
+          <a:prstGeom prst="ellipse">
+            <a:avLst/>
+          </a:prstGeom>
+          <a:noFill/>
+          <a:ln w="57150">
+            <a:solidFill>
+              <a:srgbClr val="FF0000"/>
+            </a:solidFill>
+          </a:ln>
+        </p:spPr>
+        <p:style>
+          <a:lnRef idx="2">
+            <a:schemeClr val="accent6"/>
+          </a:lnRef>
+          <a:fillRef idx="1">
+            <a:schemeClr val="lt1"/>
+          </a:fillRef>
+          <a:effectRef idx="0">
+            <a:schemeClr val="accent6"/>
+          </a:effectRef>
+          <a:fontRef idx="minor">
+            <a:schemeClr val="dk1"/>
+          </a:fontRef>
+        </p:style>
+        <p:txBody>
+          <a:bodyPr rtlCol="0" anchor="ctr"/>
+          <a:lstStyle/>
+          <a:p>
+            <a:pPr algn="ctr"/>
+            <a:endParaRPr lang="es-AR">
+              <a:ln>
+                <a:solidFill>
+                  <a:srgbClr val="FF0000"/>
+                </a:solidFill>
+              </a:ln>
+            </a:endParaRPr>
+          </a:p>
+        </p:txBody>
+      </p:sp>
+    </p:spTree>
+  </p:cSld>
+  <p:clrMapOvr>
+    <a:masterClrMapping/>
+  </p:clrMapOvr>
+  <p:timing>
+    <p:tnLst>
+      <p:par>
+        <p:cTn id="1" dur="indefinite" restart="never" nodeType="tmRoot"/>
+      </p:par>
+    </p:tnLst>
+  </p:timing>
+</p:sld>
+</file>
+
+<file path=ppt/slides/slide7.xml><?xml version="1.0" encoding="utf-8"?>
+<p:sld xmlns:a="http://schemas.openxmlformats.org/drawingml/2006/main" xmlns:r="http://schemas.openxmlformats.org/officeDocument/2006/relationships" xmlns:p="http://schemas.openxmlformats.org/presentationml/2006/main">
+  <p:cSld>
+    <p:spTree>
+      <p:nvGrpSpPr>
+        <p:cNvPr id="1" name=""/>
+        <p:cNvGrpSpPr/>
+        <p:nvPr/>
+      </p:nvGrpSpPr>
+      <p:grpSpPr>
+        <a:xfrm>
+          <a:off x="0" y="0"/>
+          <a:ext cx="0" cy="0"/>
+          <a:chOff x="0" y="0"/>
+          <a:chExt cx="0" cy="0"/>
+        </a:xfrm>
+      </p:grpSpPr>
       <p:pic>
         <p:nvPicPr>
           <p:cNvPr id="20" name="Picture 3"/>
@@ -13704,7 +15286,6 @@
               <a:rPr lang="es-AR" sz="2500" b="1" dirty="0" smtClean="0"/>
               <a:t> Chart</a:t>
             </a:r>
-            <a:endParaRPr lang="es-AR" sz="2500" b="1" dirty="0" smtClean="0"/>
           </a:p>
         </p:txBody>
       </p:sp>
@@ -13921,7 +15502,7 @@
 </p:sld>
 </file>
 
-<file path=ppt/slides/slide7.xml><?xml version="1.0" encoding="utf-8"?>
+<file path=ppt/slides/slide8.xml><?xml version="1.0" encoding="utf-8"?>
 <p:sld xmlns:a="http://schemas.openxmlformats.org/drawingml/2006/main" xmlns:r="http://schemas.openxmlformats.org/officeDocument/2006/relationships" xmlns:p="http://schemas.openxmlformats.org/presentationml/2006/main">
   <p:cSld>
     <p:spTree>
@@ -14510,7 +16091,7 @@
         </p:nvSpPr>
         <p:spPr>
           <a:xfrm>
-            <a:off x="6660232" y="3212976"/>
+            <a:off x="467544" y="1556792"/>
             <a:ext cx="3168352" cy="477054"/>
           </a:xfrm>
           <a:prstGeom prst="rect">
@@ -14557,7 +16138,7 @@
         </p:blipFill>
         <p:spPr bwMode="auto">
           <a:xfrm>
-            <a:off x="3923928" y="3789040"/>
+            <a:off x="2195736" y="3717032"/>
             <a:ext cx="4781550" cy="2771775"/>
           </a:xfrm>
           <a:prstGeom prst="rect">
@@ -14576,7 +16157,7 @@
       </p:pic>
       <p:pic>
         <p:nvPicPr>
-          <p:cNvPr id="37889" name="Picture 1"/>
+          <p:cNvPr id="2050" name="Picture 2"/>
           <p:cNvPicPr>
             <a:picLocks noChangeAspect="1" noChangeArrowheads="1"/>
           </p:cNvPicPr>
@@ -14591,8 +16172,8 @@
         </p:blipFill>
         <p:spPr bwMode="auto">
           <a:xfrm>
-            <a:off x="547861" y="2060451"/>
-            <a:ext cx="5248275" cy="1152525"/>
+            <a:off x="467544" y="2060848"/>
+            <a:ext cx="8208912" cy="1516864"/>
           </a:xfrm>
           <a:prstGeom prst="rect">
             <a:avLst/>
@@ -14606,602 +16187,6 @@
           </a:ln>
         </p:spPr>
       </p:pic>
-    </p:spTree>
-  </p:cSld>
-  <p:clrMapOvr>
-    <a:masterClrMapping/>
-  </p:clrMapOvr>
-  <p:timing>
-    <p:tnLst>
-      <p:par>
-        <p:cTn id="1" dur="indefinite" restart="never" nodeType="tmRoot"/>
-      </p:par>
-    </p:tnLst>
-  </p:timing>
-</p:sld>
-</file>
-
-<file path=ppt/slides/slide8.xml><?xml version="1.0" encoding="utf-8"?>
-<p:sld xmlns:a="http://schemas.openxmlformats.org/drawingml/2006/main" xmlns:r="http://schemas.openxmlformats.org/officeDocument/2006/relationships" xmlns:p="http://schemas.openxmlformats.org/presentationml/2006/main">
-  <p:cSld>
-    <p:spTree>
-      <p:nvGrpSpPr>
-        <p:cNvPr id="1" name=""/>
-        <p:cNvGrpSpPr/>
-        <p:nvPr/>
-      </p:nvGrpSpPr>
-      <p:grpSpPr>
-        <a:xfrm>
-          <a:off x="0" y="0"/>
-          <a:ext cx="0" cy="0"/>
-          <a:chOff x="0" y="0"/>
-          <a:chExt cx="0" cy="0"/>
-        </a:xfrm>
-      </p:grpSpPr>
-      <p:sp>
-        <p:nvSpPr>
-          <p:cNvPr id="2" name="1 Título"/>
-          <p:cNvSpPr>
-            <a:spLocks noGrp="1"/>
-          </p:cNvSpPr>
-          <p:nvPr>
-            <p:ph type="title"/>
-          </p:nvPr>
-        </p:nvSpPr>
-        <p:spPr>
-          <a:xfrm>
-            <a:off x="457200" y="629816"/>
-            <a:ext cx="7467600" cy="1143000"/>
-          </a:xfrm>
-        </p:spPr>
-        <p:txBody>
-          <a:bodyPr>
-            <a:normAutofit/>
-          </a:bodyPr>
-          <a:lstStyle/>
-          <a:p>
-            <a:pPr eaLnBrk="1" fontAlgn="auto" hangingPunct="1">
-              <a:spcAft>
-                <a:spcPts val="0"/>
-              </a:spcAft>
-              <a:defRPr/>
-            </a:pPr>
-            <a:r>
-              <a:rPr lang="es-ES" sz="4000" dirty="0" smtClean="0">
-                <a:effectLst>
-                  <a:glow rad="139700">
-                    <a:schemeClr val="accent1">
-                      <a:satMod val="175000"/>
-                      <a:alpha val="40000"/>
-                    </a:schemeClr>
-                  </a:glow>
-                </a:effectLst>
-              </a:rPr>
-              <a:t>Desvíos no Planificados</a:t>
-            </a:r>
-            <a:endParaRPr lang="es-ES" sz="4000" dirty="0"/>
-          </a:p>
-        </p:txBody>
-      </p:sp>
-      <p:pic>
-        <p:nvPicPr>
-          <p:cNvPr id="18" name="Picture 3"/>
-          <p:cNvPicPr>
-            <a:picLocks noChangeAspect="1" noChangeArrowheads="1"/>
-          </p:cNvPicPr>
-          <p:nvPr/>
-        </p:nvPicPr>
-        <p:blipFill>
-          <a:blip r:embed="rId3" cstate="print"/>
-          <a:srcRect/>
-          <a:stretch>
-            <a:fillRect/>
-          </a:stretch>
-        </p:blipFill>
-        <p:spPr bwMode="auto">
-          <a:xfrm>
-            <a:off x="7812088" y="410692"/>
-            <a:ext cx="1008062" cy="354012"/>
-          </a:xfrm>
-          <a:prstGeom prst="rect">
-            <a:avLst/>
-          </a:prstGeom>
-          <a:ln>
-            <a:headEnd/>
-            <a:tailEnd/>
-          </a:ln>
-        </p:spPr>
-        <p:style>
-          <a:lnRef idx="3">
-            <a:schemeClr val="lt1"/>
-          </a:lnRef>
-          <a:fillRef idx="1">
-            <a:schemeClr val="accent6"/>
-          </a:fillRef>
-          <a:effectRef idx="1">
-            <a:schemeClr val="accent6"/>
-          </a:effectRef>
-          <a:fontRef idx="minor">
-            <a:schemeClr val="lt1"/>
-          </a:fontRef>
-        </p:style>
-      </p:pic>
-      <p:sp>
-        <p:nvSpPr>
-          <p:cNvPr id="32" name="31 Rectángulo redondeado"/>
-          <p:cNvSpPr/>
-          <p:nvPr/>
-        </p:nvSpPr>
-        <p:spPr>
-          <a:xfrm>
-            <a:off x="539552" y="404664"/>
-            <a:ext cx="288032" cy="288032"/>
-          </a:xfrm>
-          <a:prstGeom prst="roundRect">
-            <a:avLst/>
-          </a:prstGeom>
-          <a:effectLst/>
-        </p:spPr>
-        <p:style>
-          <a:lnRef idx="1">
-            <a:schemeClr val="accent1"/>
-          </a:lnRef>
-          <a:fillRef idx="2">
-            <a:schemeClr val="accent1"/>
-          </a:fillRef>
-          <a:effectRef idx="1">
-            <a:schemeClr val="accent1"/>
-          </a:effectRef>
-          <a:fontRef idx="minor">
-            <a:schemeClr val="dk1"/>
-          </a:fontRef>
-        </p:style>
-        <p:txBody>
-          <a:bodyPr rtlCol="0" anchor="ctr"/>
-          <a:lstStyle/>
-          <a:p>
-            <a:pPr algn="ctr"/>
-            <a:endParaRPr lang="es-AR" sz="1000" b="1" dirty="0" smtClean="0"/>
-          </a:p>
-        </p:txBody>
-      </p:sp>
-      <p:cxnSp>
-        <p:nvCxnSpPr>
-          <p:cNvPr id="33" name="32 Conector recto"/>
-          <p:cNvCxnSpPr>
-            <a:stCxn id="32" idx="3"/>
-          </p:cNvCxnSpPr>
-          <p:nvPr/>
-        </p:nvCxnSpPr>
-        <p:spPr>
-          <a:xfrm>
-            <a:off x="827584" y="548680"/>
-            <a:ext cx="576064" cy="0"/>
-          </a:xfrm>
-          <a:prstGeom prst="line">
-            <a:avLst/>
-          </a:prstGeom>
-        </p:spPr>
-        <p:style>
-          <a:lnRef idx="1">
-            <a:schemeClr val="accent1"/>
-          </a:lnRef>
-          <a:fillRef idx="0">
-            <a:schemeClr val="accent1"/>
-          </a:fillRef>
-          <a:effectRef idx="0">
-            <a:schemeClr val="accent1"/>
-          </a:effectRef>
-          <a:fontRef idx="minor">
-            <a:schemeClr val="tx1"/>
-          </a:fontRef>
-        </p:style>
-      </p:cxnSp>
-      <p:cxnSp>
-        <p:nvCxnSpPr>
-          <p:cNvPr id="34" name="33 Conector recto"/>
-          <p:cNvCxnSpPr>
-            <a:endCxn id="39" idx="1"/>
-          </p:cNvCxnSpPr>
-          <p:nvPr/>
-        </p:nvCxnSpPr>
-        <p:spPr>
-          <a:xfrm>
-            <a:off x="827584" y="548680"/>
-            <a:ext cx="576064" cy="0"/>
-          </a:xfrm>
-          <a:prstGeom prst="line">
-            <a:avLst/>
-          </a:prstGeom>
-        </p:spPr>
-        <p:style>
-          <a:lnRef idx="1">
-            <a:schemeClr val="accent1"/>
-          </a:lnRef>
-          <a:fillRef idx="0">
-            <a:schemeClr val="accent1"/>
-          </a:fillRef>
-          <a:effectRef idx="0">
-            <a:schemeClr val="accent1"/>
-          </a:effectRef>
-          <a:fontRef idx="minor">
-            <a:schemeClr val="tx1"/>
-          </a:fontRef>
-        </p:style>
-      </p:cxnSp>
-      <p:cxnSp>
-        <p:nvCxnSpPr>
-          <p:cNvPr id="35" name="34 Conector recto"/>
-          <p:cNvCxnSpPr>
-            <a:stCxn id="39" idx="3"/>
-            <a:endCxn id="40" idx="1"/>
-          </p:cNvCxnSpPr>
-          <p:nvPr/>
-        </p:nvCxnSpPr>
-        <p:spPr>
-          <a:xfrm>
-            <a:off x="1691680" y="548680"/>
-            <a:ext cx="576064" cy="0"/>
-          </a:xfrm>
-          <a:prstGeom prst="line">
-            <a:avLst/>
-          </a:prstGeom>
-        </p:spPr>
-        <p:style>
-          <a:lnRef idx="1">
-            <a:schemeClr val="accent1"/>
-          </a:lnRef>
-          <a:fillRef idx="0">
-            <a:schemeClr val="accent1"/>
-          </a:fillRef>
-          <a:effectRef idx="0">
-            <a:schemeClr val="accent1"/>
-          </a:effectRef>
-          <a:fontRef idx="minor">
-            <a:schemeClr val="tx1"/>
-          </a:fontRef>
-        </p:style>
-      </p:cxnSp>
-      <p:cxnSp>
-        <p:nvCxnSpPr>
-          <p:cNvPr id="36" name="35 Conector recto"/>
-          <p:cNvCxnSpPr>
-            <a:stCxn id="40" idx="3"/>
-            <a:endCxn id="41" idx="1"/>
-          </p:cNvCxnSpPr>
-          <p:nvPr/>
-        </p:nvCxnSpPr>
-        <p:spPr>
-          <a:xfrm>
-            <a:off x="2555776" y="548680"/>
-            <a:ext cx="1440160" cy="0"/>
-          </a:xfrm>
-          <a:prstGeom prst="line">
-            <a:avLst/>
-          </a:prstGeom>
-        </p:spPr>
-        <p:style>
-          <a:lnRef idx="1">
-            <a:schemeClr val="accent1"/>
-          </a:lnRef>
-          <a:fillRef idx="0">
-            <a:schemeClr val="accent1"/>
-          </a:fillRef>
-          <a:effectRef idx="0">
-            <a:schemeClr val="accent1"/>
-          </a:effectRef>
-          <a:fontRef idx="minor">
-            <a:schemeClr val="tx1"/>
-          </a:fontRef>
-        </p:style>
-      </p:cxnSp>
-      <p:cxnSp>
-        <p:nvCxnSpPr>
-          <p:cNvPr id="37" name="36 Conector recto"/>
-          <p:cNvCxnSpPr>
-            <a:stCxn id="41" idx="3"/>
-            <a:endCxn id="42" idx="1"/>
-          </p:cNvCxnSpPr>
-          <p:nvPr/>
-        </p:nvCxnSpPr>
-        <p:spPr>
-          <a:xfrm>
-            <a:off x="4283968" y="548680"/>
-            <a:ext cx="576064" cy="0"/>
-          </a:xfrm>
-          <a:prstGeom prst="line">
-            <a:avLst/>
-          </a:prstGeom>
-        </p:spPr>
-        <p:style>
-          <a:lnRef idx="1">
-            <a:schemeClr val="accent1"/>
-          </a:lnRef>
-          <a:fillRef idx="0">
-            <a:schemeClr val="accent1"/>
-          </a:fillRef>
-          <a:effectRef idx="0">
-            <a:schemeClr val="accent1"/>
-          </a:effectRef>
-          <a:fontRef idx="minor">
-            <a:schemeClr val="tx1"/>
-          </a:fontRef>
-        </p:style>
-      </p:cxnSp>
-      <p:cxnSp>
-        <p:nvCxnSpPr>
-          <p:cNvPr id="38" name="37 Conector recto"/>
-          <p:cNvCxnSpPr>
-            <a:stCxn id="42" idx="3"/>
-            <a:endCxn id="43" idx="1"/>
-          </p:cNvCxnSpPr>
-          <p:nvPr/>
-        </p:nvCxnSpPr>
-        <p:spPr>
-          <a:xfrm>
-            <a:off x="5148064" y="548680"/>
-            <a:ext cx="576064" cy="0"/>
-          </a:xfrm>
-          <a:prstGeom prst="line">
-            <a:avLst/>
-          </a:prstGeom>
-        </p:spPr>
-        <p:style>
-          <a:lnRef idx="1">
-            <a:schemeClr val="accent1"/>
-          </a:lnRef>
-          <a:fillRef idx="0">
-            <a:schemeClr val="accent1"/>
-          </a:fillRef>
-          <a:effectRef idx="0">
-            <a:schemeClr val="accent1"/>
-          </a:effectRef>
-          <a:fontRef idx="minor">
-            <a:schemeClr val="tx1"/>
-          </a:fontRef>
-        </p:style>
-      </p:cxnSp>
-      <p:sp>
-        <p:nvSpPr>
-          <p:cNvPr id="39" name="38 Rectángulo redondeado"/>
-          <p:cNvSpPr/>
-          <p:nvPr/>
-        </p:nvSpPr>
-        <p:spPr>
-          <a:xfrm>
-            <a:off x="1403648" y="404664"/>
-            <a:ext cx="288032" cy="288032"/>
-          </a:xfrm>
-          <a:prstGeom prst="roundRect">
-            <a:avLst/>
-          </a:prstGeom>
-          <a:effectLst/>
-        </p:spPr>
-        <p:style>
-          <a:lnRef idx="1">
-            <a:schemeClr val="accent1"/>
-          </a:lnRef>
-          <a:fillRef idx="2">
-            <a:schemeClr val="accent1"/>
-          </a:fillRef>
-          <a:effectRef idx="1">
-            <a:schemeClr val="accent1"/>
-          </a:effectRef>
-          <a:fontRef idx="minor">
-            <a:schemeClr val="dk1"/>
-          </a:fontRef>
-        </p:style>
-        <p:txBody>
-          <a:bodyPr rtlCol="0" anchor="ctr"/>
-          <a:lstStyle/>
-          <a:p>
-            <a:pPr algn="ctr"/>
-            <a:endParaRPr lang="es-AR" sz="1000" b="1" dirty="0" smtClean="0"/>
-          </a:p>
-        </p:txBody>
-      </p:sp>
-      <p:sp>
-        <p:nvSpPr>
-          <p:cNvPr id="40" name="39 Rectángulo redondeado"/>
-          <p:cNvSpPr/>
-          <p:nvPr/>
-        </p:nvSpPr>
-        <p:spPr>
-          <a:xfrm>
-            <a:off x="2267744" y="404664"/>
-            <a:ext cx="288032" cy="288032"/>
-          </a:xfrm>
-          <a:prstGeom prst="roundRect">
-            <a:avLst/>
-          </a:prstGeom>
-          <a:effectLst/>
-        </p:spPr>
-        <p:style>
-          <a:lnRef idx="1">
-            <a:schemeClr val="accent1"/>
-          </a:lnRef>
-          <a:fillRef idx="2">
-            <a:schemeClr val="accent1"/>
-          </a:fillRef>
-          <a:effectRef idx="1">
-            <a:schemeClr val="accent1"/>
-          </a:effectRef>
-          <a:fontRef idx="minor">
-            <a:schemeClr val="dk1"/>
-          </a:fontRef>
-        </p:style>
-        <p:txBody>
-          <a:bodyPr rtlCol="0" anchor="ctr"/>
-          <a:lstStyle/>
-          <a:p>
-            <a:pPr algn="ctr"/>
-            <a:endParaRPr lang="es-AR" sz="1000" b="1" dirty="0" smtClean="0"/>
-          </a:p>
-        </p:txBody>
-      </p:sp>
-      <p:sp>
-        <p:nvSpPr>
-          <p:cNvPr id="41" name="40 Rectángulo redondeado"/>
-          <p:cNvSpPr/>
-          <p:nvPr/>
-        </p:nvSpPr>
-        <p:spPr>
-          <a:xfrm>
-            <a:off x="3995936" y="404664"/>
-            <a:ext cx="288032" cy="288032"/>
-          </a:xfrm>
-          <a:prstGeom prst="roundRect">
-            <a:avLst/>
-          </a:prstGeom>
-          <a:effectLst/>
-        </p:spPr>
-        <p:style>
-          <a:lnRef idx="1">
-            <a:schemeClr val="accent1"/>
-          </a:lnRef>
-          <a:fillRef idx="2">
-            <a:schemeClr val="accent1"/>
-          </a:fillRef>
-          <a:effectRef idx="1">
-            <a:schemeClr val="accent1"/>
-          </a:effectRef>
-          <a:fontRef idx="minor">
-            <a:schemeClr val="dk1"/>
-          </a:fontRef>
-        </p:style>
-        <p:txBody>
-          <a:bodyPr rtlCol="0" anchor="ctr"/>
-          <a:lstStyle/>
-          <a:p>
-            <a:pPr algn="ctr"/>
-            <a:endParaRPr lang="es-AR" sz="1000" b="1" dirty="0" smtClean="0"/>
-          </a:p>
-        </p:txBody>
-      </p:sp>
-      <p:sp>
-        <p:nvSpPr>
-          <p:cNvPr id="42" name="41 Rectángulo redondeado"/>
-          <p:cNvSpPr/>
-          <p:nvPr/>
-        </p:nvSpPr>
-        <p:spPr>
-          <a:xfrm>
-            <a:off x="4860032" y="404664"/>
-            <a:ext cx="288032" cy="288032"/>
-          </a:xfrm>
-          <a:prstGeom prst="roundRect">
-            <a:avLst/>
-          </a:prstGeom>
-          <a:effectLst/>
-        </p:spPr>
-        <p:style>
-          <a:lnRef idx="1">
-            <a:schemeClr val="accent1"/>
-          </a:lnRef>
-          <a:fillRef idx="2">
-            <a:schemeClr val="accent1"/>
-          </a:fillRef>
-          <a:effectRef idx="1">
-            <a:schemeClr val="accent1"/>
-          </a:effectRef>
-          <a:fontRef idx="minor">
-            <a:schemeClr val="dk1"/>
-          </a:fontRef>
-        </p:style>
-        <p:txBody>
-          <a:bodyPr rtlCol="0" anchor="ctr"/>
-          <a:lstStyle/>
-          <a:p>
-            <a:pPr algn="ctr"/>
-            <a:endParaRPr lang="es-AR" sz="1000" b="1" dirty="0" smtClean="0"/>
-          </a:p>
-        </p:txBody>
-      </p:sp>
-      <p:sp>
-        <p:nvSpPr>
-          <p:cNvPr id="43" name="42 Rectángulo redondeado"/>
-          <p:cNvSpPr/>
-          <p:nvPr/>
-        </p:nvSpPr>
-        <p:spPr>
-          <a:xfrm>
-            <a:off x="5724128" y="404664"/>
-            <a:ext cx="288032" cy="288032"/>
-          </a:xfrm>
-          <a:prstGeom prst="roundRect">
-            <a:avLst/>
-          </a:prstGeom>
-          <a:effectLst/>
-        </p:spPr>
-        <p:style>
-          <a:lnRef idx="1">
-            <a:schemeClr val="accent1"/>
-          </a:lnRef>
-          <a:fillRef idx="2">
-            <a:schemeClr val="accent1"/>
-          </a:fillRef>
-          <a:effectRef idx="1">
-            <a:schemeClr val="accent1"/>
-          </a:effectRef>
-          <a:fontRef idx="minor">
-            <a:schemeClr val="dk1"/>
-          </a:fontRef>
-        </p:style>
-        <p:txBody>
-          <a:bodyPr rtlCol="0" anchor="ctr"/>
-          <a:lstStyle/>
-          <a:p>
-            <a:pPr algn="ctr"/>
-            <a:endParaRPr lang="es-AR" sz="1000" b="1" dirty="0" smtClean="0"/>
-          </a:p>
-        </p:txBody>
-      </p:sp>
-      <p:sp>
-        <p:nvSpPr>
-          <p:cNvPr id="44" name="43 Rectángulo redondeado"/>
-          <p:cNvSpPr/>
-          <p:nvPr/>
-        </p:nvSpPr>
-        <p:spPr>
-          <a:xfrm>
-            <a:off x="3131840" y="404664"/>
-            <a:ext cx="288032" cy="288032"/>
-          </a:xfrm>
-          <a:prstGeom prst="roundRect">
-            <a:avLst/>
-          </a:prstGeom>
-          <a:effectLst>
-            <a:glow rad="228600">
-              <a:schemeClr val="accent1">
-                <a:satMod val="175000"/>
-                <a:alpha val="40000"/>
-              </a:schemeClr>
-            </a:glow>
-          </a:effectLst>
-        </p:spPr>
-        <p:style>
-          <a:lnRef idx="1">
-            <a:schemeClr val="accent1"/>
-          </a:lnRef>
-          <a:fillRef idx="2">
-            <a:schemeClr val="accent1"/>
-          </a:fillRef>
-          <a:effectRef idx="1">
-            <a:schemeClr val="accent1"/>
-          </a:effectRef>
-          <a:fontRef idx="minor">
-            <a:schemeClr val="dk1"/>
-          </a:fontRef>
-        </p:style>
-        <p:txBody>
-          <a:bodyPr rtlCol="0" anchor="ctr"/>
-          <a:lstStyle/>
-          <a:p>
-            <a:pPr algn="ctr"/>
-            <a:endParaRPr lang="es-AR" sz="1000" b="1" dirty="0" smtClean="0"/>
-          </a:p>
-        </p:txBody>
-      </p:sp>
     </p:spTree>
   </p:cSld>
   <p:clrMapOvr>
@@ -15246,7 +16231,7 @@
         </p:nvSpPr>
         <p:spPr>
           <a:xfrm>
-            <a:off x="457200" y="601811"/>
+            <a:off x="457200" y="629816"/>
             <a:ext cx="7467600" cy="1143000"/>
           </a:xfrm>
         </p:spPr>
@@ -15273,7 +16258,7 @@
                   </a:glow>
                 </a:effectLst>
               </a:rPr>
-              <a:t>Cambios en el Alcance</a:t>
+              <a:t>Desvíos no Planificados</a:t>
             </a:r>
             <a:endParaRPr lang="es-ES" sz="4000" dirty="0"/>
           </a:p>
@@ -15281,7 +16266,7 @@
       </p:sp>
       <p:pic>
         <p:nvPicPr>
-          <p:cNvPr id="20" name="Picture 3"/>
+          <p:cNvPr id="18" name="Picture 3"/>
           <p:cNvPicPr>
             <a:picLocks noChangeAspect="1" noChangeArrowheads="1"/>
           </p:cNvPicPr>
@@ -15324,7 +16309,7 @@
       </p:pic>
       <p:sp>
         <p:nvSpPr>
-          <p:cNvPr id="21" name="20 Rectángulo redondeado"/>
+          <p:cNvPr id="32" name="31 Rectángulo redondeado"/>
           <p:cNvSpPr/>
           <p:nvPr/>
         </p:nvSpPr>
@@ -15363,9 +16348,9 @@
       </p:sp>
       <p:cxnSp>
         <p:nvCxnSpPr>
-          <p:cNvPr id="22" name="21 Conector recto"/>
+          <p:cNvPr id="33" name="32 Conector recto"/>
           <p:cNvCxnSpPr>
-            <a:stCxn id="21" idx="3"/>
+            <a:stCxn id="32" idx="3"/>
           </p:cNvCxnSpPr>
           <p:nvPr/>
         </p:nvCxnSpPr>
@@ -15395,9 +16380,9 @@
       </p:cxnSp>
       <p:cxnSp>
         <p:nvCxnSpPr>
-          <p:cNvPr id="23" name="22 Conector recto"/>
+          <p:cNvPr id="34" name="33 Conector recto"/>
           <p:cNvCxnSpPr>
-            <a:endCxn id="28" idx="1"/>
+            <a:endCxn id="39" idx="1"/>
           </p:cNvCxnSpPr>
           <p:nvPr/>
         </p:nvCxnSpPr>
@@ -15427,10 +16412,10 @@
       </p:cxnSp>
       <p:cxnSp>
         <p:nvCxnSpPr>
-          <p:cNvPr id="24" name="23 Conector recto"/>
+          <p:cNvPr id="35" name="34 Conector recto"/>
           <p:cNvCxnSpPr>
-            <a:stCxn id="28" idx="3"/>
-            <a:endCxn id="29" idx="1"/>
+            <a:stCxn id="39" idx="3"/>
+            <a:endCxn id="40" idx="1"/>
           </p:cNvCxnSpPr>
           <p:nvPr/>
         </p:nvCxnSpPr>
@@ -15460,9 +16445,10 @@
       </p:cxnSp>
       <p:cxnSp>
         <p:nvCxnSpPr>
-          <p:cNvPr id="25" name="24 Conector recto"/>
+          <p:cNvPr id="36" name="35 Conector recto"/>
           <p:cNvCxnSpPr>
-            <a:stCxn id="29" idx="3"/>
+            <a:stCxn id="40" idx="3"/>
+            <a:endCxn id="41" idx="1"/>
           </p:cNvCxnSpPr>
           <p:nvPr/>
         </p:nvCxnSpPr>
@@ -15492,9 +16478,10 @@
       </p:cxnSp>
       <p:cxnSp>
         <p:nvCxnSpPr>
-          <p:cNvPr id="26" name="25 Conector recto"/>
+          <p:cNvPr id="37" name="36 Conector recto"/>
           <p:cNvCxnSpPr>
-            <a:endCxn id="31" idx="1"/>
+            <a:stCxn id="41" idx="3"/>
+            <a:endCxn id="42" idx="1"/>
           </p:cNvCxnSpPr>
           <p:nvPr/>
         </p:nvCxnSpPr>
@@ -15524,10 +16511,10 @@
       </p:cxnSp>
       <p:cxnSp>
         <p:nvCxnSpPr>
-          <p:cNvPr id="27" name="26 Conector recto"/>
+          <p:cNvPr id="38" name="37 Conector recto"/>
           <p:cNvCxnSpPr>
-            <a:stCxn id="31" idx="3"/>
-            <a:endCxn id="32" idx="1"/>
+            <a:stCxn id="42" idx="3"/>
+            <a:endCxn id="43" idx="1"/>
           </p:cNvCxnSpPr>
           <p:nvPr/>
         </p:nvCxnSpPr>
@@ -15557,7 +16544,7 @@
       </p:cxnSp>
       <p:sp>
         <p:nvSpPr>
-          <p:cNvPr id="28" name="27 Rectángulo redondeado"/>
+          <p:cNvPr id="39" name="38 Rectángulo redondeado"/>
           <p:cNvSpPr/>
           <p:nvPr/>
         </p:nvSpPr>
@@ -15596,7 +16583,7 @@
       </p:sp>
       <p:sp>
         <p:nvSpPr>
-          <p:cNvPr id="29" name="28 Rectángulo redondeado"/>
+          <p:cNvPr id="40" name="39 Rectángulo redondeado"/>
           <p:cNvSpPr/>
           <p:nvPr/>
         </p:nvSpPr>
@@ -15635,7 +16622,46 @@
       </p:sp>
       <p:sp>
         <p:nvSpPr>
-          <p:cNvPr id="31" name="30 Rectángulo redondeado"/>
+          <p:cNvPr id="41" name="40 Rectángulo redondeado"/>
+          <p:cNvSpPr/>
+          <p:nvPr/>
+        </p:nvSpPr>
+        <p:spPr>
+          <a:xfrm>
+            <a:off x="3995936" y="404664"/>
+            <a:ext cx="288032" cy="288032"/>
+          </a:xfrm>
+          <a:prstGeom prst="roundRect">
+            <a:avLst/>
+          </a:prstGeom>
+          <a:effectLst/>
+        </p:spPr>
+        <p:style>
+          <a:lnRef idx="1">
+            <a:schemeClr val="accent1"/>
+          </a:lnRef>
+          <a:fillRef idx="2">
+            <a:schemeClr val="accent1"/>
+          </a:fillRef>
+          <a:effectRef idx="1">
+            <a:schemeClr val="accent1"/>
+          </a:effectRef>
+          <a:fontRef idx="minor">
+            <a:schemeClr val="dk1"/>
+          </a:fontRef>
+        </p:style>
+        <p:txBody>
+          <a:bodyPr rtlCol="0" anchor="ctr"/>
+          <a:lstStyle/>
+          <a:p>
+            <a:pPr algn="ctr"/>
+            <a:endParaRPr lang="es-AR" sz="1000" b="1" dirty="0" smtClean="0"/>
+          </a:p>
+        </p:txBody>
+      </p:sp>
+      <p:sp>
+        <p:nvSpPr>
+          <p:cNvPr id="42" name="41 Rectángulo redondeado"/>
           <p:cNvSpPr/>
           <p:nvPr/>
         </p:nvSpPr>
@@ -15674,7 +16700,7 @@
       </p:sp>
       <p:sp>
         <p:nvSpPr>
-          <p:cNvPr id="32" name="31 Rectángulo redondeado"/>
+          <p:cNvPr id="43" name="42 Rectángulo redondeado"/>
           <p:cNvSpPr/>
           <p:nvPr/>
         </p:nvSpPr>
@@ -15713,13 +16739,13 @@
       </p:sp>
       <p:sp>
         <p:nvSpPr>
-          <p:cNvPr id="34" name="33 Rectángulo redondeado"/>
+          <p:cNvPr id="44" name="43 Rectángulo redondeado"/>
           <p:cNvSpPr/>
           <p:nvPr/>
         </p:nvSpPr>
         <p:spPr>
           <a:xfrm>
-            <a:off x="3995936" y="404664"/>
+            <a:off x="3131840" y="404664"/>
             <a:ext cx="288032" cy="288032"/>
           </a:xfrm>
           <a:prstGeom prst="roundRect">
@@ -15754,136 +16780,6 @@
           <a:p>
             <a:pPr algn="ctr"/>
             <a:endParaRPr lang="es-AR" sz="1000" b="1" dirty="0" smtClean="0"/>
-          </a:p>
-        </p:txBody>
-      </p:sp>
-      <p:sp>
-        <p:nvSpPr>
-          <p:cNvPr id="35" name="34 Rectángulo redondeado"/>
-          <p:cNvSpPr/>
-          <p:nvPr/>
-        </p:nvSpPr>
-        <p:spPr>
-          <a:xfrm>
-            <a:off x="3131840" y="404664"/>
-            <a:ext cx="288032" cy="288032"/>
-          </a:xfrm>
-          <a:prstGeom prst="roundRect">
-            <a:avLst/>
-          </a:prstGeom>
-          <a:effectLst/>
-        </p:spPr>
-        <p:style>
-          <a:lnRef idx="1">
-            <a:schemeClr val="accent1"/>
-          </a:lnRef>
-          <a:fillRef idx="2">
-            <a:schemeClr val="accent1"/>
-          </a:fillRef>
-          <a:effectRef idx="1">
-            <a:schemeClr val="accent1"/>
-          </a:effectRef>
-          <a:fontRef idx="minor">
-            <a:schemeClr val="dk1"/>
-          </a:fontRef>
-        </p:style>
-        <p:txBody>
-          <a:bodyPr rtlCol="0" anchor="ctr"/>
-          <a:lstStyle/>
-          <a:p>
-            <a:pPr algn="ctr"/>
-            <a:endParaRPr lang="es-AR" sz="1000" b="1" dirty="0" smtClean="0"/>
-          </a:p>
-        </p:txBody>
-      </p:sp>
-      <p:pic>
-        <p:nvPicPr>
-          <p:cNvPr id="18" name="Picture 4" descr="https://www1.v1host.com/Team152/cached.img/3a61bad23ca14ec2b5ed8a2a9a0e47ef.png"/>
-          <p:cNvPicPr>
-            <a:picLocks noChangeAspect="1" noChangeArrowheads="1"/>
-          </p:cNvPicPr>
-          <p:nvPr/>
-        </p:nvPicPr>
-        <p:blipFill>
-          <a:blip r:embed="rId4" cstate="print"/>
-          <a:srcRect/>
-          <a:stretch>
-            <a:fillRect/>
-          </a:stretch>
-        </p:blipFill>
-        <p:spPr bwMode="auto">
-          <a:xfrm>
-            <a:off x="2601416" y="2595331"/>
-            <a:ext cx="3842792" cy="2561861"/>
-          </a:xfrm>
-          <a:prstGeom prst="rect">
-            <a:avLst/>
-          </a:prstGeom>
-          <a:noFill/>
-          <a:ln w="76200">
-            <a:solidFill>
-              <a:srgbClr val="FF0000"/>
-            </a:solidFill>
-          </a:ln>
-        </p:spPr>
-      </p:pic>
-      <p:sp>
-        <p:nvSpPr>
-          <p:cNvPr id="19" name="18 CuadroTexto"/>
-          <p:cNvSpPr txBox="1"/>
-          <p:nvPr/>
-        </p:nvSpPr>
-        <p:spPr>
-          <a:xfrm>
-            <a:off x="1475656" y="2924944"/>
-            <a:ext cx="648072" cy="1631216"/>
-          </a:xfrm>
-          <a:prstGeom prst="rect">
-            <a:avLst/>
-          </a:prstGeom>
-          <a:noFill/>
-        </p:spPr>
-        <p:txBody>
-          <a:bodyPr wrap="square" rtlCol="0">
-            <a:spAutoFit/>
-          </a:bodyPr>
-          <a:lstStyle/>
-          <a:p>
-            <a:r>
-              <a:rPr lang="es-AR" sz="10000" b="1" dirty="0" smtClean="0"/>
-              <a:t>¿</a:t>
-            </a:r>
-            <a:endParaRPr lang="es-AR" sz="10000" b="1" dirty="0" smtClean="0"/>
-          </a:p>
-        </p:txBody>
-      </p:sp>
-      <p:sp>
-        <p:nvSpPr>
-          <p:cNvPr id="30" name="29 CuadroTexto"/>
-          <p:cNvSpPr txBox="1"/>
-          <p:nvPr/>
-        </p:nvSpPr>
-        <p:spPr>
-          <a:xfrm>
-            <a:off x="6588224" y="2924944"/>
-            <a:ext cx="648072" cy="1631216"/>
-          </a:xfrm>
-          <a:prstGeom prst="rect">
-            <a:avLst/>
-          </a:prstGeom>
-          <a:noFill/>
-        </p:spPr>
-        <p:txBody>
-          <a:bodyPr wrap="square" rtlCol="0">
-            <a:spAutoFit/>
-          </a:bodyPr>
-          <a:lstStyle/>
-          <a:p>
-            <a:r>
-              <a:rPr lang="es-AR" sz="10000" b="1" dirty="0" smtClean="0"/>
-              <a:t>?</a:t>
-            </a:r>
-            <a:endParaRPr lang="es-AR" sz="10000" b="1" dirty="0" smtClean="0"/>
           </a:p>
         </p:txBody>
       </p:sp>

</xml_diff>

<commit_message>
se agregan comentarios y se modifican algunos slides. Queda pendiente el item (modificacion alcance y desvio no planificado)
</commit_message>
<xml_diff>
--- a/Presentaciones/Self Management - Presentación Final V1.pptx
+++ b/Presentaciones/Self Management - Presentación Final V1.pptx
@@ -454,7 +454,7 @@
     </p:spTree>
     <p:extLst>
       <p:ext uri="{BB962C8B-B14F-4D97-AF65-F5344CB8AC3E}">
-        <p14:creationId xmlns="" xmlns:p14="http://schemas.microsoft.com/office/powerpoint/2010/main" val="4187226391"/>
+        <p14:creationId xmlns:p14="http://schemas.microsoft.com/office/powerpoint/2010/main" xmlns="" val="4187226391"/>
       </p:ext>
     </p:extLst>
   </p:cSld>
@@ -1898,7 +1898,59 @@
           <a:p>
             <a:r>
               <a:rPr lang="es-ES_tradnl" dirty="0" smtClean="0"/>
-              <a:t>Si dejamos este BD chart, hay q explicarlo muy bien!!!</a:t>
+              <a:t>En</a:t>
+            </a:r>
+            <a:r>
+              <a:rPr lang="es-ES_tradnl" baseline="0" dirty="0" smtClean="0"/>
+              <a:t> este sprint (el 4to) cargamos los </a:t>
+            </a:r>
+            <a:r>
+              <a:rPr lang="es-ES_tradnl" baseline="0" dirty="0" err="1" smtClean="0"/>
+              <a:t>user</a:t>
+            </a:r>
+            <a:r>
+              <a:rPr lang="es-ES_tradnl" baseline="0" dirty="0" smtClean="0"/>
+              <a:t> </a:t>
+            </a:r>
+            <a:r>
+              <a:rPr lang="es-ES_tradnl" baseline="0" dirty="0" err="1" smtClean="0"/>
+              <a:t>stories</a:t>
+            </a:r>
+            <a:r>
+              <a:rPr lang="es-ES_tradnl" baseline="0" dirty="0" smtClean="0"/>
+              <a:t> después que arrancó el sprint. Tenemos un pico </a:t>
+            </a:r>
+            <a:r>
+              <a:rPr lang="es-ES_tradnl" baseline="0" dirty="0" err="1" smtClean="0"/>
+              <a:t>xq</a:t>
+            </a:r>
+            <a:r>
+              <a:rPr lang="es-ES_tradnl" baseline="0" dirty="0" smtClean="0"/>
+              <a:t> agregamos tareas después (cosas que nos habíamos olvidado). Después se puede ver que hay como una meseta. Esto se debe a que estábamos con parciales y no avanzamos con el sprint (síndrome del Estudiante). Finalmente podemos observar que toda la funcionalidad no está terminada dado que quedó pendiente una métrica </a:t>
+            </a:r>
+            <a:r>
+              <a:rPr lang="es-ES_tradnl" baseline="0" dirty="0" err="1" smtClean="0"/>
+              <a:t>xq</a:t>
+            </a:r>
+            <a:r>
+              <a:rPr lang="es-ES_tradnl" baseline="0" dirty="0" smtClean="0"/>
+              <a:t> el </a:t>
+            </a:r>
+            <a:r>
+              <a:rPr lang="es-ES_tradnl" baseline="0" dirty="0" err="1" smtClean="0"/>
+              <a:t>product</a:t>
+            </a:r>
+            <a:r>
+              <a:rPr lang="es-ES_tradnl" baseline="0" dirty="0" smtClean="0"/>
+              <a:t> </a:t>
+            </a:r>
+            <a:r>
+              <a:rPr lang="es-ES_tradnl" baseline="0" dirty="0" err="1" smtClean="0"/>
+              <a:t>owner</a:t>
+            </a:r>
+            <a:r>
+              <a:rPr lang="es-ES_tradnl" baseline="0" dirty="0" smtClean="0"/>
+              <a:t> no nos confirmó el cálculo de la misma.</a:t>
             </a:r>
             <a:endParaRPr lang="es-AR" dirty="0"/>
           </a:p>
@@ -1987,6 +2039,120 @@
           </a:bodyPr>
           <a:lstStyle/>
           <a:p>
+            <a:r>
+              <a:rPr lang="es-ES" sz="1200" kern="1200" dirty="0" smtClean="0">
+                <a:solidFill>
+                  <a:schemeClr val="tx1"/>
+                </a:solidFill>
+                <a:latin typeface="+mn-lt"/>
+                <a:ea typeface="+mn-ea"/>
+                <a:cs typeface="+mn-cs"/>
+              </a:rPr>
+              <a:t>Para sprint 4.</a:t>
+            </a:r>
+          </a:p>
+          <a:p>
+            <a:r>
+              <a:rPr lang="es-ES" sz="1200" kern="1200" dirty="0" smtClean="0">
+                <a:solidFill>
+                  <a:schemeClr val="tx1"/>
+                </a:solidFill>
+                <a:latin typeface="+mn-lt"/>
+                <a:ea typeface="+mn-ea"/>
+                <a:cs typeface="+mn-cs"/>
+              </a:rPr>
+              <a:t>SPI (EV/PV) &lt; 1 indica que estamos atrasados en calendario. Esto se debe a que nos falta</a:t>
+            </a:r>
+            <a:r>
+              <a:rPr lang="es-ES" sz="1200" kern="1200" baseline="0" dirty="0" smtClean="0">
+                <a:solidFill>
+                  <a:schemeClr val="tx1"/>
+                </a:solidFill>
+                <a:latin typeface="+mn-lt"/>
+                <a:ea typeface="+mn-ea"/>
+                <a:cs typeface="+mn-cs"/>
+              </a:rPr>
+              <a:t> una métrica por realizar (</a:t>
+            </a:r>
+            <a:r>
+              <a:rPr lang="es-ES" sz="1200" kern="1200" baseline="0" dirty="0" err="1" smtClean="0">
+                <a:solidFill>
+                  <a:schemeClr val="tx1"/>
+                </a:solidFill>
+                <a:latin typeface="+mn-lt"/>
+                <a:ea typeface="+mn-ea"/>
+                <a:cs typeface="+mn-cs"/>
+              </a:rPr>
+              <a:t>schedule</a:t>
+            </a:r>
+            <a:r>
+              <a:rPr lang="es-ES" sz="1200" kern="1200" baseline="0" dirty="0" smtClean="0">
+                <a:solidFill>
+                  <a:schemeClr val="tx1"/>
+                </a:solidFill>
+                <a:latin typeface="+mn-lt"/>
+                <a:ea typeface="+mn-ea"/>
+                <a:cs typeface="+mn-cs"/>
+              </a:rPr>
+              <a:t> </a:t>
+            </a:r>
+            <a:r>
+              <a:rPr lang="es-ES" sz="1200" kern="1200" baseline="0" dirty="0" err="1" smtClean="0">
+                <a:solidFill>
+                  <a:schemeClr val="tx1"/>
+                </a:solidFill>
+                <a:latin typeface="+mn-lt"/>
+                <a:ea typeface="+mn-ea"/>
+                <a:cs typeface="+mn-cs"/>
+              </a:rPr>
+              <a:t>adherence</a:t>
+            </a:r>
+            <a:r>
+              <a:rPr lang="es-ES" sz="1200" kern="1200" baseline="0" dirty="0" smtClean="0">
+                <a:solidFill>
+                  <a:schemeClr val="tx1"/>
+                </a:solidFill>
+                <a:latin typeface="+mn-lt"/>
+                <a:ea typeface="+mn-ea"/>
+                <a:cs typeface="+mn-cs"/>
+              </a:rPr>
+              <a:t>)</a:t>
+            </a:r>
+            <a:r>
+              <a:rPr lang="es-ES" sz="1200" kern="1200" dirty="0" smtClean="0">
+                <a:solidFill>
+                  <a:schemeClr val="tx1"/>
+                </a:solidFill>
+                <a:latin typeface="+mn-lt"/>
+                <a:ea typeface="+mn-ea"/>
+                <a:cs typeface="+mn-cs"/>
+              </a:rPr>
+              <a:t>.</a:t>
+            </a:r>
+          </a:p>
+          <a:p>
+            <a:r>
+              <a:rPr lang="es-ES" sz="1200" kern="1200" dirty="0" smtClean="0">
+                <a:solidFill>
+                  <a:schemeClr val="tx1"/>
+                </a:solidFill>
+                <a:latin typeface="+mn-lt"/>
+                <a:ea typeface="+mn-ea"/>
+                <a:cs typeface="+mn-cs"/>
+              </a:rPr>
+              <a:t>CPI (EV/AC) &gt; 1 indica que el costo de lo realizado es menor al planificado. Esto se</a:t>
+            </a:r>
+            <a:r>
+              <a:rPr lang="es-ES" sz="1200" kern="1200" baseline="0" dirty="0" smtClean="0">
+                <a:solidFill>
+                  <a:schemeClr val="tx1"/>
+                </a:solidFill>
+                <a:latin typeface="+mn-lt"/>
+                <a:ea typeface="+mn-ea"/>
+                <a:cs typeface="+mn-cs"/>
+              </a:rPr>
+              <a:t> debe a que nuestras estimaciones fueron un poco pesimistas.</a:t>
+            </a:r>
             <a:endParaRPr lang="es-AR" dirty="0"/>
           </a:p>
         </p:txBody>
@@ -7235,12 +7401,12 @@
           </a:p>
           <a:p>
             <a:r>
-              <a:rPr lang="es-AR" sz="1800" u="sng" dirty="0" err="1" smtClean="0"/>
-              <a:t>Contradiccion</a:t>
-            </a:r>
-            <a:r>
               <a:rPr lang="es-AR" sz="1800" u="sng" dirty="0" smtClean="0"/>
-              <a:t> entre </a:t>
+              <a:t>Contradicción </a:t>
+            </a:r>
+            <a:r>
+              <a:rPr lang="es-AR" sz="1800" u="sng" dirty="0" smtClean="0"/>
+              <a:t>entre </a:t>
             </a:r>
             <a:r>
               <a:rPr lang="es-AR" sz="1800" u="sng" dirty="0" err="1" smtClean="0"/>
@@ -14335,11 +14501,7 @@
           <a:p>
             <a:r>
               <a:rPr lang="es-AR" dirty="0" smtClean="0"/>
-              <a:t>UAT </a:t>
-            </a:r>
-            <a:r>
-              <a:rPr lang="es-AR" dirty="0" smtClean="0"/>
-              <a:t>Tracking: Google </a:t>
+              <a:t>UAT Tracking: Google </a:t>
             </a:r>
             <a:r>
               <a:rPr lang="es-AR" dirty="0" err="1" smtClean="0"/>
@@ -14347,13 +14509,8 @@
             </a:r>
             <a:r>
               <a:rPr lang="es-AR" dirty="0" smtClean="0"/>
-              <a:t> “</a:t>
-            </a:r>
-            <a:r>
-              <a:rPr lang="es-AR" dirty="0" smtClean="0"/>
-              <a:t>S-01007_UATn”</a:t>
-            </a:r>
-            <a:endParaRPr lang="es-AR" dirty="0" smtClean="0"/>
+              <a:t> “S-01007_UATn”</a:t>
+            </a:r>
           </a:p>
         </p:txBody>
       </p:sp>
@@ -14385,11 +14542,7 @@
             </a:r>
             <a:r>
               <a:rPr lang="es-AR" dirty="0" smtClean="0"/>
-              <a:t> </a:t>
-            </a:r>
-            <a:r>
-              <a:rPr lang="es-AR" dirty="0" smtClean="0"/>
-              <a:t>Tracking: Google </a:t>
+              <a:t> Tracking: Google </a:t>
             </a:r>
             <a:r>
               <a:rPr lang="es-AR" dirty="0" err="1" smtClean="0"/>
@@ -15242,8 +15395,8 @@
         </p:blipFill>
         <p:spPr bwMode="auto">
           <a:xfrm>
-            <a:off x="4932040" y="3861048"/>
-            <a:ext cx="3842792" cy="2561861"/>
+            <a:off x="1475656" y="2276872"/>
+            <a:ext cx="6435080" cy="4290053"/>
           </a:xfrm>
           <a:prstGeom prst="rect">
             <a:avLst/>
@@ -15264,7 +15417,7 @@
         </p:nvSpPr>
         <p:spPr>
           <a:xfrm>
-            <a:off x="6228184" y="3356992"/>
+            <a:off x="467544" y="1628800"/>
             <a:ext cx="3168352" cy="477054"/>
           </a:xfrm>
           <a:prstGeom prst="rect">
@@ -15289,204 +15442,6 @@
           </a:p>
         </p:txBody>
       </p:sp>
-      <p:grpSp>
-        <p:nvGrpSpPr>
-          <p:cNvPr id="25" name="24 Grupo"/>
-          <p:cNvGrpSpPr/>
-          <p:nvPr/>
-        </p:nvGrpSpPr>
-        <p:grpSpPr>
-          <a:xfrm>
-            <a:off x="323528" y="1988840"/>
-            <a:ext cx="6396608" cy="696466"/>
-            <a:chOff x="323528" y="2132856"/>
-            <a:chExt cx="6396608" cy="696466"/>
-          </a:xfrm>
-        </p:grpSpPr>
-        <p:pic>
-          <p:nvPicPr>
-            <p:cNvPr id="1030" name="Picture 6"/>
-            <p:cNvPicPr>
-              <a:picLocks noChangeAspect="1" noChangeArrowheads="1"/>
-            </p:cNvPicPr>
-            <p:nvPr/>
-          </p:nvPicPr>
-          <p:blipFill>
-            <a:blip r:embed="rId5" cstate="print"/>
-            <a:srcRect/>
-            <a:stretch>
-              <a:fillRect/>
-            </a:stretch>
-          </p:blipFill>
-          <p:spPr bwMode="auto">
-            <a:xfrm>
-              <a:off x="395536" y="2276872"/>
-              <a:ext cx="6324600" cy="552450"/>
-            </a:xfrm>
-            <a:prstGeom prst="rect">
-              <a:avLst/>
-            </a:prstGeom>
-            <a:noFill/>
-            <a:ln w="9525">
-              <a:noFill/>
-              <a:miter lim="800000"/>
-              <a:headEnd/>
-              <a:tailEnd/>
-            </a:ln>
-          </p:spPr>
-        </p:pic>
-        <p:sp>
-          <p:nvSpPr>
-            <p:cNvPr id="23" name="22 Elipse"/>
-            <p:cNvSpPr/>
-            <p:nvPr/>
-          </p:nvSpPr>
-          <p:spPr>
-            <a:xfrm>
-              <a:off x="323528" y="2132856"/>
-              <a:ext cx="2088232" cy="432048"/>
-            </a:xfrm>
-            <a:prstGeom prst="ellipse">
-              <a:avLst/>
-            </a:prstGeom>
-            <a:noFill/>
-            <a:ln w="57150">
-              <a:solidFill>
-                <a:srgbClr val="FF0000"/>
-              </a:solidFill>
-            </a:ln>
-          </p:spPr>
-          <p:style>
-            <a:lnRef idx="2">
-              <a:schemeClr val="accent6"/>
-            </a:lnRef>
-            <a:fillRef idx="1">
-              <a:schemeClr val="lt1"/>
-            </a:fillRef>
-            <a:effectRef idx="0">
-              <a:schemeClr val="accent6"/>
-            </a:effectRef>
-            <a:fontRef idx="minor">
-              <a:schemeClr val="dk1"/>
-            </a:fontRef>
-          </p:style>
-          <p:txBody>
-            <a:bodyPr rtlCol="0" anchor="ctr"/>
-            <a:lstStyle/>
-            <a:p>
-              <a:pPr algn="ctr"/>
-              <a:endParaRPr lang="es-AR">
-                <a:ln>
-                  <a:solidFill>
-                    <a:srgbClr val="FF0000"/>
-                  </a:solidFill>
-                </a:ln>
-              </a:endParaRPr>
-            </a:p>
-          </p:txBody>
-        </p:sp>
-      </p:grpSp>
-      <p:grpSp>
-        <p:nvGrpSpPr>
-          <p:cNvPr id="26" name="25 Grupo"/>
-          <p:cNvGrpSpPr/>
-          <p:nvPr/>
-        </p:nvGrpSpPr>
-        <p:grpSpPr>
-          <a:xfrm>
-            <a:off x="467544" y="3068960"/>
-            <a:ext cx="4104456" cy="2313439"/>
-            <a:chOff x="467544" y="3140968"/>
-            <a:chExt cx="4104456" cy="2313439"/>
-          </a:xfrm>
-        </p:grpSpPr>
-        <p:pic>
-          <p:nvPicPr>
-            <p:cNvPr id="1029" name="Picture 5"/>
-            <p:cNvPicPr>
-              <a:picLocks noChangeAspect="1" noChangeArrowheads="1"/>
-            </p:cNvPicPr>
-            <p:nvPr/>
-          </p:nvPicPr>
-          <p:blipFill>
-            <a:blip r:embed="rId6" cstate="print"/>
-            <a:srcRect/>
-            <a:stretch>
-              <a:fillRect/>
-            </a:stretch>
-          </p:blipFill>
-          <p:spPr bwMode="auto">
-            <a:xfrm>
-              <a:off x="467544" y="3140968"/>
-              <a:ext cx="4104456" cy="2313439"/>
-            </a:xfrm>
-            <a:prstGeom prst="rect">
-              <a:avLst/>
-            </a:prstGeom>
-            <a:noFill/>
-            <a:ln w="76200">
-              <a:solidFill>
-                <a:schemeClr val="tx2">
-                  <a:lumMod val="75000"/>
-                </a:schemeClr>
-              </a:solidFill>
-              <a:miter lim="800000"/>
-              <a:headEnd/>
-              <a:tailEnd/>
-            </a:ln>
-          </p:spPr>
-        </p:pic>
-        <p:sp>
-          <p:nvSpPr>
-            <p:cNvPr id="24" name="23 Elipse"/>
-            <p:cNvSpPr/>
-            <p:nvPr/>
-          </p:nvSpPr>
-          <p:spPr>
-            <a:xfrm>
-              <a:off x="1475656" y="4077072"/>
-              <a:ext cx="2088232" cy="432048"/>
-            </a:xfrm>
-            <a:prstGeom prst="ellipse">
-              <a:avLst/>
-            </a:prstGeom>
-            <a:noFill/>
-            <a:ln w="57150">
-              <a:solidFill>
-                <a:srgbClr val="FF0000"/>
-              </a:solidFill>
-            </a:ln>
-          </p:spPr>
-          <p:style>
-            <a:lnRef idx="2">
-              <a:schemeClr val="accent6"/>
-            </a:lnRef>
-            <a:fillRef idx="1">
-              <a:schemeClr val="lt1"/>
-            </a:fillRef>
-            <a:effectRef idx="0">
-              <a:schemeClr val="accent6"/>
-            </a:effectRef>
-            <a:fontRef idx="minor">
-              <a:schemeClr val="dk1"/>
-            </a:fontRef>
-          </p:style>
-          <p:txBody>
-            <a:bodyPr rtlCol="0" anchor="ctr"/>
-            <a:lstStyle/>
-            <a:p>
-              <a:pPr algn="ctr"/>
-              <a:endParaRPr lang="es-AR">
-                <a:ln>
-                  <a:solidFill>
-                    <a:srgbClr val="FF0000"/>
-                  </a:solidFill>
-                </a:ln>
-              </a:endParaRPr>
-            </a:p>
-          </p:txBody>
-        </p:sp>
-      </p:grpSp>
     </p:spTree>
   </p:cSld>
   <p:clrMapOvr>

</xml_diff>